<commit_message>
Updated Pitch and final scripts
</commit_message>
<xml_diff>
--- a/Presentations/Pitch for 25.07/final Pitch.pptx
+++ b/Presentations/Pitch for 25.07/final Pitch.pptx
@@ -8,18 +8,6 @@
     <p:sldId id="262" r:id="rId2"/>
     <p:sldId id="272" r:id="rId3"/>
     <p:sldId id="275" r:id="rId4"/>
-    <p:sldId id="267" r:id="rId5"/>
-    <p:sldId id="273" r:id="rId6"/>
-    <p:sldId id="271" r:id="rId7"/>
-    <p:sldId id="269" r:id="rId8"/>
-    <p:sldId id="274" r:id="rId9"/>
-    <p:sldId id="268" r:id="rId10"/>
-    <p:sldId id="263" r:id="rId11"/>
-    <p:sldId id="257" r:id="rId12"/>
-    <p:sldId id="258" r:id="rId13"/>
-    <p:sldId id="259" r:id="rId14"/>
-    <p:sldId id="260" r:id="rId15"/>
-    <p:sldId id="261" r:id="rId16"/>
   </p:sldIdLst>
   <p:sldSz cx="12192000" cy="6858000"/>
   <p:notesSz cx="6858000" cy="9144000"/>
@@ -3554,7 +3542,7 @@
           <a:p>
             <a:pPr algn="l"/>
             <a:r>
-              <a:rPr lang="en-US" sz="3400" dirty="0"/>
+              <a:rPr lang="en-US" sz="3400" b="1" dirty="0"/>
               <a:t>Immigrant students in Europe suffer from lower grades: some social and scholastic features are the key to explain it</a:t>
             </a:r>
           </a:p>
@@ -3805,7 +3793,7 @@
         </p:blipFill>
         <p:spPr>
           <a:xfrm>
-            <a:off x="10603149" y="5531653"/>
+            <a:off x="10733773" y="5531653"/>
             <a:ext cx="1283354" cy="1098819"/>
           </a:xfrm>
           <a:prstGeom prst="rect">
@@ -3827,8 +3815,8 @@
         </p:nvSpPr>
         <p:spPr>
           <a:xfrm>
-            <a:off x="6093475" y="6092064"/>
-            <a:ext cx="3325535" cy="369332"/>
+            <a:off x="6093475" y="5896396"/>
+            <a:ext cx="1980000" cy="369332"/>
           </a:xfrm>
           <a:prstGeom prst="rect">
             <a:avLst/>
@@ -3863,8 +3851,8 @@
         </p:nvSpPr>
         <p:spPr>
           <a:xfrm>
-            <a:off x="477980" y="6092064"/>
-            <a:ext cx="4480519" cy="369332"/>
+            <a:off x="477980" y="5896396"/>
+            <a:ext cx="4464000" cy="369332"/>
           </a:xfrm>
           <a:prstGeom prst="rect">
             <a:avLst/>
@@ -3887,7 +3875,7 @@
             </a:r>
             <a:r>
               <a:rPr lang="it-IT" dirty="0"/>
-              <a:t> 2022 – Politecnico di Milano </a:t>
+              <a:t> – Politecnico di Milano 2022 </a:t>
             </a:r>
             <a:endParaRPr lang="en-GB" dirty="0"/>
           </a:p>
@@ -3902,1301 +3890,6 @@
   </p:cSld>
   <p:clrMapOvr>
     <a:overrideClrMapping bg1="dk1" tx1="lt1" bg2="dk2" tx2="lt2" accent1="accent1" accent2="accent2" accent3="accent3" accent4="accent4" accent5="accent5" accent6="accent6" hlink="hlink" folHlink="folHlink"/>
-  </p:clrMapOvr>
-</p:sld>
-</file>
-
-<file path=ppt/slides/slide10.xml><?xml version="1.0" encoding="utf-8"?>
-<p:sld xmlns:a="http://schemas.openxmlformats.org/drawingml/2006/main" xmlns:r="http://schemas.openxmlformats.org/officeDocument/2006/relationships" xmlns:p="http://schemas.openxmlformats.org/presentationml/2006/main">
-  <p:cSld>
-    <p:bg>
-      <p:bgPr>
-        <a:solidFill>
-          <a:schemeClr val="bg1"/>
-        </a:solidFill>
-        <a:effectLst/>
-      </p:bgPr>
-    </p:bg>
-    <p:spTree>
-      <p:nvGrpSpPr>
-        <p:cNvPr id="1" name=""/>
-        <p:cNvGrpSpPr/>
-        <p:nvPr/>
-      </p:nvGrpSpPr>
-      <p:grpSpPr>
-        <a:xfrm>
-          <a:off x="0" y="0"/>
-          <a:ext cx="0" cy="0"/>
-          <a:chOff x="0" y="0"/>
-          <a:chExt cx="0" cy="0"/>
-        </a:xfrm>
-      </p:grpSpPr>
-      <p:sp useBgFill="1">
-        <p:nvSpPr>
-          <p:cNvPr id="27" name="Rectangle 26">
-            <a:extLst>
-              <a:ext uri="{FF2B5EF4-FFF2-40B4-BE49-F238E27FC236}">
-                <a16:creationId xmlns:a16="http://schemas.microsoft.com/office/drawing/2014/main" id="{560AFAAC-EA6C-45A9-9E03-C9C9F0193B4F}"/>
-              </a:ext>
-              <a:ext uri="{C183D7F6-B498-43B3-948B-1728B52AA6E4}">
-                <adec:decorative xmlns:adec="http://schemas.microsoft.com/office/drawing/2017/decorative" val="1"/>
-              </a:ext>
-            </a:extLst>
-          </p:cNvPr>
-          <p:cNvSpPr>
-            <a:spLocks noGrp="1" noRot="1" noChangeAspect="1" noMove="1" noResize="1" noEditPoints="1" noAdjustHandles="1" noChangeArrowheads="1" noChangeShapeType="1" noTextEdit="1"/>
-          </p:cNvSpPr>
-          <p:nvPr>
-            <p:extLst>
-              <p:ext uri="{386F3935-93C4-4BCD-93E2-E3B085C9AB24}">
-                <p16:designElem xmlns:p16="http://schemas.microsoft.com/office/powerpoint/2015/main" val="1"/>
-              </p:ext>
-            </p:extLst>
-          </p:nvPr>
-        </p:nvSpPr>
-        <p:spPr>
-          <a:xfrm>
-            <a:off x="0" y="0"/>
-            <a:ext cx="12192000" cy="6858000"/>
-          </a:xfrm>
-          <a:prstGeom prst="rect">
-            <a:avLst/>
-          </a:prstGeom>
-          <a:ln>
-            <a:noFill/>
-          </a:ln>
-        </p:spPr>
-        <p:style>
-          <a:lnRef idx="2">
-            <a:schemeClr val="accent1">
-              <a:shade val="50000"/>
-            </a:schemeClr>
-          </a:lnRef>
-          <a:fillRef idx="1">
-            <a:schemeClr val="accent1"/>
-          </a:fillRef>
-          <a:effectRef idx="0">
-            <a:schemeClr val="accent1"/>
-          </a:effectRef>
-          <a:fontRef idx="minor">
-            <a:schemeClr val="lt1"/>
-          </a:fontRef>
-        </p:style>
-        <p:txBody>
-          <a:bodyPr rtlCol="0" anchor="ctr"/>
-          <a:lstStyle/>
-          <a:p>
-            <a:pPr algn="ctr"/>
-            <a:endParaRPr lang="en-US"/>
-          </a:p>
-        </p:txBody>
-      </p:sp>
-      <p:pic>
-        <p:nvPicPr>
-          <p:cNvPr id="6" name="Picture Placeholder 5" descr="A group of people sitting outside&#10;&#10;Description automatically generated with low confidence">
-            <a:extLst>
-              <a:ext uri="{FF2B5EF4-FFF2-40B4-BE49-F238E27FC236}">
-                <a16:creationId xmlns:a16="http://schemas.microsoft.com/office/drawing/2014/main" id="{C4CE4526-FD40-3B0E-691B-0ECA54390A57}"/>
-              </a:ext>
-            </a:extLst>
-          </p:cNvPr>
-          <p:cNvPicPr>
-            <a:picLocks noGrp="1" noChangeAspect="1"/>
-          </p:cNvPicPr>
-          <p:nvPr>
-            <p:ph type="pic" idx="1"/>
-          </p:nvPr>
-        </p:nvPicPr>
-        <p:blipFill rotWithShape="1">
-          <a:blip r:embed="rId2">
-            <a:extLst>
-              <a:ext uri="{28A0092B-C50C-407E-A947-70E740481C1C}">
-                <a14:useLocalDpi xmlns:a14="http://schemas.microsoft.com/office/drawing/2010/main" val="0"/>
-              </a:ext>
-            </a:extLst>
-          </a:blip>
-          <a:srcRect l="14697" r="14695" b="-1"/>
-          <a:stretch/>
-        </p:blipFill>
-        <p:spPr>
-          <a:xfrm>
-            <a:off x="4883022" y="10"/>
-            <a:ext cx="7308978" cy="6857990"/>
-          </a:xfrm>
-          <a:custGeom>
-            <a:avLst/>
-            <a:gdLst/>
-            <a:ahLst/>
-            <a:cxnLst/>
-            <a:rect l="l" t="t" r="r" b="b"/>
-            <a:pathLst>
-              <a:path w="7308978" h="6858000">
-                <a:moveTo>
-                  <a:pt x="0" y="0"/>
-                </a:moveTo>
-                <a:lnTo>
-                  <a:pt x="7308978" y="0"/>
-                </a:lnTo>
-                <a:lnTo>
-                  <a:pt x="7308978" y="6858000"/>
-                </a:lnTo>
-                <a:lnTo>
-                  <a:pt x="0" y="6858000"/>
-                </a:lnTo>
-                <a:lnTo>
-                  <a:pt x="62983" y="6788730"/>
-                </a:lnTo>
-                <a:cubicBezTo>
-                  <a:pt x="773509" y="5928900"/>
-                  <a:pt x="1212978" y="4741056"/>
-                  <a:pt x="1212978" y="3429000"/>
-                </a:cubicBezTo>
-                <a:cubicBezTo>
-                  <a:pt x="1212978" y="2116944"/>
-                  <a:pt x="773509" y="929100"/>
-                  <a:pt x="62983" y="69271"/>
-                </a:cubicBezTo>
-                <a:close/>
-              </a:path>
-            </a:pathLst>
-          </a:custGeom>
-        </p:spPr>
-      </p:pic>
-      <p:sp useBgFill="1">
-        <p:nvSpPr>
-          <p:cNvPr id="29" name="Freeform: Shape 28">
-            <a:extLst>
-              <a:ext uri="{FF2B5EF4-FFF2-40B4-BE49-F238E27FC236}">
-                <a16:creationId xmlns:a16="http://schemas.microsoft.com/office/drawing/2014/main" id="{83549E37-C86B-4401-90BD-D8BF83859F14}"/>
-              </a:ext>
-              <a:ext uri="{C183D7F6-B498-43B3-948B-1728B52AA6E4}">
-                <adec:decorative xmlns:adec="http://schemas.microsoft.com/office/drawing/2017/decorative" val="1"/>
-              </a:ext>
-            </a:extLst>
-          </p:cNvPr>
-          <p:cNvSpPr>
-            <a:spLocks noGrp="1" noRot="1" noChangeAspect="1" noMove="1" noResize="1" noEditPoints="1" noAdjustHandles="1" noChangeArrowheads="1" noChangeShapeType="1" noTextEdit="1"/>
-          </p:cNvSpPr>
-          <p:nvPr>
-            <p:extLst>
-              <p:ext uri="{386F3935-93C4-4BCD-93E2-E3B085C9AB24}">
-                <p16:designElem xmlns:p16="http://schemas.microsoft.com/office/powerpoint/2015/main" val="1"/>
-              </p:ext>
-            </p:extLst>
-          </p:nvPr>
-        </p:nvSpPr>
-        <p:spPr>
-          <a:xfrm>
-            <a:off x="0" y="0"/>
-            <a:ext cx="6096001" cy="6858000"/>
-          </a:xfrm>
-          <a:custGeom>
-            <a:avLst/>
-            <a:gdLst>
-              <a:gd name="connsiteX0" fmla="*/ 0 w 6096001"/>
-              <a:gd name="connsiteY0" fmla="*/ 0 h 6858000"/>
-              <a:gd name="connsiteX1" fmla="*/ 4883023 w 6096001"/>
-              <a:gd name="connsiteY1" fmla="*/ 0 h 6858000"/>
-              <a:gd name="connsiteX2" fmla="*/ 4946006 w 6096001"/>
-              <a:gd name="connsiteY2" fmla="*/ 69271 h 6858000"/>
-              <a:gd name="connsiteX3" fmla="*/ 6096001 w 6096001"/>
-              <a:gd name="connsiteY3" fmla="*/ 3429000 h 6858000"/>
-              <a:gd name="connsiteX4" fmla="*/ 4946006 w 6096001"/>
-              <a:gd name="connsiteY4" fmla="*/ 6788730 h 6858000"/>
-              <a:gd name="connsiteX5" fmla="*/ 4883023 w 6096001"/>
-              <a:gd name="connsiteY5" fmla="*/ 6858000 h 6858000"/>
-              <a:gd name="connsiteX6" fmla="*/ 0 w 6096001"/>
-              <a:gd name="connsiteY6" fmla="*/ 6858000 h 6858000"/>
-            </a:gdLst>
-            <a:ahLst/>
-            <a:cxnLst>
-              <a:cxn ang="0">
-                <a:pos x="connsiteX0" y="connsiteY0"/>
-              </a:cxn>
-              <a:cxn ang="0">
-                <a:pos x="connsiteX1" y="connsiteY1"/>
-              </a:cxn>
-              <a:cxn ang="0">
-                <a:pos x="connsiteX2" y="connsiteY2"/>
-              </a:cxn>
-              <a:cxn ang="0">
-                <a:pos x="connsiteX3" y="connsiteY3"/>
-              </a:cxn>
-              <a:cxn ang="0">
-                <a:pos x="connsiteX4" y="connsiteY4"/>
-              </a:cxn>
-              <a:cxn ang="0">
-                <a:pos x="connsiteX5" y="connsiteY5"/>
-              </a:cxn>
-              <a:cxn ang="0">
-                <a:pos x="connsiteX6" y="connsiteY6"/>
-              </a:cxn>
-            </a:cxnLst>
-            <a:rect l="l" t="t" r="r" b="b"/>
-            <a:pathLst>
-              <a:path w="6096001" h="6858000">
-                <a:moveTo>
-                  <a:pt x="0" y="0"/>
-                </a:moveTo>
-                <a:lnTo>
-                  <a:pt x="4883023" y="0"/>
-                </a:lnTo>
-                <a:lnTo>
-                  <a:pt x="4946006" y="69271"/>
-                </a:lnTo>
-                <a:cubicBezTo>
-                  <a:pt x="5656532" y="929100"/>
-                  <a:pt x="6096001" y="2116944"/>
-                  <a:pt x="6096001" y="3429000"/>
-                </a:cubicBezTo>
-                <a:cubicBezTo>
-                  <a:pt x="6096001" y="4741056"/>
-                  <a:pt x="5656532" y="5928900"/>
-                  <a:pt x="4946006" y="6788730"/>
-                </a:cubicBezTo>
-                <a:lnTo>
-                  <a:pt x="4883023" y="6858000"/>
-                </a:lnTo>
-                <a:lnTo>
-                  <a:pt x="0" y="6858000"/>
-                </a:lnTo>
-                <a:close/>
-              </a:path>
-            </a:pathLst>
-          </a:custGeom>
-          <a:ln w="9525">
-            <a:solidFill>
-              <a:srgbClr val="EFEFEF"/>
-            </a:solidFill>
-          </a:ln>
-          <a:effectLst>
-            <a:outerShdw blurRad="50800" dist="38100" algn="l" rotWithShape="0">
-              <a:schemeClr val="bg1">
-                <a:lumMod val="85000"/>
-                <a:alpha val="30000"/>
-              </a:schemeClr>
-            </a:outerShdw>
-          </a:effectLst>
-        </p:spPr>
-        <p:style>
-          <a:lnRef idx="2">
-            <a:schemeClr val="accent1">
-              <a:shade val="50000"/>
-            </a:schemeClr>
-          </a:lnRef>
-          <a:fillRef idx="1">
-            <a:schemeClr val="accent1"/>
-          </a:fillRef>
-          <a:effectRef idx="0">
-            <a:schemeClr val="accent1"/>
-          </a:effectRef>
-          <a:fontRef idx="minor">
-            <a:schemeClr val="lt1"/>
-          </a:fontRef>
-        </p:style>
-        <p:txBody>
-          <a:bodyPr wrap="square" rtlCol="0" anchor="ctr">
-            <a:noAutofit/>
-          </a:bodyPr>
-          <a:lstStyle/>
-          <a:p>
-            <a:pPr marL="0" marR="0" lvl="0" indent="0" algn="ctr" defTabSz="914400" rtl="0" eaLnBrk="1" fontAlgn="auto" latinLnBrk="0" hangingPunct="1">
-              <a:lnSpc>
-                <a:spcPct val="100000"/>
-              </a:lnSpc>
-              <a:spcBef>
-                <a:spcPts val="0"/>
-              </a:spcBef>
-              <a:spcAft>
-                <a:spcPts val="0"/>
-              </a:spcAft>
-              <a:buClrTx/>
-              <a:buSzTx/>
-              <a:buFontTx/>
-              <a:buNone/>
-              <a:tabLst/>
-              <a:defRPr/>
-            </a:pPr>
-            <a:endParaRPr kumimoji="0" lang="en-US" sz="1800" b="0" i="0" u="none" strike="noStrike" kern="1200" cap="none" spc="0" normalizeH="0" baseline="0" noProof="0">
-              <a:ln>
-                <a:noFill/>
-              </a:ln>
-              <a:solidFill>
-                <a:prstClr val="white"/>
-              </a:solidFill>
-              <a:effectLst/>
-              <a:uLnTx/>
-              <a:uFillTx/>
-              <a:latin typeface="Calibri" panose="020F0502020204030204"/>
-              <a:ea typeface="+mn-ea"/>
-              <a:cs typeface="+mn-cs"/>
-            </a:endParaRPr>
-          </a:p>
-        </p:txBody>
-      </p:sp>
-      <p:sp useBgFill="1">
-        <p:nvSpPr>
-          <p:cNvPr id="31" name="Freeform: Shape 30">
-            <a:extLst>
-              <a:ext uri="{FF2B5EF4-FFF2-40B4-BE49-F238E27FC236}">
-                <a16:creationId xmlns:a16="http://schemas.microsoft.com/office/drawing/2014/main" id="{8A17784E-76D8-4521-A77D-0D2EBB923004}"/>
-              </a:ext>
-              <a:ext uri="{C183D7F6-B498-43B3-948B-1728B52AA6E4}">
-                <adec:decorative xmlns:adec="http://schemas.microsoft.com/office/drawing/2017/decorative" val="1"/>
-              </a:ext>
-            </a:extLst>
-          </p:cNvPr>
-          <p:cNvSpPr>
-            <a:spLocks noGrp="1" noRot="1" noChangeAspect="1" noMove="1" noResize="1" noEditPoints="1" noAdjustHandles="1" noChangeArrowheads="1" noChangeShapeType="1" noTextEdit="1"/>
-          </p:cNvSpPr>
-          <p:nvPr>
-            <p:extLst>
-              <p:ext uri="{386F3935-93C4-4BCD-93E2-E3B085C9AB24}">
-                <p16:designElem xmlns:p16="http://schemas.microsoft.com/office/powerpoint/2015/main" val="1"/>
-              </p:ext>
-            </p:extLst>
-          </p:nvPr>
-        </p:nvSpPr>
-        <p:spPr>
-          <a:xfrm>
-            <a:off x="0" y="0"/>
-            <a:ext cx="6086857" cy="6858000"/>
-          </a:xfrm>
-          <a:custGeom>
-            <a:avLst/>
-            <a:gdLst>
-              <a:gd name="connsiteX0" fmla="*/ 0 w 6086857"/>
-              <a:gd name="connsiteY0" fmla="*/ 0 h 6858000"/>
-              <a:gd name="connsiteX1" fmla="*/ 4873879 w 6086857"/>
-              <a:gd name="connsiteY1" fmla="*/ 0 h 6858000"/>
-              <a:gd name="connsiteX2" fmla="*/ 4936862 w 6086857"/>
-              <a:gd name="connsiteY2" fmla="*/ 69271 h 6858000"/>
-              <a:gd name="connsiteX3" fmla="*/ 6086857 w 6086857"/>
-              <a:gd name="connsiteY3" fmla="*/ 3429000 h 6858000"/>
-              <a:gd name="connsiteX4" fmla="*/ 4936862 w 6086857"/>
-              <a:gd name="connsiteY4" fmla="*/ 6788730 h 6858000"/>
-              <a:gd name="connsiteX5" fmla="*/ 4873879 w 6086857"/>
-              <a:gd name="connsiteY5" fmla="*/ 6858000 h 6858000"/>
-              <a:gd name="connsiteX6" fmla="*/ 0 w 6086857"/>
-              <a:gd name="connsiteY6" fmla="*/ 6858000 h 6858000"/>
-            </a:gdLst>
-            <a:ahLst/>
-            <a:cxnLst>
-              <a:cxn ang="0">
-                <a:pos x="connsiteX0" y="connsiteY0"/>
-              </a:cxn>
-              <a:cxn ang="0">
-                <a:pos x="connsiteX1" y="connsiteY1"/>
-              </a:cxn>
-              <a:cxn ang="0">
-                <a:pos x="connsiteX2" y="connsiteY2"/>
-              </a:cxn>
-              <a:cxn ang="0">
-                <a:pos x="connsiteX3" y="connsiteY3"/>
-              </a:cxn>
-              <a:cxn ang="0">
-                <a:pos x="connsiteX4" y="connsiteY4"/>
-              </a:cxn>
-              <a:cxn ang="0">
-                <a:pos x="connsiteX5" y="connsiteY5"/>
-              </a:cxn>
-              <a:cxn ang="0">
-                <a:pos x="connsiteX6" y="connsiteY6"/>
-              </a:cxn>
-            </a:cxnLst>
-            <a:rect l="l" t="t" r="r" b="b"/>
-            <a:pathLst>
-              <a:path w="6086857" h="6858000">
-                <a:moveTo>
-                  <a:pt x="0" y="0"/>
-                </a:moveTo>
-                <a:lnTo>
-                  <a:pt x="4873879" y="0"/>
-                </a:lnTo>
-                <a:lnTo>
-                  <a:pt x="4936862" y="69271"/>
-                </a:lnTo>
-                <a:cubicBezTo>
-                  <a:pt x="5647388" y="929100"/>
-                  <a:pt x="6086857" y="2116944"/>
-                  <a:pt x="6086857" y="3429000"/>
-                </a:cubicBezTo>
-                <a:cubicBezTo>
-                  <a:pt x="6086857" y="4741056"/>
-                  <a:pt x="5647388" y="5928900"/>
-                  <a:pt x="4936862" y="6788730"/>
-                </a:cubicBezTo>
-                <a:lnTo>
-                  <a:pt x="4873879" y="6858000"/>
-                </a:lnTo>
-                <a:lnTo>
-                  <a:pt x="0" y="6858000"/>
-                </a:lnTo>
-                <a:close/>
-              </a:path>
-            </a:pathLst>
-          </a:custGeom>
-          <a:ln w="9525">
-            <a:noFill/>
-          </a:ln>
-          <a:effectLst/>
-        </p:spPr>
-        <p:style>
-          <a:lnRef idx="2">
-            <a:schemeClr val="accent1">
-              <a:shade val="50000"/>
-            </a:schemeClr>
-          </a:lnRef>
-          <a:fillRef idx="1">
-            <a:schemeClr val="accent1"/>
-          </a:fillRef>
-          <a:effectRef idx="0">
-            <a:schemeClr val="accent1"/>
-          </a:effectRef>
-          <a:fontRef idx="minor">
-            <a:schemeClr val="lt1"/>
-          </a:fontRef>
-        </p:style>
-        <p:txBody>
-          <a:bodyPr wrap="square" rtlCol="0" anchor="ctr">
-            <a:noAutofit/>
-          </a:bodyPr>
-          <a:lstStyle/>
-          <a:p>
-            <a:pPr marL="0" marR="0" lvl="0" indent="0" algn="ctr" defTabSz="914400" rtl="0" eaLnBrk="1" fontAlgn="auto" latinLnBrk="0" hangingPunct="1">
-              <a:lnSpc>
-                <a:spcPct val="100000"/>
-              </a:lnSpc>
-              <a:spcBef>
-                <a:spcPts val="0"/>
-              </a:spcBef>
-              <a:spcAft>
-                <a:spcPts val="0"/>
-              </a:spcAft>
-              <a:buClrTx/>
-              <a:buSzTx/>
-              <a:buFontTx/>
-              <a:buNone/>
-              <a:tabLst/>
-              <a:defRPr/>
-            </a:pPr>
-            <a:endParaRPr kumimoji="0" lang="en-US" sz="1800" b="0" i="0" u="none" strike="noStrike" kern="1200" cap="none" spc="0" normalizeH="0" baseline="0" noProof="0">
-              <a:ln>
-                <a:noFill/>
-              </a:ln>
-              <a:solidFill>
-                <a:prstClr val="white"/>
-              </a:solidFill>
-              <a:effectLst/>
-              <a:uLnTx/>
-              <a:uFillTx/>
-              <a:latin typeface="Calibri" panose="020F0502020204030204"/>
-              <a:ea typeface="+mn-ea"/>
-              <a:cs typeface="+mn-cs"/>
-            </a:endParaRPr>
-          </a:p>
-        </p:txBody>
-      </p:sp>
-      <p:sp>
-        <p:nvSpPr>
-          <p:cNvPr id="2" name="Title 1">
-            <a:extLst>
-              <a:ext uri="{FF2B5EF4-FFF2-40B4-BE49-F238E27FC236}">
-                <a16:creationId xmlns:a16="http://schemas.microsoft.com/office/drawing/2014/main" id="{4847FE58-086A-4106-1373-84BAE49A4B29}"/>
-              </a:ext>
-            </a:extLst>
-          </p:cNvPr>
-          <p:cNvSpPr>
-            <a:spLocks noGrp="1"/>
-          </p:cNvSpPr>
-          <p:nvPr>
-            <p:ph type="title"/>
-          </p:nvPr>
-        </p:nvSpPr>
-        <p:spPr>
-          <a:xfrm>
-            <a:off x="374904" y="856488"/>
-            <a:ext cx="4992624" cy="1243584"/>
-          </a:xfrm>
-        </p:spPr>
-        <p:txBody>
-          <a:bodyPr vert="horz" lIns="91440" tIns="45720" rIns="91440" bIns="45720" rtlCol="0" anchor="ctr">
-            <a:normAutofit/>
-          </a:bodyPr>
-          <a:lstStyle/>
-          <a:p>
-            <a:r>
-              <a:rPr lang="en-US" sz="3400" dirty="0"/>
-              <a:t>Our Goal</a:t>
-            </a:r>
-          </a:p>
-        </p:txBody>
-      </p:sp>
-      <p:sp>
-        <p:nvSpPr>
-          <p:cNvPr id="33" name="Rectangle 32">
-            <a:extLst>
-              <a:ext uri="{FF2B5EF4-FFF2-40B4-BE49-F238E27FC236}">
-                <a16:creationId xmlns:a16="http://schemas.microsoft.com/office/drawing/2014/main" id="{C0036C6B-F09C-4EAB-AE02-8D056EE74856}"/>
-              </a:ext>
-              <a:ext uri="{C183D7F6-B498-43B3-948B-1728B52AA6E4}">
-                <adec:decorative xmlns:adec="http://schemas.microsoft.com/office/drawing/2017/decorative" val="1"/>
-              </a:ext>
-            </a:extLst>
-          </p:cNvPr>
-          <p:cNvSpPr>
-            <a:spLocks noGrp="1" noRot="1" noChangeAspect="1" noMove="1" noResize="1" noEditPoints="1" noAdjustHandles="1" noChangeArrowheads="1" noChangeShapeType="1" noTextEdit="1"/>
-          </p:cNvSpPr>
-          <p:nvPr>
-            <p:extLst>
-              <p:ext uri="{386F3935-93C4-4BCD-93E2-E3B085C9AB24}">
-                <p16:designElem xmlns:p16="http://schemas.microsoft.com/office/powerpoint/2015/main" val="1"/>
-              </p:ext>
-            </p:extLst>
-          </p:nvPr>
-        </p:nvSpPr>
-        <p:spPr>
-          <a:xfrm>
-            <a:off x="0" y="1124325"/>
-            <a:ext cx="128016" cy="653903"/>
-          </a:xfrm>
-          <a:prstGeom prst="rect">
-            <a:avLst/>
-          </a:prstGeom>
-          <a:solidFill>
-            <a:schemeClr val="accent2"/>
-          </a:solidFill>
-          <a:ln>
-            <a:noFill/>
-          </a:ln>
-        </p:spPr>
-        <p:style>
-          <a:lnRef idx="2">
-            <a:schemeClr val="accent1">
-              <a:shade val="50000"/>
-            </a:schemeClr>
-          </a:lnRef>
-          <a:fillRef idx="1">
-            <a:schemeClr val="accent1"/>
-          </a:fillRef>
-          <a:effectRef idx="0">
-            <a:schemeClr val="accent1"/>
-          </a:effectRef>
-          <a:fontRef idx="minor">
-            <a:schemeClr val="lt1"/>
-          </a:fontRef>
-        </p:style>
-        <p:txBody>
-          <a:bodyPr rtlCol="0" anchor="ctr"/>
-          <a:lstStyle/>
-          <a:p>
-            <a:pPr algn="ctr"/>
-            <a:endParaRPr lang="en-US">
-              <a:solidFill>
-                <a:prstClr val="white"/>
-              </a:solidFill>
-              <a:latin typeface="Calibri" panose="020F0502020204030204"/>
-            </a:endParaRPr>
-          </a:p>
-        </p:txBody>
-      </p:sp>
-      <p:sp>
-        <p:nvSpPr>
-          <p:cNvPr id="35" name="Rectangle 34">
-            <a:extLst>
-              <a:ext uri="{FF2B5EF4-FFF2-40B4-BE49-F238E27FC236}">
-                <a16:creationId xmlns:a16="http://schemas.microsoft.com/office/drawing/2014/main" id="{FC8D5885-2804-4D3C-BE31-902E4D3279B0}"/>
-              </a:ext>
-              <a:ext uri="{C183D7F6-B498-43B3-948B-1728B52AA6E4}">
-                <adec:decorative xmlns:adec="http://schemas.microsoft.com/office/drawing/2017/decorative" val="1"/>
-              </a:ext>
-            </a:extLst>
-          </p:cNvPr>
-          <p:cNvSpPr>
-            <a:spLocks noGrp="1" noRot="1" noChangeAspect="1" noMove="1" noResize="1" noEditPoints="1" noAdjustHandles="1" noChangeArrowheads="1" noChangeShapeType="1" noTextEdit="1"/>
-          </p:cNvSpPr>
-          <p:nvPr>
-            <p:extLst>
-              <p:ext uri="{386F3935-93C4-4BCD-93E2-E3B085C9AB24}">
-                <p16:designElem xmlns:p16="http://schemas.microsoft.com/office/powerpoint/2015/main" val="1"/>
-              </p:ext>
-            </p:extLst>
-          </p:nvPr>
-        </p:nvSpPr>
-        <p:spPr>
-          <a:xfrm>
-            <a:off x="437769" y="2195336"/>
-            <a:ext cx="4983480" cy="18288"/>
-          </a:xfrm>
-          <a:prstGeom prst="rect">
-            <a:avLst/>
-          </a:prstGeom>
-          <a:solidFill>
-            <a:srgbClr val="D5D5D5"/>
-          </a:solidFill>
-          <a:ln w="3175">
-            <a:noFill/>
-          </a:ln>
-          <a:effectLst/>
-        </p:spPr>
-        <p:style>
-          <a:lnRef idx="2">
-            <a:schemeClr val="accent1">
-              <a:shade val="50000"/>
-            </a:schemeClr>
-          </a:lnRef>
-          <a:fillRef idx="1">
-            <a:schemeClr val="accent1"/>
-          </a:fillRef>
-          <a:effectRef idx="0">
-            <a:schemeClr val="accent1"/>
-          </a:effectRef>
-          <a:fontRef idx="minor">
-            <a:schemeClr val="lt1"/>
-          </a:fontRef>
-        </p:style>
-        <p:txBody>
-          <a:bodyPr rtlCol="0" anchor="ctr"/>
-          <a:lstStyle/>
-          <a:p>
-            <a:pPr algn="ctr"/>
-            <a:endParaRPr lang="en-US">
-              <a:solidFill>
-                <a:prstClr val="white"/>
-              </a:solidFill>
-              <a:latin typeface="Calibri" panose="020F0502020204030204"/>
-            </a:endParaRPr>
-          </a:p>
-        </p:txBody>
-      </p:sp>
-      <p:sp>
-        <p:nvSpPr>
-          <p:cNvPr id="4" name="Text Placeholder 3">
-            <a:extLst>
-              <a:ext uri="{FF2B5EF4-FFF2-40B4-BE49-F238E27FC236}">
-                <a16:creationId xmlns:a16="http://schemas.microsoft.com/office/drawing/2014/main" id="{30103733-DF1A-F41B-0C6C-68D1050A1FDD}"/>
-              </a:ext>
-            </a:extLst>
-          </p:cNvPr>
-          <p:cNvSpPr>
-            <a:spLocks noGrp="1"/>
-          </p:cNvSpPr>
-          <p:nvPr>
-            <p:ph type="body" sz="half" idx="2"/>
-          </p:nvPr>
-        </p:nvSpPr>
-        <p:spPr>
-          <a:xfrm>
-            <a:off x="374904" y="2522949"/>
-            <a:ext cx="5065776" cy="3402363"/>
-          </a:xfrm>
-        </p:spPr>
-        <p:txBody>
-          <a:bodyPr vert="horz" lIns="91440" tIns="45720" rIns="91440" bIns="45720" rtlCol="0" anchor="t">
-            <a:normAutofit/>
-          </a:bodyPr>
-          <a:lstStyle/>
-          <a:p>
-            <a:pPr indent="-228600">
-              <a:buFont typeface="Arial" panose="020B0604020202020204" pitchFamily="34" charset="0"/>
-              <a:buChar char="•"/>
-            </a:pPr>
-            <a:r>
-              <a:rPr lang="en-US" sz="1700" dirty="0"/>
-              <a:t>The goal of our project is to find quantitative evidence of the differences between native and immigrant students across Europe. We want to measure the level of integration of European schools by analyzing the scholastic, social and economical status of their students. We aim at identifying the most relevant factors for school performance focusing on immigrant students. </a:t>
-            </a:r>
-          </a:p>
-          <a:p>
-            <a:pPr indent="-228600">
-              <a:buFont typeface="Arial" panose="020B0604020202020204" pitchFamily="34" charset="0"/>
-              <a:buChar char="•"/>
-            </a:pPr>
-            <a:endParaRPr lang="en-US" sz="1700" dirty="0"/>
-          </a:p>
-          <a:p>
-            <a:pPr indent="-228600">
-              <a:buFont typeface="Arial" panose="020B0604020202020204" pitchFamily="34" charset="0"/>
-              <a:buChar char="•"/>
-            </a:pPr>
-            <a:r>
-              <a:rPr lang="en-US" sz="1700" dirty="0"/>
-              <a:t>Our dataset comes from a world wide survey conducted by OECD Pisa which collects information about students test score, lifestyle, social class, economic resources and much more.     </a:t>
-            </a:r>
-          </a:p>
-        </p:txBody>
-      </p:sp>
-    </p:spTree>
-    <p:extLst>
-      <p:ext uri="{BB962C8B-B14F-4D97-AF65-F5344CB8AC3E}">
-        <p14:creationId xmlns:p14="http://schemas.microsoft.com/office/powerpoint/2010/main" val="350710308"/>
-      </p:ext>
-    </p:extLst>
-  </p:cSld>
-  <p:clrMapOvr>
-    <a:masterClrMapping/>
-  </p:clrMapOvr>
-</p:sld>
-</file>
-
-<file path=ppt/slides/slide11.xml><?xml version="1.0" encoding="utf-8"?>
-<p:sld xmlns:a="http://schemas.openxmlformats.org/drawingml/2006/main" xmlns:r="http://schemas.openxmlformats.org/officeDocument/2006/relationships" xmlns:p="http://schemas.openxmlformats.org/presentationml/2006/main">
-  <p:cSld>
-    <p:spTree>
-      <p:nvGrpSpPr>
-        <p:cNvPr id="1" name=""/>
-        <p:cNvGrpSpPr/>
-        <p:nvPr/>
-      </p:nvGrpSpPr>
-      <p:grpSpPr>
-        <a:xfrm>
-          <a:off x="0" y="0"/>
-          <a:ext cx="0" cy="0"/>
-          <a:chOff x="0" y="0"/>
-          <a:chExt cx="0" cy="0"/>
-        </a:xfrm>
-      </p:grpSpPr>
-      <p:sp>
-        <p:nvSpPr>
-          <p:cNvPr id="2" name="Title 1">
-            <a:extLst>
-              <a:ext uri="{FF2B5EF4-FFF2-40B4-BE49-F238E27FC236}">
-                <a16:creationId xmlns:a16="http://schemas.microsoft.com/office/drawing/2014/main" id="{363368E9-B6FB-F212-9CC0-3D6829D1DD74}"/>
-              </a:ext>
-            </a:extLst>
-          </p:cNvPr>
-          <p:cNvSpPr>
-            <a:spLocks noGrp="1"/>
-          </p:cNvSpPr>
-          <p:nvPr>
-            <p:ph type="title"/>
-          </p:nvPr>
-        </p:nvSpPr>
-        <p:spPr/>
-        <p:txBody>
-          <a:bodyPr/>
-          <a:lstStyle/>
-          <a:p>
-            <a:r>
-              <a:rPr lang="en-US" dirty="0"/>
-              <a:t>Why should we care about immigrant students in Europe?</a:t>
-            </a:r>
-          </a:p>
-        </p:txBody>
-      </p:sp>
-      <p:sp>
-        <p:nvSpPr>
-          <p:cNvPr id="3" name="Content Placeholder 2">
-            <a:extLst>
-              <a:ext uri="{FF2B5EF4-FFF2-40B4-BE49-F238E27FC236}">
-                <a16:creationId xmlns:a16="http://schemas.microsoft.com/office/drawing/2014/main" id="{F15B0087-F77E-3E1B-0918-533663779AD7}"/>
-              </a:ext>
-            </a:extLst>
-          </p:cNvPr>
-          <p:cNvSpPr>
-            <a:spLocks noGrp="1"/>
-          </p:cNvSpPr>
-          <p:nvPr>
-            <p:ph idx="1"/>
-          </p:nvPr>
-        </p:nvSpPr>
-        <p:spPr/>
-        <p:txBody>
-          <a:bodyPr/>
-          <a:lstStyle/>
-          <a:p>
-            <a:r>
-              <a:rPr lang="en-US" dirty="0"/>
-              <a:t>Not only 1</a:t>
-            </a:r>
-            <a:r>
-              <a:rPr lang="en-US" baseline="30000" dirty="0"/>
-              <a:t>st</a:t>
-            </a:r>
-            <a:r>
-              <a:rPr lang="en-US" dirty="0"/>
-              <a:t> gen. but also 2</a:t>
-            </a:r>
-            <a:r>
-              <a:rPr lang="en-US" baseline="30000" dirty="0"/>
-              <a:t>nd</a:t>
-            </a:r>
-            <a:r>
-              <a:rPr lang="en-US" dirty="0"/>
-              <a:t> gen. students suffer from lower grades. This is not due to their “intelligence” but can be traced to social, personal, scholastic discrimination.</a:t>
-            </a:r>
-          </a:p>
-          <a:p>
-            <a:r>
-              <a:rPr lang="en-US" dirty="0"/>
-              <a:t>In my own practice, I’ve seen how these students often act as linguistic and cultural translators for their families, helping parents with government or medical paperwork. In school, they support classmates, bridging the gap between teachers and the most recent arrivals, or helping new families during the enrollment process. Outside of class, they often work long hours to help support their families, or they act as essential caregivers to younger siblings.</a:t>
-            </a:r>
-          </a:p>
-        </p:txBody>
-      </p:sp>
-    </p:spTree>
-    <p:extLst>
-      <p:ext uri="{BB962C8B-B14F-4D97-AF65-F5344CB8AC3E}">
-        <p14:creationId xmlns:p14="http://schemas.microsoft.com/office/powerpoint/2010/main" val="533010516"/>
-      </p:ext>
-    </p:extLst>
-  </p:cSld>
-  <p:clrMapOvr>
-    <a:masterClrMapping/>
-  </p:clrMapOvr>
-</p:sld>
-</file>
-
-<file path=ppt/slides/slide12.xml><?xml version="1.0" encoding="utf-8"?>
-<p:sld xmlns:a="http://schemas.openxmlformats.org/drawingml/2006/main" xmlns:r="http://schemas.openxmlformats.org/officeDocument/2006/relationships" xmlns:p="http://schemas.openxmlformats.org/presentationml/2006/main">
-  <p:cSld>
-    <p:spTree>
-      <p:nvGrpSpPr>
-        <p:cNvPr id="1" name=""/>
-        <p:cNvGrpSpPr/>
-        <p:nvPr/>
-      </p:nvGrpSpPr>
-      <p:grpSpPr>
-        <a:xfrm>
-          <a:off x="0" y="0"/>
-          <a:ext cx="0" cy="0"/>
-          <a:chOff x="0" y="0"/>
-          <a:chExt cx="0" cy="0"/>
-        </a:xfrm>
-      </p:grpSpPr>
-      <p:sp>
-        <p:nvSpPr>
-          <p:cNvPr id="2" name="Title 1">
-            <a:extLst>
-              <a:ext uri="{FF2B5EF4-FFF2-40B4-BE49-F238E27FC236}">
-                <a16:creationId xmlns:a16="http://schemas.microsoft.com/office/drawing/2014/main" id="{AD7D672E-66D0-82FA-DA0C-D04DB8965E3F}"/>
-              </a:ext>
-            </a:extLst>
-          </p:cNvPr>
-          <p:cNvSpPr>
-            <a:spLocks noGrp="1"/>
-          </p:cNvSpPr>
-          <p:nvPr>
-            <p:ph type="title"/>
-          </p:nvPr>
-        </p:nvSpPr>
-        <p:spPr/>
-        <p:txBody>
-          <a:bodyPr/>
-          <a:lstStyle/>
-          <a:p>
-            <a:r>
-              <a:rPr lang="en-US" dirty="0"/>
-              <a:t>Not convinced? Who are the stakeholders of this study?</a:t>
-            </a:r>
-          </a:p>
-        </p:txBody>
-      </p:sp>
-      <p:sp>
-        <p:nvSpPr>
-          <p:cNvPr id="3" name="Content Placeholder 2">
-            <a:extLst>
-              <a:ext uri="{FF2B5EF4-FFF2-40B4-BE49-F238E27FC236}">
-                <a16:creationId xmlns:a16="http://schemas.microsoft.com/office/drawing/2014/main" id="{0E2A8959-8081-379A-0B4D-03CAB7761BE2}"/>
-              </a:ext>
-            </a:extLst>
-          </p:cNvPr>
-          <p:cNvSpPr>
-            <a:spLocks noGrp="1"/>
-          </p:cNvSpPr>
-          <p:nvPr>
-            <p:ph idx="1"/>
-          </p:nvPr>
-        </p:nvSpPr>
-        <p:spPr/>
-        <p:txBody>
-          <a:bodyPr>
-            <a:normAutofit/>
-          </a:bodyPr>
-          <a:lstStyle/>
-          <a:p>
-            <a:pPr algn="l"/>
-            <a:r>
-              <a:rPr lang="en-US" sz="1900" b="0" i="0" dirty="0">
-                <a:solidFill>
-                  <a:srgbClr val="000000"/>
-                </a:solidFill>
-                <a:effectLst/>
-                <a:latin typeface="Open Sans" panose="020B0606030504020204" pitchFamily="34" charset="0"/>
-              </a:rPr>
-              <a:t>EUROPEAN COMMISSION: In November 2020, the Commission adopted an </a:t>
-            </a:r>
-            <a:r>
-              <a:rPr lang="en-US" sz="1900" b="0" i="0" u="sng" dirty="0">
-                <a:solidFill>
-                  <a:srgbClr val="005B90"/>
-                </a:solidFill>
-                <a:effectLst/>
-                <a:latin typeface="Open Sans" panose="020B0606030504020204" pitchFamily="34" charset="0"/>
-                <a:hlinkClick r:id="rId2"/>
-              </a:rPr>
-              <a:t>Action Plan on Integration and Inclusion 2021-2027</a:t>
-            </a:r>
-            <a:r>
-              <a:rPr lang="en-US" sz="1900" b="0" i="0" dirty="0">
-                <a:solidFill>
-                  <a:srgbClr val="000000"/>
-                </a:solidFill>
-                <a:effectLst/>
-                <a:latin typeface="Open Sans" panose="020B0606030504020204" pitchFamily="34" charset="0"/>
-              </a:rPr>
-              <a:t>, which promotes inclusion through a whole of society approach involving, among others, migrant and local communities, employers, civil society, as well as all levels of government. The Action Plan puts emphasis on the provision of targeted support at all stages of integration.</a:t>
-            </a:r>
-          </a:p>
-          <a:p>
-            <a:pPr algn="l"/>
-            <a:r>
-              <a:rPr lang="en-US" sz="1900" b="0" i="0" dirty="0">
-                <a:solidFill>
-                  <a:srgbClr val="000000"/>
-                </a:solidFill>
-                <a:effectLst/>
-                <a:latin typeface="Open Sans" panose="020B0606030504020204" pitchFamily="34" charset="0"/>
-              </a:rPr>
-              <a:t>Although national governments are primarily responsible for creating and implementing social policies, the EU plays a key role in supporting Member States through funding, developing guidance and fostering relevant partnerships. One of the main actions is inclusive education and training, from early childhood to higher education, focusing on faster recognition of qualifications and language learning, with support from EU funds.</a:t>
-            </a:r>
-          </a:p>
-          <a:p>
-            <a:r>
-              <a:rPr lang="en-US" dirty="0"/>
-              <a:t>SCHOOLS -&gt;</a:t>
-            </a:r>
-          </a:p>
-        </p:txBody>
-      </p:sp>
-    </p:spTree>
-    <p:extLst>
-      <p:ext uri="{BB962C8B-B14F-4D97-AF65-F5344CB8AC3E}">
-        <p14:creationId xmlns:p14="http://schemas.microsoft.com/office/powerpoint/2010/main" val="1913138527"/>
-      </p:ext>
-    </p:extLst>
-  </p:cSld>
-  <p:clrMapOvr>
-    <a:masterClrMapping/>
-  </p:clrMapOvr>
-</p:sld>
-</file>
-
-<file path=ppt/slides/slide13.xml><?xml version="1.0" encoding="utf-8"?>
-<p:sld xmlns:a="http://schemas.openxmlformats.org/drawingml/2006/main" xmlns:r="http://schemas.openxmlformats.org/officeDocument/2006/relationships" xmlns:p="http://schemas.openxmlformats.org/presentationml/2006/main">
-  <p:cSld>
-    <p:spTree>
-      <p:nvGrpSpPr>
-        <p:cNvPr id="1" name=""/>
-        <p:cNvGrpSpPr/>
-        <p:nvPr/>
-      </p:nvGrpSpPr>
-      <p:grpSpPr>
-        <a:xfrm>
-          <a:off x="0" y="0"/>
-          <a:ext cx="0" cy="0"/>
-          <a:chOff x="0" y="0"/>
-          <a:chExt cx="0" cy="0"/>
-        </a:xfrm>
-      </p:grpSpPr>
-      <p:sp>
-        <p:nvSpPr>
-          <p:cNvPr id="2" name="Title 1">
-            <a:extLst>
-              <a:ext uri="{FF2B5EF4-FFF2-40B4-BE49-F238E27FC236}">
-                <a16:creationId xmlns:a16="http://schemas.microsoft.com/office/drawing/2014/main" id="{A2E4C584-D610-DC6C-1AC3-29E96914E1DA}"/>
-              </a:ext>
-            </a:extLst>
-          </p:cNvPr>
-          <p:cNvSpPr>
-            <a:spLocks noGrp="1"/>
-          </p:cNvSpPr>
-          <p:nvPr>
-            <p:ph type="title"/>
-          </p:nvPr>
-        </p:nvSpPr>
-        <p:spPr/>
-        <p:txBody>
-          <a:bodyPr/>
-          <a:lstStyle/>
-          <a:p>
-            <a:endParaRPr lang="en-US"/>
-          </a:p>
-        </p:txBody>
-      </p:sp>
-      <p:sp>
-        <p:nvSpPr>
-          <p:cNvPr id="3" name="Content Placeholder 2">
-            <a:extLst>
-              <a:ext uri="{FF2B5EF4-FFF2-40B4-BE49-F238E27FC236}">
-                <a16:creationId xmlns:a16="http://schemas.microsoft.com/office/drawing/2014/main" id="{C9EBC802-568C-748F-FACB-2F2C338A875B}"/>
-              </a:ext>
-            </a:extLst>
-          </p:cNvPr>
-          <p:cNvSpPr>
-            <a:spLocks noGrp="1"/>
-          </p:cNvSpPr>
-          <p:nvPr>
-            <p:ph idx="1"/>
-          </p:nvPr>
-        </p:nvSpPr>
-        <p:spPr/>
-        <p:txBody>
-          <a:bodyPr>
-            <a:normAutofit fontScale="92500" lnSpcReduction="20000"/>
-          </a:bodyPr>
-          <a:lstStyle/>
-          <a:p>
-            <a:r>
-              <a:rPr lang="en-US" dirty="0"/>
-              <a:t>Countries can be divided into three groups, based on students’ responses in 2012. In a first group, which includes the United Kingdom and the United States, first-generation immigrant students expressed a stronger sense of belonging at school than other students, while students without an immigrant background and </a:t>
-            </a:r>
-            <a:r>
-              <a:rPr lang="en-US" dirty="0" err="1"/>
-              <a:t>secondgeneration</a:t>
-            </a:r>
-            <a:r>
-              <a:rPr lang="en-US" dirty="0"/>
-              <a:t> immigrant students expressed a similar sense of belonging. In a second group of countries, which includes Argentina, Denmark, France and Mexico, second-generation immigrant students feel most alienated in their schools and have less of a sense of belonging than students without an immigrant background and first-generation immigrant students. In a third group of countries, which includes Italy, Norway, Spain, Sweden and Switzerland, integration appears to be progressive, with second-generation immigrant students reporting a similar or almost similar sense of belonging at school as students without an immigrant background, and first-generation students reporting less of a sense of belonging</a:t>
-            </a:r>
-          </a:p>
-        </p:txBody>
-      </p:sp>
-    </p:spTree>
-    <p:extLst>
-      <p:ext uri="{BB962C8B-B14F-4D97-AF65-F5344CB8AC3E}">
-        <p14:creationId xmlns:p14="http://schemas.microsoft.com/office/powerpoint/2010/main" val="4110188664"/>
-      </p:ext>
-    </p:extLst>
-  </p:cSld>
-  <p:clrMapOvr>
-    <a:masterClrMapping/>
-  </p:clrMapOvr>
-</p:sld>
-</file>
-
-<file path=ppt/slides/slide14.xml><?xml version="1.0" encoding="utf-8"?>
-<p:sld xmlns:a="http://schemas.openxmlformats.org/drawingml/2006/main" xmlns:r="http://schemas.openxmlformats.org/officeDocument/2006/relationships" xmlns:p="http://schemas.openxmlformats.org/presentationml/2006/main">
-  <p:cSld>
-    <p:spTree>
-      <p:nvGrpSpPr>
-        <p:cNvPr id="1" name=""/>
-        <p:cNvGrpSpPr/>
-        <p:nvPr/>
-      </p:nvGrpSpPr>
-      <p:grpSpPr>
-        <a:xfrm>
-          <a:off x="0" y="0"/>
-          <a:ext cx="0" cy="0"/>
-          <a:chOff x="0" y="0"/>
-          <a:chExt cx="0" cy="0"/>
-        </a:xfrm>
-      </p:grpSpPr>
-      <p:sp>
-        <p:nvSpPr>
-          <p:cNvPr id="2" name="Title 1">
-            <a:extLst>
-              <a:ext uri="{FF2B5EF4-FFF2-40B4-BE49-F238E27FC236}">
-                <a16:creationId xmlns:a16="http://schemas.microsoft.com/office/drawing/2014/main" id="{1A400667-CC35-A958-8091-BA7FE7014001}"/>
-              </a:ext>
-            </a:extLst>
-          </p:cNvPr>
-          <p:cNvSpPr>
-            <a:spLocks noGrp="1"/>
-          </p:cNvSpPr>
-          <p:nvPr>
-            <p:ph type="title"/>
-          </p:nvPr>
-        </p:nvSpPr>
-        <p:spPr/>
-        <p:txBody>
-          <a:bodyPr/>
-          <a:lstStyle/>
-          <a:p>
-            <a:endParaRPr lang="en-US"/>
-          </a:p>
-        </p:txBody>
-      </p:sp>
-      <p:sp>
-        <p:nvSpPr>
-          <p:cNvPr id="3" name="Content Placeholder 2">
-            <a:extLst>
-              <a:ext uri="{FF2B5EF4-FFF2-40B4-BE49-F238E27FC236}">
-                <a16:creationId xmlns:a16="http://schemas.microsoft.com/office/drawing/2014/main" id="{4DF6EBF6-1FB3-C110-2247-E8FF451F1209}"/>
-              </a:ext>
-            </a:extLst>
-          </p:cNvPr>
-          <p:cNvSpPr>
-            <a:spLocks noGrp="1"/>
-          </p:cNvSpPr>
-          <p:nvPr>
-            <p:ph idx="1"/>
-          </p:nvPr>
-        </p:nvSpPr>
-        <p:spPr/>
-        <p:txBody>
-          <a:bodyPr>
-            <a:normAutofit fontScale="85000" lnSpcReduction="20000"/>
-          </a:bodyPr>
-          <a:lstStyle/>
-          <a:p>
-            <a:r>
-              <a:rPr lang="en-US" dirty="0"/>
-              <a:t>When they move to a new country, many immigrants tend to settle in </a:t>
-            </a:r>
-            <a:r>
-              <a:rPr lang="en-US" dirty="0" err="1"/>
-              <a:t>neighbourhoods</a:t>
-            </a:r>
-            <a:r>
-              <a:rPr lang="en-US" dirty="0"/>
-              <a:t> with other immigrants, often from the same country of origin and of the same socio-economic status. They may decide to do this as a way to build a network of people who share their culture or their experience as migrants and who also may be able to help newly arrived migrants make their way through administrative procedures and perhaps even find work. But they may also move to these areas because of socioeconomic deprivation, which limits the range of areas where they can relocate. Similarly, immigrant students tend to be concentrated in the same schools, sometimes because they live in the same </a:t>
-            </a:r>
-            <a:r>
-              <a:rPr lang="en-US" dirty="0" err="1"/>
-              <a:t>neighbourhoods</a:t>
-            </a:r>
-            <a:r>
-              <a:rPr lang="en-US" dirty="0"/>
-              <a:t>, but sometimes because school systems group them together, whether or not they are </a:t>
-            </a:r>
-            <a:r>
-              <a:rPr lang="en-US" dirty="0" err="1"/>
-              <a:t>neighbours</a:t>
-            </a:r>
-            <a:r>
-              <a:rPr lang="en-US" dirty="0"/>
-              <a:t>, or because they show similar performance patterns. Figure 6 shows that many students with an immigrant background attend schools where the proportion of other immigrant students is large; in other words, in many countries, immigrant students tend to be concentrated in the same schools.</a:t>
-            </a:r>
-          </a:p>
-        </p:txBody>
-      </p:sp>
-    </p:spTree>
-    <p:extLst>
-      <p:ext uri="{BB962C8B-B14F-4D97-AF65-F5344CB8AC3E}">
-        <p14:creationId xmlns:p14="http://schemas.microsoft.com/office/powerpoint/2010/main" val="2391764133"/>
-      </p:ext>
-    </p:extLst>
-  </p:cSld>
-  <p:clrMapOvr>
-    <a:masterClrMapping/>
-  </p:clrMapOvr>
-</p:sld>
-</file>
-
-<file path=ppt/slides/slide15.xml><?xml version="1.0" encoding="utf-8"?>
-<p:sld xmlns:a="http://schemas.openxmlformats.org/drawingml/2006/main" xmlns:r="http://schemas.openxmlformats.org/officeDocument/2006/relationships" xmlns:p="http://schemas.openxmlformats.org/presentationml/2006/main">
-  <p:cSld>
-    <p:spTree>
-      <p:nvGrpSpPr>
-        <p:cNvPr id="1" name=""/>
-        <p:cNvGrpSpPr/>
-        <p:nvPr/>
-      </p:nvGrpSpPr>
-      <p:grpSpPr>
-        <a:xfrm>
-          <a:off x="0" y="0"/>
-          <a:ext cx="0" cy="0"/>
-          <a:chOff x="0" y="0"/>
-          <a:chExt cx="0" cy="0"/>
-        </a:xfrm>
-      </p:grpSpPr>
-      <p:sp>
-        <p:nvSpPr>
-          <p:cNvPr id="2" name="Title 1">
-            <a:extLst>
-              <a:ext uri="{FF2B5EF4-FFF2-40B4-BE49-F238E27FC236}">
-                <a16:creationId xmlns:a16="http://schemas.microsoft.com/office/drawing/2014/main" id="{1DF524F0-77B4-A939-9919-600C1EECCCA5}"/>
-              </a:ext>
-            </a:extLst>
-          </p:cNvPr>
-          <p:cNvSpPr>
-            <a:spLocks noGrp="1"/>
-          </p:cNvSpPr>
-          <p:nvPr>
-            <p:ph type="title"/>
-          </p:nvPr>
-        </p:nvSpPr>
-        <p:spPr/>
-        <p:txBody>
-          <a:bodyPr/>
-          <a:lstStyle/>
-          <a:p>
-            <a:endParaRPr lang="en-US"/>
-          </a:p>
-        </p:txBody>
-      </p:sp>
-      <p:sp>
-        <p:nvSpPr>
-          <p:cNvPr id="3" name="Content Placeholder 2">
-            <a:extLst>
-              <a:ext uri="{FF2B5EF4-FFF2-40B4-BE49-F238E27FC236}">
-                <a16:creationId xmlns:a16="http://schemas.microsoft.com/office/drawing/2014/main" id="{E4E4B609-0F4C-9A23-6D91-6A2D28464106}"/>
-              </a:ext>
-            </a:extLst>
-          </p:cNvPr>
-          <p:cNvSpPr>
-            <a:spLocks noGrp="1"/>
-          </p:cNvSpPr>
-          <p:nvPr>
-            <p:ph idx="1"/>
-          </p:nvPr>
-        </p:nvSpPr>
-        <p:spPr/>
-        <p:txBody>
-          <a:bodyPr/>
-          <a:lstStyle/>
-          <a:p>
-            <a:pPr>
-              <a:lnSpc>
-                <a:spcPct val="107000"/>
-              </a:lnSpc>
-              <a:spcAft>
-                <a:spcPts val="800"/>
-              </a:spcAft>
-            </a:pPr>
-            <a:r>
-              <a:rPr lang="en-US" sz="1800" dirty="0">
-                <a:effectLst/>
-                <a:latin typeface="Calibri" panose="020F0502020204030204" pitchFamily="34" charset="0"/>
-                <a:ea typeface="Calibri" panose="020F0502020204030204" pitchFamily="34" charset="0"/>
-                <a:cs typeface="Times New Roman" panose="02020603050405020304" pitchFamily="18" charset="0"/>
-              </a:rPr>
-              <a:t> </a:t>
-            </a:r>
-          </a:p>
-          <a:p>
-            <a:pPr>
-              <a:lnSpc>
-                <a:spcPct val="107000"/>
-              </a:lnSpc>
-              <a:spcAft>
-                <a:spcPts val="800"/>
-              </a:spcAft>
-            </a:pPr>
-            <a:r>
-              <a:rPr lang="en-US" sz="1800" dirty="0">
-                <a:effectLst/>
-                <a:latin typeface="Calibri" panose="020F0502020204030204" pitchFamily="34" charset="0"/>
-                <a:ea typeface="Calibri" panose="020F0502020204030204" pitchFamily="34" charset="0"/>
-                <a:cs typeface="Times New Roman" panose="02020603050405020304" pitchFamily="18" charset="0"/>
-              </a:rPr>
-              <a:t>The data in the table under Figure 2.2A show that, on 1 January 2002 in the majority of countries, the foreign population was recorded as between 2.5 % and 9 % of the total population. This applied to Belgium, Denmark, Germany, Greece, Spain, France, Ireland, Italy, Cyprus, the Netherlands, Austria, Sweden, the United Kingdom, Iceland and Norway. The situation in the other countries was markedly different. The proportion of the foreign population recorded in the total population was 20 % in Estonia and Latvia – as a result of the size of their minority population of Russian origin (many of whom were not Estonian or Latvian nationals) – Luxembourg and Liechtenstein, whereas in Hungary, Lithuania, Portugal, Slovenia and Finland, the foreign population accounted for under 2.5 % of the total population.</a:t>
-            </a:r>
-          </a:p>
-          <a:p>
-            <a:endParaRPr lang="en-US" dirty="0"/>
-          </a:p>
-        </p:txBody>
-      </p:sp>
-    </p:spTree>
-    <p:extLst>
-      <p:ext uri="{BB962C8B-B14F-4D97-AF65-F5344CB8AC3E}">
-        <p14:creationId xmlns:p14="http://schemas.microsoft.com/office/powerpoint/2010/main" val="3170383003"/>
-      </p:ext>
-    </p:extLst>
-  </p:cSld>
-  <p:clrMapOvr>
-    <a:masterClrMapping/>
   </p:clrMapOvr>
 </p:sld>
 </file>
@@ -5369,8 +4062,8 @@
         </p:nvSpPr>
         <p:spPr>
           <a:xfrm>
-            <a:off x="1188720" y="1090982"/>
-            <a:ext cx="5160930" cy="1290275"/>
+            <a:off x="1045964" y="702082"/>
+            <a:ext cx="5400000" cy="1800000"/>
           </a:xfrm>
         </p:spPr>
         <p:txBody>
@@ -5384,7 +4077,7 @@
               <a:buChar char="•"/>
             </a:pPr>
             <a:r>
-              <a:rPr lang="en-US" sz="1800" dirty="0">
+              <a:rPr lang="en-US" sz="2400" dirty="0">
                 <a:effectLst/>
                 <a:latin typeface="Calibri" panose="020F0502020204030204" pitchFamily="34" charset="0"/>
                 <a:ea typeface="Calibri" panose="020F0502020204030204" pitchFamily="34" charset="0"/>
@@ -5393,20 +4086,17 @@
               <a:t>How do immigrant students face up when compared to native students?</a:t>
             </a:r>
             <a:br>
-              <a:rPr lang="en-US" sz="1600" dirty="0">
+              <a:rPr lang="en-US" sz="2400" dirty="0">
                 <a:effectLst/>
                 <a:latin typeface="Calibri" panose="020F0502020204030204" pitchFamily="34" charset="0"/>
                 <a:ea typeface="Calibri" panose="020F0502020204030204" pitchFamily="34" charset="0"/>
                 <a:cs typeface="Times New Roman" panose="02020603050405020304" pitchFamily="18" charset="0"/>
               </a:rPr>
             </a:br>
-            <a:endParaRPr lang="en-US" sz="1600" kern="1200" dirty="0">
+            <a:endParaRPr lang="en-US" sz="2400" kern="1200" dirty="0">
               <a:solidFill>
                 <a:schemeClr val="tx1"/>
               </a:solidFill>
-              <a:latin typeface="+mj-lt"/>
-              <a:ea typeface="+mj-ea"/>
-              <a:cs typeface="+mj-cs"/>
             </a:endParaRPr>
           </a:p>
         </p:txBody>
@@ -6845,8 +5535,8 @@
         </p:nvSpPr>
         <p:spPr>
           <a:xfrm>
-            <a:off x="1195622" y="4577282"/>
-            <a:ext cx="5016642" cy="1276763"/>
+            <a:off x="1044528" y="4321315"/>
+            <a:ext cx="5400000" cy="1800000"/>
           </a:xfrm>
         </p:spPr>
         <p:txBody>
@@ -6856,7 +5546,7 @@
           <a:lstStyle/>
           <a:p>
             <a:r>
-              <a:rPr lang="en-US" sz="1800" dirty="0">
+              <a:rPr lang="en-US" sz="2400" dirty="0">
                 <a:effectLst/>
                 <a:latin typeface="Calibri" panose="020F0502020204030204" pitchFamily="34" charset="0"/>
                 <a:ea typeface="Calibri" panose="020F0502020204030204" pitchFamily="34" charset="0"/>
@@ -6957,8 +5647,8 @@
         </p:nvSpPr>
         <p:spPr>
           <a:xfrm>
-            <a:off x="1188720" y="1325064"/>
-            <a:ext cx="4506013" cy="923330"/>
+            <a:off x="1043395" y="1025090"/>
+            <a:ext cx="5400000" cy="1800000"/>
           </a:xfrm>
           <a:prstGeom prst="rect">
             <a:avLst/>
@@ -6976,7 +5666,7 @@
               <a:buChar char="•"/>
             </a:pPr>
             <a:r>
-              <a:rPr lang="en-US" sz="1800" dirty="0">
+              <a:rPr lang="en-US" sz="2400" dirty="0">
                 <a:effectLst/>
                 <a:latin typeface="Calibri" panose="020F0502020204030204" pitchFamily="34" charset="0"/>
                 <a:ea typeface="Calibri" panose="020F0502020204030204" pitchFamily="34" charset="0"/>
@@ -7018,7 +5708,7 @@
         </p:blipFill>
         <p:spPr>
           <a:xfrm>
-            <a:off x="6600285" y="3257921"/>
+            <a:off x="6600285" y="3247471"/>
             <a:ext cx="5590191" cy="3608057"/>
           </a:xfrm>
           <a:prstGeom prst="rect">
@@ -7040,8 +5730,8 @@
         </p:nvSpPr>
         <p:spPr>
           <a:xfrm>
-            <a:off x="1188720" y="4663990"/>
-            <a:ext cx="4937233" cy="1200329"/>
+            <a:off x="1043395" y="4458927"/>
+            <a:ext cx="5400000" cy="1800000"/>
           </a:xfrm>
           <a:prstGeom prst="rect">
             <a:avLst/>
@@ -7059,7 +5749,7 @@
               <a:buChar char="•"/>
             </a:pPr>
             <a:r>
-              <a:rPr lang="en-US" sz="1800" dirty="0">
+              <a:rPr lang="en-US" sz="2400" dirty="0">
                 <a:effectLst/>
                 <a:latin typeface="Calibri" panose="020F0502020204030204" pitchFamily="34" charset="0"/>
                 <a:ea typeface="Calibri" panose="020F0502020204030204" pitchFamily="34" charset="0"/>
@@ -7067,7 +5757,7 @@
               </a:rPr>
               <a:t>How can we take example from the best European countries with respect to integration to help these students?</a:t>
             </a:r>
-            <a:endParaRPr lang="it-IT" dirty="0"/>
+            <a:endParaRPr lang="it-IT" sz="2400" dirty="0"/>
           </a:p>
           <a:p>
             <a:pPr marL="285750" indent="-285750">
@@ -7075,6 +5765,58 @@
               <a:buChar char="•"/>
             </a:pPr>
             <a:endParaRPr lang="en-GB" dirty="0"/>
+          </a:p>
+        </p:txBody>
+      </p:sp>
+      <p:sp>
+        <p:nvSpPr>
+          <p:cNvPr id="2" name="Rectangle 1">
+            <a:extLst>
+              <a:ext uri="{FF2B5EF4-FFF2-40B4-BE49-F238E27FC236}">
+                <a16:creationId xmlns:a16="http://schemas.microsoft.com/office/drawing/2014/main" id="{D6CBA515-E025-ED46-271F-8ACBF76D5EC6}"/>
+              </a:ext>
+            </a:extLst>
+          </p:cNvPr>
+          <p:cNvSpPr/>
+          <p:nvPr/>
+        </p:nvSpPr>
+        <p:spPr>
+          <a:xfrm>
+            <a:off x="930075" y="0"/>
+            <a:ext cx="1536192" cy="423237"/>
+          </a:xfrm>
+          <a:prstGeom prst="rect">
+            <a:avLst/>
+          </a:prstGeom>
+          <a:solidFill>
+            <a:srgbClr val="F2F2F2"/>
+          </a:solidFill>
+          <a:ln>
+            <a:noFill/>
+          </a:ln>
+        </p:spPr>
+        <p:style>
+          <a:lnRef idx="2">
+            <a:schemeClr val="accent1">
+              <a:shade val="50000"/>
+            </a:schemeClr>
+          </a:lnRef>
+          <a:fillRef idx="1">
+            <a:schemeClr val="accent1"/>
+          </a:fillRef>
+          <a:effectRef idx="0">
+            <a:schemeClr val="accent1"/>
+          </a:effectRef>
+          <a:fontRef idx="minor">
+            <a:schemeClr val="lt1"/>
+          </a:fontRef>
+        </p:style>
+        <p:txBody>
+          <a:bodyPr rtlCol="0" anchor="ctr"/>
+          <a:lstStyle/>
+          <a:p>
+            <a:pPr algn="ctr"/>
+            <a:endParaRPr lang="en-US"/>
           </a:p>
         </p:txBody>
       </p:sp>
@@ -8137,74 +6879,25 @@
         </p:nvSpPr>
         <p:spPr>
           <a:xfrm>
-            <a:off x="1145136" y="1028700"/>
-            <a:ext cx="9947305" cy="1090657"/>
+            <a:off x="1782936" y="1452592"/>
+            <a:ext cx="8626129" cy="661542"/>
           </a:xfrm>
         </p:spPr>
         <p:txBody>
           <a:bodyPr vert="horz" lIns="91440" tIns="45720" rIns="91440" bIns="45720" rtlCol="0" anchor="b">
-            <a:normAutofit fontScale="90000"/>
+            <a:noAutofit/>
           </a:bodyPr>
           <a:lstStyle/>
           <a:p>
             <a:pPr algn="ctr"/>
             <a:r>
-              <a:rPr lang="en-US" sz="3600" dirty="0">
+              <a:rPr lang="en-US" sz="4000" b="1" dirty="0">
                 <a:solidFill>
                   <a:srgbClr val="FFFFFF"/>
                 </a:solidFill>
               </a:rPr>
               <a:t>Come and have a look at what we found! </a:t>
             </a:r>
-            <a:br>
-              <a:rPr lang="en-US" sz="4800" dirty="0">
-                <a:solidFill>
-                  <a:srgbClr val="FFFFFF"/>
-                </a:solidFill>
-              </a:rPr>
-            </a:br>
-            <a:endParaRPr lang="en-US" sz="4800" dirty="0">
-              <a:solidFill>
-                <a:srgbClr val="FFFFFF"/>
-              </a:solidFill>
-            </a:endParaRPr>
-          </a:p>
-        </p:txBody>
-      </p:sp>
-      <p:sp>
-        <p:nvSpPr>
-          <p:cNvPr id="4" name="Text Placeholder 3">
-            <a:extLst>
-              <a:ext uri="{FF2B5EF4-FFF2-40B4-BE49-F238E27FC236}">
-                <a16:creationId xmlns:a16="http://schemas.microsoft.com/office/drawing/2014/main" id="{E647CE0E-744B-E1EA-2910-4567B8A9FFC9}"/>
-              </a:ext>
-            </a:extLst>
-          </p:cNvPr>
-          <p:cNvSpPr>
-            <a:spLocks noGrp="1"/>
-          </p:cNvSpPr>
-          <p:nvPr>
-            <p:ph type="body" sz="half" idx="2"/>
-          </p:nvPr>
-        </p:nvSpPr>
-        <p:spPr>
-          <a:xfrm>
-            <a:off x="1524000" y="2214188"/>
-            <a:ext cx="9144000" cy="492440"/>
-          </a:xfrm>
-        </p:spPr>
-        <p:txBody>
-          <a:bodyPr vert="horz" lIns="91440" tIns="45720" rIns="91440" bIns="45720" rtlCol="0">
-            <a:normAutofit/>
-          </a:bodyPr>
-          <a:lstStyle/>
-          <a:p>
-            <a:pPr algn="ctr"/>
-            <a:endParaRPr lang="en-US" sz="2000" dirty="0">
-              <a:solidFill>
-                <a:srgbClr val="FFFFFF"/>
-              </a:solidFill>
-            </a:endParaRPr>
           </a:p>
         </p:txBody>
       </p:sp>
@@ -8421,3295 +7114,6 @@
     <p:extLst>
       <p:ext uri="{BB962C8B-B14F-4D97-AF65-F5344CB8AC3E}">
         <p14:creationId xmlns:p14="http://schemas.microsoft.com/office/powerpoint/2010/main" val="2996198213"/>
-      </p:ext>
-    </p:extLst>
-  </p:cSld>
-  <p:clrMapOvr>
-    <a:masterClrMapping/>
-  </p:clrMapOvr>
-</p:sld>
-</file>
-
-<file path=ppt/slides/slide4.xml><?xml version="1.0" encoding="utf-8"?>
-<p:sld xmlns:a="http://schemas.openxmlformats.org/drawingml/2006/main" xmlns:r="http://schemas.openxmlformats.org/officeDocument/2006/relationships" xmlns:p="http://schemas.openxmlformats.org/presentationml/2006/main">
-  <p:cSld>
-    <p:bg>
-      <p:bgPr>
-        <a:solidFill>
-          <a:schemeClr val="bg1"/>
-        </a:solidFill>
-        <a:effectLst/>
-      </p:bgPr>
-    </p:bg>
-    <p:spTree>
-      <p:nvGrpSpPr>
-        <p:cNvPr id="1" name=""/>
-        <p:cNvGrpSpPr/>
-        <p:nvPr/>
-      </p:nvGrpSpPr>
-      <p:grpSpPr>
-        <a:xfrm>
-          <a:off x="0" y="0"/>
-          <a:ext cx="0" cy="0"/>
-          <a:chOff x="0" y="0"/>
-          <a:chExt cx="0" cy="0"/>
-        </a:xfrm>
-      </p:grpSpPr>
-      <p:sp useBgFill="1">
-        <p:nvSpPr>
-          <p:cNvPr id="41" name="Rectangle 40">
-            <a:extLst>
-              <a:ext uri="{FF2B5EF4-FFF2-40B4-BE49-F238E27FC236}">
-                <a16:creationId xmlns:a16="http://schemas.microsoft.com/office/drawing/2014/main" id="{3AFE8227-C443-417B-BA91-520EB1EF4559}"/>
-              </a:ext>
-              <a:ext uri="{C183D7F6-B498-43B3-948B-1728B52AA6E4}">
-                <adec:decorative xmlns:adec="http://schemas.microsoft.com/office/drawing/2017/decorative" val="1"/>
-              </a:ext>
-            </a:extLst>
-          </p:cNvPr>
-          <p:cNvSpPr>
-            <a:spLocks noGrp="1" noRot="1" noChangeAspect="1" noMove="1" noResize="1" noEditPoints="1" noAdjustHandles="1" noChangeArrowheads="1" noChangeShapeType="1" noTextEdit="1"/>
-          </p:cNvSpPr>
-          <p:nvPr>
-            <p:extLst>
-              <p:ext uri="{386F3935-93C4-4BCD-93E2-E3B085C9AB24}">
-                <p16:designElem xmlns:p16="http://schemas.microsoft.com/office/powerpoint/2015/main" val="1"/>
-              </p:ext>
-            </p:extLst>
-          </p:nvPr>
-        </p:nvSpPr>
-        <p:spPr>
-          <a:xfrm>
-            <a:off x="0" y="2"/>
-            <a:ext cx="12192000" cy="6857997"/>
-          </a:xfrm>
-          <a:prstGeom prst="rect">
-            <a:avLst/>
-          </a:prstGeom>
-          <a:ln>
-            <a:noFill/>
-          </a:ln>
-        </p:spPr>
-        <p:style>
-          <a:lnRef idx="2">
-            <a:schemeClr val="accent1">
-              <a:shade val="50000"/>
-            </a:schemeClr>
-          </a:lnRef>
-          <a:fillRef idx="1">
-            <a:schemeClr val="accent1"/>
-          </a:fillRef>
-          <a:effectRef idx="0">
-            <a:schemeClr val="accent1"/>
-          </a:effectRef>
-          <a:fontRef idx="minor">
-            <a:schemeClr val="lt1"/>
-          </a:fontRef>
-        </p:style>
-        <p:txBody>
-          <a:bodyPr rtlCol="0" anchor="ctr"/>
-          <a:lstStyle/>
-          <a:p>
-            <a:pPr algn="ctr"/>
-            <a:endParaRPr lang="en-US"/>
-          </a:p>
-        </p:txBody>
-      </p:sp>
-      <p:sp>
-        <p:nvSpPr>
-          <p:cNvPr id="2" name="Title 1">
-            <a:extLst>
-              <a:ext uri="{FF2B5EF4-FFF2-40B4-BE49-F238E27FC236}">
-                <a16:creationId xmlns:a16="http://schemas.microsoft.com/office/drawing/2014/main" id="{C309FE43-4FBF-AFF0-5B8D-566C45ABB2F0}"/>
-              </a:ext>
-            </a:extLst>
-          </p:cNvPr>
-          <p:cNvSpPr>
-            <a:spLocks noGrp="1"/>
-          </p:cNvSpPr>
-          <p:nvPr>
-            <p:ph type="title"/>
-          </p:nvPr>
-        </p:nvSpPr>
-        <p:spPr>
-          <a:xfrm>
-            <a:off x="8568795" y="226861"/>
-            <a:ext cx="3143307" cy="1611668"/>
-          </a:xfrm>
-        </p:spPr>
-        <p:txBody>
-          <a:bodyPr vert="horz" lIns="91440" tIns="45720" rIns="91440" bIns="45720" rtlCol="0" anchor="b">
-            <a:normAutofit/>
-          </a:bodyPr>
-          <a:lstStyle/>
-          <a:p>
-            <a:r>
-              <a:rPr lang="en-US" sz="4000" dirty="0"/>
-              <a:t>Our methodology</a:t>
-            </a:r>
-          </a:p>
-        </p:txBody>
-      </p:sp>
-      <p:pic>
-        <p:nvPicPr>
-          <p:cNvPr id="10" name="Content Placeholder 9" descr="Diagram&#10;&#10;Description automatically generated">
-            <a:extLst>
-              <a:ext uri="{FF2B5EF4-FFF2-40B4-BE49-F238E27FC236}">
-                <a16:creationId xmlns:a16="http://schemas.microsoft.com/office/drawing/2014/main" id="{1D8CC46C-C71A-3386-BA04-D2FB0618272E}"/>
-              </a:ext>
-            </a:extLst>
-          </p:cNvPr>
-          <p:cNvPicPr>
-            <a:picLocks noGrp="1" noChangeAspect="1"/>
-          </p:cNvPicPr>
-          <p:nvPr>
-            <p:ph idx="1"/>
-          </p:nvPr>
-        </p:nvPicPr>
-        <p:blipFill rotWithShape="1">
-          <a:blip r:embed="rId2">
-            <a:extLst>
-              <a:ext uri="{28A0092B-C50C-407E-A947-70E740481C1C}">
-                <a14:useLocalDpi xmlns:a14="http://schemas.microsoft.com/office/drawing/2010/main" val="0"/>
-              </a:ext>
-            </a:extLst>
-          </a:blip>
-          <a:srcRect l="8878" r="19888" b="-1"/>
-          <a:stretch/>
-        </p:blipFill>
-        <p:spPr>
-          <a:xfrm>
-            <a:off x="20" y="431"/>
-            <a:ext cx="8115280" cy="6408311"/>
-          </a:xfrm>
-          <a:prstGeom prst="rect">
-            <a:avLst/>
-          </a:prstGeom>
-        </p:spPr>
-      </p:pic>
-      <p:sp>
-        <p:nvSpPr>
-          <p:cNvPr id="4" name="Text Placeholder 3">
-            <a:extLst>
-              <a:ext uri="{FF2B5EF4-FFF2-40B4-BE49-F238E27FC236}">
-                <a16:creationId xmlns:a16="http://schemas.microsoft.com/office/drawing/2014/main" id="{2B9E0D69-7551-6E6B-7915-9C1A955616A1}"/>
-              </a:ext>
-            </a:extLst>
-          </p:cNvPr>
-          <p:cNvSpPr>
-            <a:spLocks noGrp="1"/>
-          </p:cNvSpPr>
-          <p:nvPr>
-            <p:ph type="body" sz="half" idx="2"/>
-          </p:nvPr>
-        </p:nvSpPr>
-        <p:spPr>
-          <a:xfrm>
-            <a:off x="8643193" y="2418408"/>
-            <a:ext cx="2942813" cy="3540265"/>
-          </a:xfrm>
-        </p:spPr>
-        <p:txBody>
-          <a:bodyPr vert="horz" lIns="91440" tIns="45720" rIns="91440" bIns="45720" rtlCol="0">
-            <a:normAutofit/>
-          </a:bodyPr>
-          <a:lstStyle/>
-          <a:p>
-            <a:r>
-              <a:rPr lang="en-US" sz="1700" dirty="0"/>
-              <a:t>During our analysis we used many different techniques that we progressively learned during the course: </a:t>
-            </a:r>
-          </a:p>
-          <a:p>
-            <a:pPr marL="285750" indent="-228600">
-              <a:buFont typeface="Arial" panose="020B0604020202020204" pitchFamily="34" charset="0"/>
-              <a:buChar char="•"/>
-            </a:pPr>
-            <a:r>
-              <a:rPr lang="en-US" sz="1700" dirty="0"/>
-              <a:t>Clustering</a:t>
-            </a:r>
-          </a:p>
-          <a:p>
-            <a:pPr marL="285750" indent="-228600">
-              <a:buFont typeface="Arial" panose="020B0604020202020204" pitchFamily="34" charset="0"/>
-              <a:buChar char="•"/>
-            </a:pPr>
-            <a:r>
-              <a:rPr lang="en-US" sz="1700" dirty="0" err="1"/>
-              <a:t>Manova</a:t>
-            </a:r>
-            <a:endParaRPr lang="en-US" sz="1700" dirty="0"/>
-          </a:p>
-          <a:p>
-            <a:pPr marL="285750" indent="-228600">
-              <a:buFont typeface="Arial" panose="020B0604020202020204" pitchFamily="34" charset="0"/>
-              <a:buChar char="•"/>
-            </a:pPr>
-            <a:r>
-              <a:rPr lang="en-US" sz="1700" dirty="0"/>
-              <a:t>Linear Models</a:t>
-            </a:r>
-          </a:p>
-          <a:p>
-            <a:pPr marL="285750" indent="-228600">
-              <a:buFont typeface="Arial" panose="020B0604020202020204" pitchFamily="34" charset="0"/>
-              <a:buChar char="•"/>
-            </a:pPr>
-            <a:r>
-              <a:rPr lang="en-US" sz="1700" dirty="0"/>
-              <a:t>Linear Mixed Models</a:t>
-            </a:r>
-          </a:p>
-          <a:p>
-            <a:pPr marL="285750" indent="-228600">
-              <a:buFont typeface="Arial" panose="020B0604020202020204" pitchFamily="34" charset="0"/>
-              <a:buChar char="•"/>
-            </a:pPr>
-            <a:r>
-              <a:rPr lang="en-US" sz="1700" dirty="0"/>
-              <a:t>Multinomial Logistic Regression</a:t>
-            </a:r>
-          </a:p>
-          <a:p>
-            <a:pPr marL="285750" indent="-228600">
-              <a:buFont typeface="Arial" panose="020B0604020202020204" pitchFamily="34" charset="0"/>
-              <a:buChar char="•"/>
-            </a:pPr>
-            <a:endParaRPr lang="en-US" sz="1700" dirty="0"/>
-          </a:p>
-        </p:txBody>
-      </p:sp>
-      <p:sp>
-        <p:nvSpPr>
-          <p:cNvPr id="43" name="Rectangle 42">
-            <a:extLst>
-              <a:ext uri="{FF2B5EF4-FFF2-40B4-BE49-F238E27FC236}">
-                <a16:creationId xmlns:a16="http://schemas.microsoft.com/office/drawing/2014/main" id="{907741FC-B544-4A6E-B831-6789D042333D}"/>
-              </a:ext>
-              <a:ext uri="{C183D7F6-B498-43B3-948B-1728B52AA6E4}">
-                <adec:decorative xmlns:adec="http://schemas.microsoft.com/office/drawing/2017/decorative" val="1"/>
-              </a:ext>
-            </a:extLst>
-          </p:cNvPr>
-          <p:cNvSpPr>
-            <a:spLocks noGrp="1" noRot="1" noChangeAspect="1" noMove="1" noResize="1" noEditPoints="1" noAdjustHandles="1" noChangeArrowheads="1" noChangeShapeType="1" noTextEdit="1"/>
-          </p:cNvSpPr>
-          <p:nvPr>
-            <p:extLst>
-              <p:ext uri="{386F3935-93C4-4BCD-93E2-E3B085C9AB24}">
-                <p16:designElem xmlns:p16="http://schemas.microsoft.com/office/powerpoint/2015/main" val="1"/>
-              </p:ext>
-            </p:extLst>
-          </p:nvPr>
-        </p:nvSpPr>
-        <p:spPr>
-          <a:xfrm flipH="1">
-            <a:off x="-1" y="6408741"/>
-            <a:ext cx="12191998" cy="457202"/>
-          </a:xfrm>
-          <a:prstGeom prst="rect">
-            <a:avLst/>
-          </a:prstGeom>
-          <a:gradFill>
-            <a:gsLst>
-              <a:gs pos="34000">
-                <a:srgbClr val="000000">
-                  <a:alpha val="96000"/>
-                </a:srgbClr>
-              </a:gs>
-              <a:gs pos="100000">
-                <a:schemeClr val="accent1"/>
-              </a:gs>
-            </a:gsLst>
-            <a:lin ang="8400000" scaled="0"/>
-          </a:gradFill>
-          <a:ln>
-            <a:noFill/>
-          </a:ln>
-        </p:spPr>
-        <p:style>
-          <a:lnRef idx="2">
-            <a:schemeClr val="accent1">
-              <a:shade val="50000"/>
-            </a:schemeClr>
-          </a:lnRef>
-          <a:fillRef idx="1">
-            <a:schemeClr val="accent1"/>
-          </a:fillRef>
-          <a:effectRef idx="0">
-            <a:schemeClr val="accent1"/>
-          </a:effectRef>
-          <a:fontRef idx="minor">
-            <a:schemeClr val="lt1"/>
-          </a:fontRef>
-        </p:style>
-        <p:txBody>
-          <a:bodyPr rtlCol="0" anchor="ctr"/>
-          <a:lstStyle/>
-          <a:p>
-            <a:pPr algn="ctr"/>
-            <a:endParaRPr lang="en-US"/>
-          </a:p>
-        </p:txBody>
-      </p:sp>
-      <p:sp>
-        <p:nvSpPr>
-          <p:cNvPr id="45" name="Rectangle 44">
-            <a:extLst>
-              <a:ext uri="{FF2B5EF4-FFF2-40B4-BE49-F238E27FC236}">
-                <a16:creationId xmlns:a16="http://schemas.microsoft.com/office/drawing/2014/main" id="{3F0BE7ED-7814-4273-B18A-F26CC0380380}"/>
-              </a:ext>
-              <a:ext uri="{C183D7F6-B498-43B3-948B-1728B52AA6E4}">
-                <adec:decorative xmlns:adec="http://schemas.microsoft.com/office/drawing/2017/decorative" val="1"/>
-              </a:ext>
-            </a:extLst>
-          </p:cNvPr>
-          <p:cNvSpPr>
-            <a:spLocks noGrp="1" noRot="1" noChangeAspect="1" noMove="1" noResize="1" noEditPoints="1" noAdjustHandles="1" noChangeArrowheads="1" noChangeShapeType="1" noTextEdit="1"/>
-          </p:cNvSpPr>
-          <p:nvPr>
-            <p:extLst>
-              <p:ext uri="{386F3935-93C4-4BCD-93E2-E3B085C9AB24}">
-                <p16:designElem xmlns:p16="http://schemas.microsoft.com/office/powerpoint/2015/main" val="1"/>
-              </p:ext>
-            </p:extLst>
-          </p:nvPr>
-        </p:nvSpPr>
-        <p:spPr>
-          <a:xfrm flipH="1">
-            <a:off x="-4" y="6408742"/>
-            <a:ext cx="8115300" cy="449258"/>
-          </a:xfrm>
-          <a:prstGeom prst="rect">
-            <a:avLst/>
-          </a:prstGeom>
-          <a:gradFill>
-            <a:gsLst>
-              <a:gs pos="28000">
-                <a:schemeClr val="accent1">
-                  <a:lumMod val="75000"/>
-                  <a:alpha val="59000"/>
-                </a:schemeClr>
-              </a:gs>
-              <a:gs pos="100000">
-                <a:srgbClr val="000000">
-                  <a:alpha val="70000"/>
-                </a:srgbClr>
-              </a:gs>
-            </a:gsLst>
-            <a:lin ang="11400000" scaled="0"/>
-          </a:gradFill>
-          <a:ln>
-            <a:noFill/>
-          </a:ln>
-        </p:spPr>
-        <p:style>
-          <a:lnRef idx="2">
-            <a:schemeClr val="accent1">
-              <a:shade val="50000"/>
-            </a:schemeClr>
-          </a:lnRef>
-          <a:fillRef idx="1">
-            <a:schemeClr val="accent1"/>
-          </a:fillRef>
-          <a:effectRef idx="0">
-            <a:schemeClr val="accent1"/>
-          </a:effectRef>
-          <a:fontRef idx="minor">
-            <a:schemeClr val="lt1"/>
-          </a:fontRef>
-        </p:style>
-        <p:txBody>
-          <a:bodyPr rtlCol="0" anchor="ctr"/>
-          <a:lstStyle/>
-          <a:p>
-            <a:pPr algn="ctr"/>
-            <a:endParaRPr lang="en-US"/>
-          </a:p>
-        </p:txBody>
-      </p:sp>
-    </p:spTree>
-    <p:extLst>
-      <p:ext uri="{BB962C8B-B14F-4D97-AF65-F5344CB8AC3E}">
-        <p14:creationId xmlns:p14="http://schemas.microsoft.com/office/powerpoint/2010/main" val="3515833001"/>
-      </p:ext>
-    </p:extLst>
-  </p:cSld>
-  <p:clrMapOvr>
-    <a:masterClrMapping/>
-  </p:clrMapOvr>
-</p:sld>
-</file>
-
-<file path=ppt/slides/slide5.xml><?xml version="1.0" encoding="utf-8"?>
-<p:sld xmlns:a="http://schemas.openxmlformats.org/drawingml/2006/main" xmlns:r="http://schemas.openxmlformats.org/officeDocument/2006/relationships" xmlns:p="http://schemas.openxmlformats.org/presentationml/2006/main">
-  <p:cSld>
-    <p:bg>
-      <p:bgPr>
-        <a:solidFill>
-          <a:schemeClr val="bg1"/>
-        </a:solidFill>
-        <a:effectLst/>
-      </p:bgPr>
-    </p:bg>
-    <p:spTree>
-      <p:nvGrpSpPr>
-        <p:cNvPr id="1" name=""/>
-        <p:cNvGrpSpPr/>
-        <p:nvPr/>
-      </p:nvGrpSpPr>
-      <p:grpSpPr>
-        <a:xfrm>
-          <a:off x="0" y="0"/>
-          <a:ext cx="0" cy="0"/>
-          <a:chOff x="0" y="0"/>
-          <a:chExt cx="0" cy="0"/>
-        </a:xfrm>
-      </p:grpSpPr>
-      <p:sp useBgFill="1">
-        <p:nvSpPr>
-          <p:cNvPr id="19" name="Rectangle 18">
-            <a:extLst>
-              <a:ext uri="{FF2B5EF4-FFF2-40B4-BE49-F238E27FC236}">
-                <a16:creationId xmlns:a16="http://schemas.microsoft.com/office/drawing/2014/main" id="{3AFE8227-C443-417B-BA91-520EB1EF4559}"/>
-              </a:ext>
-              <a:ext uri="{C183D7F6-B498-43B3-948B-1728B52AA6E4}">
-                <adec:decorative xmlns:adec="http://schemas.microsoft.com/office/drawing/2017/decorative" val="1"/>
-              </a:ext>
-            </a:extLst>
-          </p:cNvPr>
-          <p:cNvSpPr>
-            <a:spLocks noGrp="1" noRot="1" noChangeAspect="1" noMove="1" noResize="1" noEditPoints="1" noAdjustHandles="1" noChangeArrowheads="1" noChangeShapeType="1" noTextEdit="1"/>
-          </p:cNvSpPr>
-          <p:nvPr>
-            <p:extLst>
-              <p:ext uri="{386F3935-93C4-4BCD-93E2-E3B085C9AB24}">
-                <p16:designElem xmlns:p16="http://schemas.microsoft.com/office/powerpoint/2015/main" val="1"/>
-              </p:ext>
-            </p:extLst>
-          </p:nvPr>
-        </p:nvSpPr>
-        <p:spPr>
-          <a:xfrm>
-            <a:off x="0" y="2"/>
-            <a:ext cx="12192000" cy="6857997"/>
-          </a:xfrm>
-          <a:prstGeom prst="rect">
-            <a:avLst/>
-          </a:prstGeom>
-          <a:ln>
-            <a:noFill/>
-          </a:ln>
-        </p:spPr>
-        <p:style>
-          <a:lnRef idx="2">
-            <a:schemeClr val="accent1">
-              <a:shade val="50000"/>
-            </a:schemeClr>
-          </a:lnRef>
-          <a:fillRef idx="1">
-            <a:schemeClr val="accent1"/>
-          </a:fillRef>
-          <a:effectRef idx="0">
-            <a:schemeClr val="accent1"/>
-          </a:effectRef>
-          <a:fontRef idx="minor">
-            <a:schemeClr val="lt1"/>
-          </a:fontRef>
-        </p:style>
-        <p:txBody>
-          <a:bodyPr rtlCol="0" anchor="ctr"/>
-          <a:lstStyle/>
-          <a:p>
-            <a:pPr algn="ctr"/>
-            <a:endParaRPr lang="en-US"/>
-          </a:p>
-        </p:txBody>
-      </p:sp>
-      <p:sp>
-        <p:nvSpPr>
-          <p:cNvPr id="2" name="Title 1">
-            <a:extLst>
-              <a:ext uri="{FF2B5EF4-FFF2-40B4-BE49-F238E27FC236}">
-                <a16:creationId xmlns:a16="http://schemas.microsoft.com/office/drawing/2014/main" id="{3A531BF5-8D61-849F-594C-7CB0372E566E}"/>
-              </a:ext>
-            </a:extLst>
-          </p:cNvPr>
-          <p:cNvSpPr>
-            <a:spLocks noGrp="1"/>
-          </p:cNvSpPr>
-          <p:nvPr>
-            <p:ph type="title"/>
-          </p:nvPr>
-        </p:nvSpPr>
-        <p:spPr>
-          <a:xfrm>
-            <a:off x="8643193" y="489507"/>
-            <a:ext cx="3091607" cy="1655483"/>
-          </a:xfrm>
-        </p:spPr>
-        <p:txBody>
-          <a:bodyPr vert="horz" lIns="91440" tIns="45720" rIns="91440" bIns="45720" rtlCol="0" anchor="b">
-            <a:normAutofit/>
-          </a:bodyPr>
-          <a:lstStyle/>
-          <a:p>
-            <a:endParaRPr lang="en-US" sz="4000"/>
-          </a:p>
-        </p:txBody>
-      </p:sp>
-      <p:pic>
-        <p:nvPicPr>
-          <p:cNvPr id="6" name="Content Placeholder 5" descr="Angled shot of pen on a graph">
-            <a:extLst>
-              <a:ext uri="{FF2B5EF4-FFF2-40B4-BE49-F238E27FC236}">
-                <a16:creationId xmlns:a16="http://schemas.microsoft.com/office/drawing/2014/main" id="{A28CFC92-DDA5-99B3-6B39-70CC7428AED6}"/>
-              </a:ext>
-            </a:extLst>
-          </p:cNvPr>
-          <p:cNvPicPr>
-            <a:picLocks noGrp="1" noChangeAspect="1"/>
-          </p:cNvPicPr>
-          <p:nvPr>
-            <p:ph sz="half" idx="1"/>
-          </p:nvPr>
-        </p:nvPicPr>
-        <p:blipFill rotWithShape="1">
-          <a:blip r:embed="rId2">
-            <a:extLst>
-              <a:ext uri="{28A0092B-C50C-407E-A947-70E740481C1C}">
-                <a14:useLocalDpi xmlns:a14="http://schemas.microsoft.com/office/drawing/2010/main" val="0"/>
-              </a:ext>
-            </a:extLst>
-          </a:blip>
-          <a:srcRect r="15469" b="-1"/>
-          <a:stretch/>
-        </p:blipFill>
-        <p:spPr>
-          <a:xfrm>
-            <a:off x="20" y="431"/>
-            <a:ext cx="8115280" cy="6408311"/>
-          </a:xfrm>
-          <a:prstGeom prst="rect">
-            <a:avLst/>
-          </a:prstGeom>
-        </p:spPr>
-      </p:pic>
-      <p:sp>
-        <p:nvSpPr>
-          <p:cNvPr id="14" name="Content Placeholder 13">
-            <a:extLst>
-              <a:ext uri="{FF2B5EF4-FFF2-40B4-BE49-F238E27FC236}">
-                <a16:creationId xmlns:a16="http://schemas.microsoft.com/office/drawing/2014/main" id="{5918006B-DEE2-6D44-12D3-348B612955F3}"/>
-              </a:ext>
-            </a:extLst>
-          </p:cNvPr>
-          <p:cNvSpPr>
-            <a:spLocks noGrp="1"/>
-          </p:cNvSpPr>
-          <p:nvPr>
-            <p:ph sz="half" idx="2"/>
-          </p:nvPr>
-        </p:nvSpPr>
-        <p:spPr>
-          <a:xfrm>
-            <a:off x="8643193" y="2418408"/>
-            <a:ext cx="2942813" cy="3540265"/>
-          </a:xfrm>
-        </p:spPr>
-        <p:txBody>
-          <a:bodyPr vert="horz" lIns="91440" tIns="45720" rIns="91440" bIns="45720" rtlCol="0">
-            <a:normAutofit/>
-          </a:bodyPr>
-          <a:lstStyle/>
-          <a:p>
-            <a:endParaRPr lang="en-US" sz="2000"/>
-          </a:p>
-        </p:txBody>
-      </p:sp>
-      <p:sp>
-        <p:nvSpPr>
-          <p:cNvPr id="21" name="Rectangle 20">
-            <a:extLst>
-              <a:ext uri="{FF2B5EF4-FFF2-40B4-BE49-F238E27FC236}">
-                <a16:creationId xmlns:a16="http://schemas.microsoft.com/office/drawing/2014/main" id="{907741FC-B544-4A6E-B831-6789D042333D}"/>
-              </a:ext>
-              <a:ext uri="{C183D7F6-B498-43B3-948B-1728B52AA6E4}">
-                <adec:decorative xmlns:adec="http://schemas.microsoft.com/office/drawing/2017/decorative" val="1"/>
-              </a:ext>
-            </a:extLst>
-          </p:cNvPr>
-          <p:cNvSpPr>
-            <a:spLocks noGrp="1" noRot="1" noChangeAspect="1" noMove="1" noResize="1" noEditPoints="1" noAdjustHandles="1" noChangeArrowheads="1" noChangeShapeType="1" noTextEdit="1"/>
-          </p:cNvSpPr>
-          <p:nvPr>
-            <p:extLst>
-              <p:ext uri="{386F3935-93C4-4BCD-93E2-E3B085C9AB24}">
-                <p16:designElem xmlns:p16="http://schemas.microsoft.com/office/powerpoint/2015/main" val="1"/>
-              </p:ext>
-            </p:extLst>
-          </p:nvPr>
-        </p:nvSpPr>
-        <p:spPr>
-          <a:xfrm flipH="1">
-            <a:off x="-1" y="6408741"/>
-            <a:ext cx="12191998" cy="457202"/>
-          </a:xfrm>
-          <a:prstGeom prst="rect">
-            <a:avLst/>
-          </a:prstGeom>
-          <a:gradFill>
-            <a:gsLst>
-              <a:gs pos="34000">
-                <a:srgbClr val="000000">
-                  <a:alpha val="96000"/>
-                </a:srgbClr>
-              </a:gs>
-              <a:gs pos="100000">
-                <a:schemeClr val="accent1"/>
-              </a:gs>
-            </a:gsLst>
-            <a:lin ang="8400000" scaled="0"/>
-          </a:gradFill>
-          <a:ln>
-            <a:noFill/>
-          </a:ln>
-        </p:spPr>
-        <p:style>
-          <a:lnRef idx="2">
-            <a:schemeClr val="accent1">
-              <a:shade val="50000"/>
-            </a:schemeClr>
-          </a:lnRef>
-          <a:fillRef idx="1">
-            <a:schemeClr val="accent1"/>
-          </a:fillRef>
-          <a:effectRef idx="0">
-            <a:schemeClr val="accent1"/>
-          </a:effectRef>
-          <a:fontRef idx="minor">
-            <a:schemeClr val="lt1"/>
-          </a:fontRef>
-        </p:style>
-        <p:txBody>
-          <a:bodyPr rtlCol="0" anchor="ctr"/>
-          <a:lstStyle/>
-          <a:p>
-            <a:pPr algn="ctr"/>
-            <a:endParaRPr lang="en-US"/>
-          </a:p>
-        </p:txBody>
-      </p:sp>
-      <p:sp>
-        <p:nvSpPr>
-          <p:cNvPr id="23" name="Rectangle 22">
-            <a:extLst>
-              <a:ext uri="{FF2B5EF4-FFF2-40B4-BE49-F238E27FC236}">
-                <a16:creationId xmlns:a16="http://schemas.microsoft.com/office/drawing/2014/main" id="{3F0BE7ED-7814-4273-B18A-F26CC0380380}"/>
-              </a:ext>
-              <a:ext uri="{C183D7F6-B498-43B3-948B-1728B52AA6E4}">
-                <adec:decorative xmlns:adec="http://schemas.microsoft.com/office/drawing/2017/decorative" val="1"/>
-              </a:ext>
-            </a:extLst>
-          </p:cNvPr>
-          <p:cNvSpPr>
-            <a:spLocks noGrp="1" noRot="1" noChangeAspect="1" noMove="1" noResize="1" noEditPoints="1" noAdjustHandles="1" noChangeArrowheads="1" noChangeShapeType="1" noTextEdit="1"/>
-          </p:cNvSpPr>
-          <p:nvPr>
-            <p:extLst>
-              <p:ext uri="{386F3935-93C4-4BCD-93E2-E3B085C9AB24}">
-                <p16:designElem xmlns:p16="http://schemas.microsoft.com/office/powerpoint/2015/main" val="1"/>
-              </p:ext>
-            </p:extLst>
-          </p:nvPr>
-        </p:nvSpPr>
-        <p:spPr>
-          <a:xfrm flipH="1">
-            <a:off x="-4" y="6408742"/>
-            <a:ext cx="8115300" cy="449258"/>
-          </a:xfrm>
-          <a:prstGeom prst="rect">
-            <a:avLst/>
-          </a:prstGeom>
-          <a:gradFill>
-            <a:gsLst>
-              <a:gs pos="28000">
-                <a:schemeClr val="accent1">
-                  <a:lumMod val="75000"/>
-                  <a:alpha val="59000"/>
-                </a:schemeClr>
-              </a:gs>
-              <a:gs pos="100000">
-                <a:srgbClr val="000000">
-                  <a:alpha val="70000"/>
-                </a:srgbClr>
-              </a:gs>
-            </a:gsLst>
-            <a:lin ang="11400000" scaled="0"/>
-          </a:gradFill>
-          <a:ln>
-            <a:noFill/>
-          </a:ln>
-        </p:spPr>
-        <p:style>
-          <a:lnRef idx="2">
-            <a:schemeClr val="accent1">
-              <a:shade val="50000"/>
-            </a:schemeClr>
-          </a:lnRef>
-          <a:fillRef idx="1">
-            <a:schemeClr val="accent1"/>
-          </a:fillRef>
-          <a:effectRef idx="0">
-            <a:schemeClr val="accent1"/>
-          </a:effectRef>
-          <a:fontRef idx="minor">
-            <a:schemeClr val="lt1"/>
-          </a:fontRef>
-        </p:style>
-        <p:txBody>
-          <a:bodyPr rtlCol="0" anchor="ctr"/>
-          <a:lstStyle/>
-          <a:p>
-            <a:pPr algn="ctr"/>
-            <a:endParaRPr lang="en-US"/>
-          </a:p>
-        </p:txBody>
-      </p:sp>
-    </p:spTree>
-    <p:extLst>
-      <p:ext uri="{BB962C8B-B14F-4D97-AF65-F5344CB8AC3E}">
-        <p14:creationId xmlns:p14="http://schemas.microsoft.com/office/powerpoint/2010/main" val="2196278354"/>
-      </p:ext>
-    </p:extLst>
-  </p:cSld>
-  <p:clrMapOvr>
-    <a:masterClrMapping/>
-  </p:clrMapOvr>
-</p:sld>
-</file>
-
-<file path=ppt/slides/slide6.xml><?xml version="1.0" encoding="utf-8"?>
-<p:sld xmlns:a="http://schemas.openxmlformats.org/drawingml/2006/main" xmlns:r="http://schemas.openxmlformats.org/officeDocument/2006/relationships" xmlns:p="http://schemas.openxmlformats.org/presentationml/2006/main">
-  <p:cSld>
-    <p:spTree>
-      <p:nvGrpSpPr>
-        <p:cNvPr id="1" name=""/>
-        <p:cNvGrpSpPr/>
-        <p:nvPr/>
-      </p:nvGrpSpPr>
-      <p:grpSpPr>
-        <a:xfrm>
-          <a:off x="0" y="0"/>
-          <a:ext cx="0" cy="0"/>
-          <a:chOff x="0" y="0"/>
-          <a:chExt cx="0" cy="0"/>
-        </a:xfrm>
-      </p:grpSpPr>
-      <p:sp>
-        <p:nvSpPr>
-          <p:cNvPr id="2" name="Title 1">
-            <a:extLst>
-              <a:ext uri="{FF2B5EF4-FFF2-40B4-BE49-F238E27FC236}">
-                <a16:creationId xmlns:a16="http://schemas.microsoft.com/office/drawing/2014/main" id="{D32AE529-9FB1-1FAD-3124-A1A6D2249975}"/>
-              </a:ext>
-            </a:extLst>
-          </p:cNvPr>
-          <p:cNvSpPr>
-            <a:spLocks noGrp="1"/>
-          </p:cNvSpPr>
-          <p:nvPr>
-            <p:ph type="title"/>
-          </p:nvPr>
-        </p:nvSpPr>
-        <p:spPr/>
-        <p:txBody>
-          <a:bodyPr>
-            <a:normAutofit fontScale="90000"/>
-          </a:bodyPr>
-          <a:lstStyle/>
-          <a:p>
-            <a:r>
-              <a:rPr lang="en-US" sz="3200" dirty="0">
-                <a:effectLst/>
-                <a:latin typeface="Calibri" panose="020F0502020204030204" pitchFamily="34" charset="0"/>
-                <a:ea typeface="Calibri" panose="020F0502020204030204" pitchFamily="34" charset="0"/>
-                <a:cs typeface="Times New Roman" panose="02020603050405020304" pitchFamily="18" charset="0"/>
-              </a:rPr>
-              <a:t>How do immigrant students face up when compared to native students?</a:t>
-            </a:r>
-            <a:br>
-              <a:rPr lang="en-US" sz="3200" dirty="0">
-                <a:effectLst/>
-                <a:latin typeface="Calibri" panose="020F0502020204030204" pitchFamily="34" charset="0"/>
-                <a:ea typeface="Calibri" panose="020F0502020204030204" pitchFamily="34" charset="0"/>
-                <a:cs typeface="Times New Roman" panose="02020603050405020304" pitchFamily="18" charset="0"/>
-              </a:rPr>
-            </a:br>
-            <a:endParaRPr lang="en-GB" dirty="0"/>
-          </a:p>
-        </p:txBody>
-      </p:sp>
-      <p:pic>
-        <p:nvPicPr>
-          <p:cNvPr id="6" name="Picture Placeholder 5">
-            <a:extLst>
-              <a:ext uri="{FF2B5EF4-FFF2-40B4-BE49-F238E27FC236}">
-                <a16:creationId xmlns:a16="http://schemas.microsoft.com/office/drawing/2014/main" id="{F24638ED-1B16-E145-54A4-99C2903DA5AE}"/>
-              </a:ext>
-            </a:extLst>
-          </p:cNvPr>
-          <p:cNvPicPr>
-            <a:picLocks noGrp="1" noChangeAspect="1"/>
-          </p:cNvPicPr>
-          <p:nvPr>
-            <p:ph type="pic" idx="1"/>
-          </p:nvPr>
-        </p:nvPicPr>
-        <p:blipFill>
-          <a:blip r:embed="rId2">
-            <a:extLst>
-              <a:ext uri="{28A0092B-C50C-407E-A947-70E740481C1C}">
-                <a14:useLocalDpi xmlns:a14="http://schemas.microsoft.com/office/drawing/2010/main" val="0"/>
-              </a:ext>
-            </a:extLst>
-          </a:blip>
-          <a:srcRect l="10423" r="10423"/>
-          <a:stretch>
-            <a:fillRect/>
-          </a:stretch>
-        </p:blipFill>
-        <p:spPr/>
-      </p:pic>
-      <p:sp>
-        <p:nvSpPr>
-          <p:cNvPr id="4" name="Text Placeholder 3">
-            <a:extLst>
-              <a:ext uri="{FF2B5EF4-FFF2-40B4-BE49-F238E27FC236}">
-                <a16:creationId xmlns:a16="http://schemas.microsoft.com/office/drawing/2014/main" id="{68AD77B3-0C66-45D9-B4F0-268DDF402843}"/>
-              </a:ext>
-            </a:extLst>
-          </p:cNvPr>
-          <p:cNvSpPr>
-            <a:spLocks noGrp="1"/>
-          </p:cNvSpPr>
-          <p:nvPr>
-            <p:ph type="body" sz="half" idx="2"/>
-          </p:nvPr>
-        </p:nvSpPr>
-        <p:spPr/>
-        <p:txBody>
-          <a:bodyPr/>
-          <a:lstStyle/>
-          <a:p>
-            <a:endParaRPr lang="en-GB" dirty="0"/>
-          </a:p>
-        </p:txBody>
-      </p:sp>
-    </p:spTree>
-    <p:extLst>
-      <p:ext uri="{BB962C8B-B14F-4D97-AF65-F5344CB8AC3E}">
-        <p14:creationId xmlns:p14="http://schemas.microsoft.com/office/powerpoint/2010/main" val="1480633572"/>
-      </p:ext>
-    </p:extLst>
-  </p:cSld>
-  <p:clrMapOvr>
-    <a:masterClrMapping/>
-  </p:clrMapOvr>
-</p:sld>
-</file>
-
-<file path=ppt/slides/slide7.xml><?xml version="1.0" encoding="utf-8"?>
-<p:sld xmlns:a="http://schemas.openxmlformats.org/drawingml/2006/main" xmlns:r="http://schemas.openxmlformats.org/officeDocument/2006/relationships" xmlns:p="http://schemas.openxmlformats.org/presentationml/2006/main">
-  <p:cSld>
-    <p:bg>
-      <p:bgPr>
-        <a:solidFill>
-          <a:schemeClr val="bg1"/>
-        </a:solidFill>
-        <a:effectLst/>
-      </p:bgPr>
-    </p:bg>
-    <p:spTree>
-      <p:nvGrpSpPr>
-        <p:cNvPr id="1" name=""/>
-        <p:cNvGrpSpPr/>
-        <p:nvPr/>
-      </p:nvGrpSpPr>
-      <p:grpSpPr>
-        <a:xfrm>
-          <a:off x="0" y="0"/>
-          <a:ext cx="0" cy="0"/>
-          <a:chOff x="0" y="0"/>
-          <a:chExt cx="0" cy="0"/>
-        </a:xfrm>
-      </p:grpSpPr>
-      <p:sp useBgFill="1">
-        <p:nvSpPr>
-          <p:cNvPr id="57" name="Rectangle 56">
-            <a:extLst>
-              <a:ext uri="{FF2B5EF4-FFF2-40B4-BE49-F238E27FC236}">
-                <a16:creationId xmlns:a16="http://schemas.microsoft.com/office/drawing/2014/main" id="{5A59F003-E00A-43F9-91DC-CC54E3B87466}"/>
-              </a:ext>
-              <a:ext uri="{C183D7F6-B498-43B3-948B-1728B52AA6E4}">
-                <adec:decorative xmlns:adec="http://schemas.microsoft.com/office/drawing/2017/decorative" val="1"/>
-              </a:ext>
-            </a:extLst>
-          </p:cNvPr>
-          <p:cNvSpPr>
-            <a:spLocks noGrp="1" noRot="1" noChangeAspect="1" noMove="1" noResize="1" noEditPoints="1" noAdjustHandles="1" noChangeArrowheads="1" noChangeShapeType="1" noTextEdit="1"/>
-          </p:cNvSpPr>
-          <p:nvPr>
-            <p:extLst>
-              <p:ext uri="{386F3935-93C4-4BCD-93E2-E3B085C9AB24}">
-                <p16:designElem xmlns:p16="http://schemas.microsoft.com/office/powerpoint/2015/main" val="1"/>
-              </p:ext>
-            </p:extLst>
-          </p:nvPr>
-        </p:nvSpPr>
-        <p:spPr>
-          <a:xfrm>
-            <a:off x="0" y="0"/>
-            <a:ext cx="12192000" cy="6858000"/>
-          </a:xfrm>
-          <a:prstGeom prst="rect">
-            <a:avLst/>
-          </a:prstGeom>
-          <a:ln>
-            <a:noFill/>
-          </a:ln>
-        </p:spPr>
-        <p:style>
-          <a:lnRef idx="2">
-            <a:schemeClr val="accent1">
-              <a:shade val="50000"/>
-            </a:schemeClr>
-          </a:lnRef>
-          <a:fillRef idx="1">
-            <a:schemeClr val="accent1"/>
-          </a:fillRef>
-          <a:effectRef idx="0">
-            <a:schemeClr val="accent1"/>
-          </a:effectRef>
-          <a:fontRef idx="minor">
-            <a:schemeClr val="lt1"/>
-          </a:fontRef>
-        </p:style>
-        <p:txBody>
-          <a:bodyPr rtlCol="0" anchor="ctr"/>
-          <a:lstStyle/>
-          <a:p>
-            <a:pPr algn="ctr"/>
-            <a:endParaRPr lang="en-US"/>
-          </a:p>
-        </p:txBody>
-      </p:sp>
-      <p:pic>
-        <p:nvPicPr>
-          <p:cNvPr id="6" name="Picture 5" descr="A picture containing envelope&#10;&#10;Description automatically generated">
-            <a:extLst>
-              <a:ext uri="{FF2B5EF4-FFF2-40B4-BE49-F238E27FC236}">
-                <a16:creationId xmlns:a16="http://schemas.microsoft.com/office/drawing/2014/main" id="{091F6E94-786E-0787-B119-4E9B4026C1EE}"/>
-              </a:ext>
-            </a:extLst>
-          </p:cNvPr>
-          <p:cNvPicPr>
-            <a:picLocks noChangeAspect="1"/>
-          </p:cNvPicPr>
-          <p:nvPr/>
-        </p:nvPicPr>
-        <p:blipFill rotWithShape="1">
-          <a:blip r:embed="rId2">
-            <a:extLst>
-              <a:ext uri="{28A0092B-C50C-407E-A947-70E740481C1C}">
-                <a14:useLocalDpi xmlns:a14="http://schemas.microsoft.com/office/drawing/2010/main" val="0"/>
-              </a:ext>
-            </a:extLst>
-          </a:blip>
-          <a:srcRect l="2691" t="23575" r="3559" b="-1"/>
-          <a:stretch/>
-        </p:blipFill>
-        <p:spPr>
-          <a:xfrm>
-            <a:off x="20" y="10"/>
-            <a:ext cx="12191981" cy="6857990"/>
-          </a:xfrm>
-          <a:prstGeom prst="rect">
-            <a:avLst/>
-          </a:prstGeom>
-        </p:spPr>
-      </p:pic>
-      <p:sp>
-        <p:nvSpPr>
-          <p:cNvPr id="69" name="Rectangle 58">
-            <a:extLst>
-              <a:ext uri="{FF2B5EF4-FFF2-40B4-BE49-F238E27FC236}">
-                <a16:creationId xmlns:a16="http://schemas.microsoft.com/office/drawing/2014/main" id="{D74A4382-E3AD-430A-9A1F-DFA3E0E77A7D}"/>
-              </a:ext>
-              <a:ext uri="{C183D7F6-B498-43B3-948B-1728B52AA6E4}">
-                <adec:decorative xmlns:adec="http://schemas.microsoft.com/office/drawing/2017/decorative" val="1"/>
-              </a:ext>
-            </a:extLst>
-          </p:cNvPr>
-          <p:cNvSpPr>
-            <a:spLocks noGrp="1" noRot="1" noChangeAspect="1" noMove="1" noResize="1" noEditPoints="1" noAdjustHandles="1" noChangeArrowheads="1" noChangeShapeType="1" noTextEdit="1"/>
-          </p:cNvSpPr>
-          <p:nvPr>
-            <p:extLst>
-              <p:ext uri="{386F3935-93C4-4BCD-93E2-E3B085C9AB24}">
-                <p16:designElem xmlns:p16="http://schemas.microsoft.com/office/powerpoint/2015/main" val="1"/>
-              </p:ext>
-            </p:extLst>
-          </p:nvPr>
-        </p:nvSpPr>
-        <p:spPr>
-          <a:xfrm rot="16200000">
-            <a:off x="3799868" y="-1534136"/>
-            <a:ext cx="4592270" cy="12192001"/>
-          </a:xfrm>
-          <a:prstGeom prst="rect">
-            <a:avLst/>
-          </a:prstGeom>
-          <a:gradFill>
-            <a:gsLst>
-              <a:gs pos="35000">
-                <a:schemeClr val="bg1">
-                  <a:alpha val="46000"/>
-                </a:schemeClr>
-              </a:gs>
-              <a:gs pos="21000">
-                <a:schemeClr val="bg1">
-                  <a:alpha val="30000"/>
-                </a:schemeClr>
-              </a:gs>
-              <a:gs pos="0">
-                <a:schemeClr val="bg1">
-                  <a:alpha val="0"/>
-                </a:schemeClr>
-              </a:gs>
-              <a:gs pos="100000">
-                <a:schemeClr val="bg1">
-                  <a:alpha val="90000"/>
-                </a:schemeClr>
-              </a:gs>
-            </a:gsLst>
-            <a:lin ang="10800000" scaled="0"/>
-          </a:gradFill>
-          <a:ln>
-            <a:noFill/>
-          </a:ln>
-        </p:spPr>
-        <p:style>
-          <a:lnRef idx="2">
-            <a:schemeClr val="accent1">
-              <a:shade val="50000"/>
-            </a:schemeClr>
-          </a:lnRef>
-          <a:fillRef idx="1">
-            <a:schemeClr val="accent1"/>
-          </a:fillRef>
-          <a:effectRef idx="0">
-            <a:schemeClr val="accent1"/>
-          </a:effectRef>
-          <a:fontRef idx="minor">
-            <a:schemeClr val="lt1"/>
-          </a:fontRef>
-        </p:style>
-        <p:txBody>
-          <a:bodyPr rtlCol="0" anchor="ctr"/>
-          <a:lstStyle/>
-          <a:p>
-            <a:pPr algn="ctr"/>
-            <a:endParaRPr lang="en-US" dirty="0"/>
-          </a:p>
-        </p:txBody>
-      </p:sp>
-      <p:sp>
-        <p:nvSpPr>
-          <p:cNvPr id="2" name="Title 1">
-            <a:extLst>
-              <a:ext uri="{FF2B5EF4-FFF2-40B4-BE49-F238E27FC236}">
-                <a16:creationId xmlns:a16="http://schemas.microsoft.com/office/drawing/2014/main" id="{8F305919-EF51-3C09-4624-2A44177E3CF5}"/>
-              </a:ext>
-            </a:extLst>
-          </p:cNvPr>
-          <p:cNvSpPr>
-            <a:spLocks noGrp="1"/>
-          </p:cNvSpPr>
-          <p:nvPr>
-            <p:ph type="ctrTitle"/>
-          </p:nvPr>
-        </p:nvSpPr>
-        <p:spPr>
-          <a:xfrm>
-            <a:off x="404553" y="3091928"/>
-            <a:ext cx="9078562" cy="2387600"/>
-          </a:xfrm>
-        </p:spPr>
-        <p:txBody>
-          <a:bodyPr>
-            <a:normAutofit/>
-          </a:bodyPr>
-          <a:lstStyle/>
-          <a:p>
-            <a:pPr algn="l"/>
-            <a:r>
-              <a:rPr lang="en-US" sz="4100" dirty="0"/>
-              <a:t>Immigrant students in Europe suffer from lower grades: some social and scholastic features are the key to explain it</a:t>
-            </a:r>
-          </a:p>
-        </p:txBody>
-      </p:sp>
-      <p:sp>
-        <p:nvSpPr>
-          <p:cNvPr id="61" name="Rectangle: Rounded Corners 60">
-            <a:extLst>
-              <a:ext uri="{FF2B5EF4-FFF2-40B4-BE49-F238E27FC236}">
-                <a16:creationId xmlns:a16="http://schemas.microsoft.com/office/drawing/2014/main" id="{79F40191-0F44-4FD1-82CC-ACB507C14BE6}"/>
-              </a:ext>
-              <a:ext uri="{C183D7F6-B498-43B3-948B-1728B52AA6E4}">
-                <adec:decorative xmlns:adec="http://schemas.microsoft.com/office/drawing/2017/decorative" val="1"/>
-              </a:ext>
-            </a:extLst>
-          </p:cNvPr>
-          <p:cNvSpPr>
-            <a:spLocks noGrp="1" noRot="1" noChangeAspect="1" noMove="1" noResize="1" noEditPoints="1" noAdjustHandles="1" noChangeArrowheads="1" noChangeShapeType="1" noTextEdit="1"/>
-          </p:cNvSpPr>
-          <p:nvPr>
-            <p:extLst>
-              <p:ext uri="{386F3935-93C4-4BCD-93E2-E3B085C9AB24}">
-                <p16:designElem xmlns:p16="http://schemas.microsoft.com/office/powerpoint/2015/main" val="1"/>
-              </p:ext>
-            </p:extLst>
-          </p:nvPr>
-        </p:nvSpPr>
-        <p:spPr>
-          <a:xfrm>
-            <a:off x="0" y="5575039"/>
-            <a:ext cx="9785897" cy="685800"/>
-          </a:xfrm>
-          <a:prstGeom prst="roundRect">
-            <a:avLst>
-              <a:gd name="adj" fmla="val 0"/>
-            </a:avLst>
-          </a:prstGeom>
-          <a:solidFill>
-            <a:schemeClr val="accent2"/>
-          </a:solidFill>
-          <a:ln>
-            <a:noFill/>
-          </a:ln>
-        </p:spPr>
-        <p:style>
-          <a:lnRef idx="2">
-            <a:schemeClr val="accent1">
-              <a:shade val="50000"/>
-            </a:schemeClr>
-          </a:lnRef>
-          <a:fillRef idx="1">
-            <a:schemeClr val="accent1"/>
-          </a:fillRef>
-          <a:effectRef idx="0">
-            <a:schemeClr val="accent1"/>
-          </a:effectRef>
-          <a:fontRef idx="minor">
-            <a:schemeClr val="lt1"/>
-          </a:fontRef>
-        </p:style>
-        <p:txBody>
-          <a:bodyPr rtlCol="0" anchor="ctr"/>
-          <a:lstStyle/>
-          <a:p>
-            <a:pPr algn="ctr"/>
-            <a:endParaRPr lang="en-US"/>
-          </a:p>
-        </p:txBody>
-      </p:sp>
-      <p:sp>
-        <p:nvSpPr>
-          <p:cNvPr id="3" name="Subtitle 2">
-            <a:extLst>
-              <a:ext uri="{FF2B5EF4-FFF2-40B4-BE49-F238E27FC236}">
-                <a16:creationId xmlns:a16="http://schemas.microsoft.com/office/drawing/2014/main" id="{CB43817C-853C-8EA7-0C69-B4DABE46DCD0}"/>
-              </a:ext>
-            </a:extLst>
-          </p:cNvPr>
-          <p:cNvSpPr>
-            <a:spLocks noGrp="1"/>
-          </p:cNvSpPr>
-          <p:nvPr>
-            <p:ph type="subTitle" idx="1"/>
-          </p:nvPr>
-        </p:nvSpPr>
-        <p:spPr>
-          <a:xfrm>
-            <a:off x="404553" y="5624945"/>
-            <a:ext cx="9078562" cy="592975"/>
-          </a:xfrm>
-        </p:spPr>
-        <p:txBody>
-          <a:bodyPr anchor="ctr">
-            <a:normAutofit/>
-          </a:bodyPr>
-          <a:lstStyle/>
-          <a:p>
-            <a:pPr algn="l"/>
-            <a:r>
-              <a:rPr lang="en-US" dirty="0"/>
-              <a:t>Giulia </a:t>
-            </a:r>
-            <a:r>
-              <a:rPr lang="en-US" dirty="0" err="1"/>
-              <a:t>Bergonzoli</a:t>
-            </a:r>
-            <a:r>
-              <a:rPr lang="en-US" dirty="0"/>
-              <a:t>, Ettore Busani, Sebastian Castellano, Lucia Gregorini</a:t>
-            </a:r>
-          </a:p>
-        </p:txBody>
-      </p:sp>
-    </p:spTree>
-    <p:extLst>
-      <p:ext uri="{BB962C8B-B14F-4D97-AF65-F5344CB8AC3E}">
-        <p14:creationId xmlns:p14="http://schemas.microsoft.com/office/powerpoint/2010/main" val="424306411"/>
-      </p:ext>
-    </p:extLst>
-  </p:cSld>
-  <p:clrMapOvr>
-    <a:overrideClrMapping bg1="dk1" tx1="lt1" bg2="dk2" tx2="lt2" accent1="accent1" accent2="accent2" accent3="accent3" accent4="accent4" accent5="accent5" accent6="accent6" hlink="hlink" folHlink="folHlink"/>
-  </p:clrMapOvr>
-</p:sld>
-</file>
-
-<file path=ppt/slides/slide8.xml><?xml version="1.0" encoding="utf-8"?>
-<p:sld xmlns:a="http://schemas.openxmlformats.org/drawingml/2006/main" xmlns:r="http://schemas.openxmlformats.org/officeDocument/2006/relationships" xmlns:p="http://schemas.openxmlformats.org/presentationml/2006/main">
-  <p:cSld>
-    <p:bg>
-      <p:bgPr>
-        <a:solidFill>
-          <a:schemeClr val="bg1"/>
-        </a:solidFill>
-        <a:effectLst/>
-      </p:bgPr>
-    </p:bg>
-    <p:spTree>
-      <p:nvGrpSpPr>
-        <p:cNvPr id="1" name=""/>
-        <p:cNvGrpSpPr/>
-        <p:nvPr/>
-      </p:nvGrpSpPr>
-      <p:grpSpPr>
-        <a:xfrm>
-          <a:off x="0" y="0"/>
-          <a:ext cx="0" cy="0"/>
-          <a:chOff x="0" y="0"/>
-          <a:chExt cx="0" cy="0"/>
-        </a:xfrm>
-      </p:grpSpPr>
-      <p:sp useBgFill="1">
-        <p:nvSpPr>
-          <p:cNvPr id="78" name="Rectangle 50">
-            <a:extLst>
-              <a:ext uri="{FF2B5EF4-FFF2-40B4-BE49-F238E27FC236}">
-                <a16:creationId xmlns:a16="http://schemas.microsoft.com/office/drawing/2014/main" id="{B2C93D80-2AB2-4AED-98C1-51FF03C9DDCB}"/>
-              </a:ext>
-              <a:ext uri="{C183D7F6-B498-43B3-948B-1728B52AA6E4}">
-                <adec:decorative xmlns:adec="http://schemas.microsoft.com/office/drawing/2017/decorative" val="1"/>
-              </a:ext>
-            </a:extLst>
-          </p:cNvPr>
-          <p:cNvSpPr>
-            <a:spLocks noGrp="1" noRot="1" noChangeAspect="1" noMove="1" noResize="1" noEditPoints="1" noAdjustHandles="1" noChangeArrowheads="1" noChangeShapeType="1" noTextEdit="1"/>
-          </p:cNvSpPr>
-          <p:nvPr>
-            <p:extLst>
-              <p:ext uri="{386F3935-93C4-4BCD-93E2-E3B085C9AB24}">
-                <p16:designElem xmlns:p16="http://schemas.microsoft.com/office/powerpoint/2015/main" val="1"/>
-              </p:ext>
-            </p:extLst>
-          </p:nvPr>
-        </p:nvSpPr>
-        <p:spPr>
-          <a:xfrm>
-            <a:off x="0" y="0"/>
-            <a:ext cx="12188952" cy="6858000"/>
-          </a:xfrm>
-          <a:prstGeom prst="rect">
-            <a:avLst/>
-          </a:prstGeom>
-          <a:ln>
-            <a:noFill/>
-          </a:ln>
-        </p:spPr>
-        <p:style>
-          <a:lnRef idx="2">
-            <a:schemeClr val="accent1">
-              <a:shade val="50000"/>
-            </a:schemeClr>
-          </a:lnRef>
-          <a:fillRef idx="1">
-            <a:schemeClr val="accent1"/>
-          </a:fillRef>
-          <a:effectRef idx="0">
-            <a:schemeClr val="accent1"/>
-          </a:effectRef>
-          <a:fontRef idx="minor">
-            <a:schemeClr val="lt1"/>
-          </a:fontRef>
-        </p:style>
-        <p:txBody>
-          <a:bodyPr rtlCol="0" anchor="ctr"/>
-          <a:lstStyle/>
-          <a:p>
-            <a:pPr algn="ctr"/>
-            <a:endParaRPr lang="en-US"/>
-          </a:p>
-        </p:txBody>
-      </p:sp>
-      <p:sp>
-        <p:nvSpPr>
-          <p:cNvPr id="80" name="Rectangle 52">
-            <a:extLst>
-              <a:ext uri="{FF2B5EF4-FFF2-40B4-BE49-F238E27FC236}">
-                <a16:creationId xmlns:a16="http://schemas.microsoft.com/office/drawing/2014/main" id="{3CD1EA40-7116-4FCB-9369-70F29FAA91EC}"/>
-              </a:ext>
-              <a:ext uri="{C183D7F6-B498-43B3-948B-1728B52AA6E4}">
-                <adec:decorative xmlns:adec="http://schemas.microsoft.com/office/drawing/2017/decorative" val="1"/>
-              </a:ext>
-            </a:extLst>
-          </p:cNvPr>
-          <p:cNvSpPr>
-            <a:spLocks noGrp="1" noRot="1" noChangeAspect="1" noMove="1" noResize="1" noEditPoints="1" noAdjustHandles="1" noChangeArrowheads="1" noChangeShapeType="1" noTextEdit="1"/>
-          </p:cNvSpPr>
-          <p:nvPr>
-            <p:extLst>
-              <p:ext uri="{386F3935-93C4-4BCD-93E2-E3B085C9AB24}">
-                <p16:designElem xmlns:p16="http://schemas.microsoft.com/office/powerpoint/2015/main" val="1"/>
-              </p:ext>
-            </p:extLst>
-          </p:nvPr>
-        </p:nvSpPr>
-        <p:spPr>
-          <a:xfrm>
-            <a:off x="-1" y="1"/>
-            <a:ext cx="6598763" cy="3233984"/>
-          </a:xfrm>
-          <a:prstGeom prst="rect">
-            <a:avLst/>
-          </a:prstGeom>
-          <a:solidFill>
-            <a:schemeClr val="bg1">
-              <a:lumMod val="95000"/>
-            </a:schemeClr>
-          </a:solidFill>
-          <a:ln>
-            <a:noFill/>
-          </a:ln>
-        </p:spPr>
-        <p:style>
-          <a:lnRef idx="2">
-            <a:schemeClr val="accent1">
-              <a:shade val="50000"/>
-            </a:schemeClr>
-          </a:lnRef>
-          <a:fillRef idx="1">
-            <a:schemeClr val="accent1"/>
-          </a:fillRef>
-          <a:effectRef idx="0">
-            <a:schemeClr val="accent1"/>
-          </a:effectRef>
-          <a:fontRef idx="minor">
-            <a:schemeClr val="lt1"/>
-          </a:fontRef>
-        </p:style>
-        <p:txBody>
-          <a:bodyPr rtlCol="0" anchor="ctr"/>
-          <a:lstStyle/>
-          <a:p>
-            <a:pPr algn="ctr"/>
-            <a:endParaRPr lang="en-US"/>
-          </a:p>
-        </p:txBody>
-      </p:sp>
-      <p:sp>
-        <p:nvSpPr>
-          <p:cNvPr id="12" name="Title 11">
-            <a:extLst>
-              <a:ext uri="{FF2B5EF4-FFF2-40B4-BE49-F238E27FC236}">
-                <a16:creationId xmlns:a16="http://schemas.microsoft.com/office/drawing/2014/main" id="{703E3DEC-63F7-0B83-8060-B811E1D4E2A7}"/>
-              </a:ext>
-            </a:extLst>
-          </p:cNvPr>
-          <p:cNvSpPr>
-            <a:spLocks noGrp="1"/>
-          </p:cNvSpPr>
-          <p:nvPr>
-            <p:ph type="title"/>
-          </p:nvPr>
-        </p:nvSpPr>
-        <p:spPr>
-          <a:xfrm>
-            <a:off x="1166648" y="679927"/>
-            <a:ext cx="4929352" cy="2270664"/>
-          </a:xfrm>
-        </p:spPr>
-        <p:txBody>
-          <a:bodyPr vert="horz" lIns="91440" tIns="45720" rIns="91440" bIns="45720" rtlCol="0" anchor="ctr">
-            <a:normAutofit/>
-          </a:bodyPr>
-          <a:lstStyle/>
-          <a:p>
-            <a:pPr marL="285750" indent="-285750">
-              <a:buFont typeface="Arial" panose="020B0604020202020204" pitchFamily="34" charset="0"/>
-              <a:buChar char="•"/>
-            </a:pPr>
-            <a:r>
-              <a:rPr lang="en-US" sz="1800" dirty="0">
-                <a:effectLst/>
-                <a:latin typeface="Calibri" panose="020F0502020204030204" pitchFamily="34" charset="0"/>
-                <a:ea typeface="Calibri" panose="020F0502020204030204" pitchFamily="34" charset="0"/>
-                <a:cs typeface="Times New Roman" panose="02020603050405020304" pitchFamily="18" charset="0"/>
-              </a:rPr>
-              <a:t>How do immigrant students face up when compared to native students?</a:t>
-            </a:r>
-            <a:br>
-              <a:rPr lang="en-US" sz="1600" dirty="0">
-                <a:effectLst/>
-                <a:latin typeface="Calibri" panose="020F0502020204030204" pitchFamily="34" charset="0"/>
-                <a:ea typeface="Calibri" panose="020F0502020204030204" pitchFamily="34" charset="0"/>
-                <a:cs typeface="Times New Roman" panose="02020603050405020304" pitchFamily="18" charset="0"/>
-              </a:rPr>
-            </a:br>
-            <a:endParaRPr lang="en-US" sz="1600" kern="1200" dirty="0">
-              <a:solidFill>
-                <a:schemeClr val="tx1"/>
-              </a:solidFill>
-              <a:latin typeface="+mj-lt"/>
-              <a:ea typeface="+mj-ea"/>
-              <a:cs typeface="+mj-cs"/>
-            </a:endParaRPr>
-          </a:p>
-        </p:txBody>
-      </p:sp>
-      <p:sp>
-        <p:nvSpPr>
-          <p:cNvPr id="81" name="Rectangle 54">
-            <a:extLst>
-              <a:ext uri="{FF2B5EF4-FFF2-40B4-BE49-F238E27FC236}">
-                <a16:creationId xmlns:a16="http://schemas.microsoft.com/office/drawing/2014/main" id="{BF647E38-F93D-4661-8D77-CE13EEB65B5A}"/>
-              </a:ext>
-              <a:ext uri="{C183D7F6-B498-43B3-948B-1728B52AA6E4}">
-                <adec:decorative xmlns:adec="http://schemas.microsoft.com/office/drawing/2017/decorative" val="1"/>
-              </a:ext>
-            </a:extLst>
-          </p:cNvPr>
-          <p:cNvSpPr>
-            <a:spLocks noGrp="1" noRot="1" noChangeAspect="1" noMove="1" noResize="1" noEditPoints="1" noAdjustHandles="1" noChangeArrowheads="1" noChangeShapeType="1" noTextEdit="1"/>
-          </p:cNvSpPr>
-          <p:nvPr>
-            <p:extLst>
-              <p:ext uri="{386F3935-93C4-4BCD-93E2-E3B085C9AB24}">
-                <p16:designElem xmlns:p16="http://schemas.microsoft.com/office/powerpoint/2015/main" val="1"/>
-              </p:ext>
-            </p:extLst>
-          </p:nvPr>
-        </p:nvSpPr>
-        <p:spPr>
-          <a:xfrm>
-            <a:off x="-1" y="1"/>
-            <a:ext cx="606972" cy="3233984"/>
-          </a:xfrm>
-          <a:prstGeom prst="rect">
-            <a:avLst/>
-          </a:prstGeom>
-          <a:solidFill>
-            <a:schemeClr val="tx1">
-              <a:lumMod val="85000"/>
-              <a:lumOff val="15000"/>
-            </a:schemeClr>
-          </a:solidFill>
-          <a:ln>
-            <a:noFill/>
-          </a:ln>
-        </p:spPr>
-        <p:style>
-          <a:lnRef idx="2">
-            <a:schemeClr val="accent1">
-              <a:shade val="50000"/>
-            </a:schemeClr>
-          </a:lnRef>
-          <a:fillRef idx="1">
-            <a:schemeClr val="accent1"/>
-          </a:fillRef>
-          <a:effectRef idx="0">
-            <a:schemeClr val="accent1"/>
-          </a:effectRef>
-          <a:fontRef idx="minor">
-            <a:schemeClr val="lt1"/>
-          </a:fontRef>
-        </p:style>
-        <p:txBody>
-          <a:bodyPr rtlCol="0" anchor="ctr"/>
-          <a:lstStyle/>
-          <a:p>
-            <a:pPr algn="ctr"/>
-            <a:endParaRPr lang="en-US"/>
-          </a:p>
-        </p:txBody>
-      </p:sp>
-      <p:grpSp>
-        <p:nvGrpSpPr>
-          <p:cNvPr id="82" name="Group 56">
-            <a:extLst>
-              <a:ext uri="{FF2B5EF4-FFF2-40B4-BE49-F238E27FC236}">
-                <a16:creationId xmlns:a16="http://schemas.microsoft.com/office/drawing/2014/main" id="{C87B5BBF-D7F8-4180-AC84-500CAEF16B3D}"/>
-              </a:ext>
-              <a:ext uri="{C183D7F6-B498-43B3-948B-1728B52AA6E4}">
-                <adec:decorative xmlns:adec="http://schemas.microsoft.com/office/drawing/2017/decorative" val="1"/>
-              </a:ext>
-            </a:extLst>
-          </p:cNvPr>
-          <p:cNvGrpSpPr>
-            <a:grpSpLocks noGrp="1" noUngrp="1" noRot="1" noChangeAspect="1" noMove="1" noResize="1"/>
-          </p:cNvGrpSpPr>
-          <p:nvPr>
-            <p:extLst>
-              <p:ext uri="{386F3935-93C4-4BCD-93E2-E3B085C9AB24}">
-                <p16:designElem xmlns:p16="http://schemas.microsoft.com/office/powerpoint/2015/main" val="1"/>
-              </p:ext>
-            </p:extLst>
-          </p:nvPr>
-        </p:nvGrpSpPr>
-        <p:grpSpPr>
-          <a:xfrm>
-            <a:off x="1188720" y="73152"/>
-            <a:ext cx="1178966" cy="232963"/>
-            <a:chOff x="1188720" y="73152"/>
-            <a:chExt cx="1178966" cy="232963"/>
-          </a:xfrm>
-        </p:grpSpPr>
-        <p:sp>
-          <p:nvSpPr>
-            <p:cNvPr id="58" name="Rectangle 64">
-              <a:extLst>
-                <a:ext uri="{FF2B5EF4-FFF2-40B4-BE49-F238E27FC236}">
-                  <a16:creationId xmlns:a16="http://schemas.microsoft.com/office/drawing/2014/main" id="{9BAF6743-12D2-4B97-AF13-38AEB26B907D}"/>
-                </a:ext>
-                <a:ext uri="{C183D7F6-B498-43B3-948B-1728B52AA6E4}">
-                  <adec:decorative xmlns:adec="http://schemas.microsoft.com/office/drawing/2017/decorative" val="1"/>
-                </a:ext>
-              </a:extLst>
-            </p:cNvPr>
-            <p:cNvSpPr/>
-            <p:nvPr>
-              <p:extLst>
-                <p:ext uri="{386F3935-93C4-4BCD-93E2-E3B085C9AB24}">
-                  <p16:designElem xmlns:p16="http://schemas.microsoft.com/office/powerpoint/2015/main" val="1"/>
-                </p:ext>
-              </p:extLst>
-            </p:nvPr>
-          </p:nvSpPr>
-          <p:spPr>
-            <a:xfrm>
-              <a:off x="1688541" y="73152"/>
-              <a:ext cx="54368" cy="59227"/>
-            </a:xfrm>
-            <a:prstGeom prst="ellipse">
-              <a:avLst/>
-            </a:prstGeom>
-            <a:solidFill>
-              <a:schemeClr val="accent1"/>
-            </a:solidFill>
-            <a:ln>
-              <a:noFill/>
-            </a:ln>
-          </p:spPr>
-          <p:style>
-            <a:lnRef idx="2">
-              <a:schemeClr val="accent1">
-                <a:shade val="50000"/>
-              </a:schemeClr>
-            </a:lnRef>
-            <a:fillRef idx="1">
-              <a:schemeClr val="accent1"/>
-            </a:fillRef>
-            <a:effectRef idx="0">
-              <a:schemeClr val="accent1"/>
-            </a:effectRef>
-            <a:fontRef idx="minor">
-              <a:schemeClr val="lt1"/>
-            </a:fontRef>
-          </p:style>
-          <p:txBody>
-            <a:bodyPr rtlCol="0" anchor="ctr"/>
-            <a:lstStyle/>
-            <a:p>
-              <a:pPr algn="ctr"/>
-              <a:endParaRPr lang="en-US"/>
-            </a:p>
-          </p:txBody>
-        </p:sp>
-        <p:sp>
-          <p:nvSpPr>
-            <p:cNvPr id="83" name="Rectangle 66">
-              <a:extLst>
-                <a:ext uri="{FF2B5EF4-FFF2-40B4-BE49-F238E27FC236}">
-                  <a16:creationId xmlns:a16="http://schemas.microsoft.com/office/drawing/2014/main" id="{7CB54B6E-82CC-48E5-8223-14431C9B991B}"/>
-                </a:ext>
-                <a:ext uri="{C183D7F6-B498-43B3-948B-1728B52AA6E4}">
-                  <adec:decorative xmlns:adec="http://schemas.microsoft.com/office/drawing/2017/decorative" val="1"/>
-                </a:ext>
-              </a:extLst>
-            </p:cNvPr>
-            <p:cNvSpPr/>
-            <p:nvPr>
-              <p:extLst>
-                <p:ext uri="{386F3935-93C4-4BCD-93E2-E3B085C9AB24}">
-                  <p16:designElem xmlns:p16="http://schemas.microsoft.com/office/powerpoint/2015/main" val="1"/>
-                </p:ext>
-              </p:extLst>
-            </p:nvPr>
-          </p:nvSpPr>
-          <p:spPr>
-            <a:xfrm>
-              <a:off x="1688541" y="246888"/>
-              <a:ext cx="54368" cy="59227"/>
-            </a:xfrm>
-            <a:prstGeom prst="ellipse">
-              <a:avLst/>
-            </a:prstGeom>
-            <a:solidFill>
-              <a:schemeClr val="accent1"/>
-            </a:solidFill>
-            <a:ln>
-              <a:noFill/>
-            </a:ln>
-          </p:spPr>
-          <p:style>
-            <a:lnRef idx="2">
-              <a:schemeClr val="accent1">
-                <a:shade val="50000"/>
-              </a:schemeClr>
-            </a:lnRef>
-            <a:fillRef idx="1">
-              <a:schemeClr val="accent1"/>
-            </a:fillRef>
-            <a:effectRef idx="0">
-              <a:schemeClr val="accent1"/>
-            </a:effectRef>
-            <a:fontRef idx="minor">
-              <a:schemeClr val="lt1"/>
-            </a:fontRef>
-          </p:style>
-          <p:txBody>
-            <a:bodyPr rtlCol="0" anchor="ctr"/>
-            <a:lstStyle/>
-            <a:p>
-              <a:pPr algn="ctr"/>
-              <a:endParaRPr lang="en-US"/>
-            </a:p>
-          </p:txBody>
-        </p:sp>
-        <p:sp>
-          <p:nvSpPr>
-            <p:cNvPr id="60" name="Rectangle 64">
-              <a:extLst>
-                <a:ext uri="{FF2B5EF4-FFF2-40B4-BE49-F238E27FC236}">
-                  <a16:creationId xmlns:a16="http://schemas.microsoft.com/office/drawing/2014/main" id="{40A8DD7B-3B5A-4064-AB20-A57A363A74F2}"/>
-                </a:ext>
-                <a:ext uri="{C183D7F6-B498-43B3-948B-1728B52AA6E4}">
-                  <adec:decorative xmlns:adec="http://schemas.microsoft.com/office/drawing/2017/decorative" val="1"/>
-                </a:ext>
-              </a:extLst>
-            </p:cNvPr>
-            <p:cNvSpPr/>
-            <p:nvPr>
-              <p:extLst>
-                <p:ext uri="{386F3935-93C4-4BCD-93E2-E3B085C9AB24}">
-                  <p16:designElem xmlns:p16="http://schemas.microsoft.com/office/powerpoint/2015/main" val="1"/>
-                </p:ext>
-              </p:extLst>
-            </p:nvPr>
-          </p:nvSpPr>
-          <p:spPr>
-            <a:xfrm>
-              <a:off x="1563586" y="73152"/>
-              <a:ext cx="54368" cy="59227"/>
-            </a:xfrm>
-            <a:prstGeom prst="ellipse">
-              <a:avLst/>
-            </a:prstGeom>
-            <a:solidFill>
-              <a:schemeClr val="accent1"/>
-            </a:solidFill>
-            <a:ln>
-              <a:noFill/>
-            </a:ln>
-          </p:spPr>
-          <p:style>
-            <a:lnRef idx="2">
-              <a:schemeClr val="accent1">
-                <a:shade val="50000"/>
-              </a:schemeClr>
-            </a:lnRef>
-            <a:fillRef idx="1">
-              <a:schemeClr val="accent1"/>
-            </a:fillRef>
-            <a:effectRef idx="0">
-              <a:schemeClr val="accent1"/>
-            </a:effectRef>
-            <a:fontRef idx="minor">
-              <a:schemeClr val="lt1"/>
-            </a:fontRef>
-          </p:style>
-          <p:txBody>
-            <a:bodyPr rtlCol="0" anchor="ctr"/>
-            <a:lstStyle/>
-            <a:p>
-              <a:pPr algn="ctr"/>
-              <a:endParaRPr lang="en-US"/>
-            </a:p>
-          </p:txBody>
-        </p:sp>
-        <p:sp>
-          <p:nvSpPr>
-            <p:cNvPr id="84" name="Rectangle 66">
-              <a:extLst>
-                <a:ext uri="{FF2B5EF4-FFF2-40B4-BE49-F238E27FC236}">
-                  <a16:creationId xmlns:a16="http://schemas.microsoft.com/office/drawing/2014/main" id="{13254DC8-A1E7-4028-B032-89B7BAFBC168}"/>
-                </a:ext>
-                <a:ext uri="{C183D7F6-B498-43B3-948B-1728B52AA6E4}">
-                  <adec:decorative xmlns:adec="http://schemas.microsoft.com/office/drawing/2017/decorative" val="1"/>
-                </a:ext>
-              </a:extLst>
-            </p:cNvPr>
-            <p:cNvSpPr/>
-            <p:nvPr>
-              <p:extLst>
-                <p:ext uri="{386F3935-93C4-4BCD-93E2-E3B085C9AB24}">
-                  <p16:designElem xmlns:p16="http://schemas.microsoft.com/office/powerpoint/2015/main" val="1"/>
-                </p:ext>
-              </p:extLst>
-            </p:nvPr>
-          </p:nvSpPr>
-          <p:spPr>
-            <a:xfrm>
-              <a:off x="1563586" y="246888"/>
-              <a:ext cx="54368" cy="59227"/>
-            </a:xfrm>
-            <a:prstGeom prst="ellipse">
-              <a:avLst/>
-            </a:prstGeom>
-            <a:solidFill>
-              <a:schemeClr val="accent1"/>
-            </a:solidFill>
-            <a:ln>
-              <a:noFill/>
-            </a:ln>
-          </p:spPr>
-          <p:style>
-            <a:lnRef idx="2">
-              <a:schemeClr val="accent1">
-                <a:shade val="50000"/>
-              </a:schemeClr>
-            </a:lnRef>
-            <a:fillRef idx="1">
-              <a:schemeClr val="accent1"/>
-            </a:fillRef>
-            <a:effectRef idx="0">
-              <a:schemeClr val="accent1"/>
-            </a:effectRef>
-            <a:fontRef idx="minor">
-              <a:schemeClr val="lt1"/>
-            </a:fontRef>
-          </p:style>
-          <p:txBody>
-            <a:bodyPr rtlCol="0" anchor="ctr"/>
-            <a:lstStyle/>
-            <a:p>
-              <a:pPr algn="ctr"/>
-              <a:endParaRPr lang="en-US"/>
-            </a:p>
-          </p:txBody>
-        </p:sp>
-        <p:sp>
-          <p:nvSpPr>
-            <p:cNvPr id="62" name="Rectangle 64">
-              <a:extLst>
-                <a:ext uri="{FF2B5EF4-FFF2-40B4-BE49-F238E27FC236}">
-                  <a16:creationId xmlns:a16="http://schemas.microsoft.com/office/drawing/2014/main" id="{6BDDCEFD-1260-4516-B911-1CC79660E89F}"/>
-                </a:ext>
-                <a:ext uri="{C183D7F6-B498-43B3-948B-1728B52AA6E4}">
-                  <adec:decorative xmlns:adec="http://schemas.microsoft.com/office/drawing/2017/decorative" val="1"/>
-                </a:ext>
-              </a:extLst>
-            </p:cNvPr>
-            <p:cNvSpPr/>
-            <p:nvPr>
-              <p:extLst>
-                <p:ext uri="{386F3935-93C4-4BCD-93E2-E3B085C9AB24}">
-                  <p16:designElem xmlns:p16="http://schemas.microsoft.com/office/powerpoint/2015/main" val="1"/>
-                </p:ext>
-              </p:extLst>
-            </p:nvPr>
-          </p:nvSpPr>
-          <p:spPr>
-            <a:xfrm>
-              <a:off x="1438631" y="73152"/>
-              <a:ext cx="54368" cy="59227"/>
-            </a:xfrm>
-            <a:prstGeom prst="ellipse">
-              <a:avLst/>
-            </a:prstGeom>
-            <a:solidFill>
-              <a:schemeClr val="accent1"/>
-            </a:solidFill>
-            <a:ln>
-              <a:noFill/>
-            </a:ln>
-          </p:spPr>
-          <p:style>
-            <a:lnRef idx="2">
-              <a:schemeClr val="accent1">
-                <a:shade val="50000"/>
-              </a:schemeClr>
-            </a:lnRef>
-            <a:fillRef idx="1">
-              <a:schemeClr val="accent1"/>
-            </a:fillRef>
-            <a:effectRef idx="0">
-              <a:schemeClr val="accent1"/>
-            </a:effectRef>
-            <a:fontRef idx="minor">
-              <a:schemeClr val="lt1"/>
-            </a:fontRef>
-          </p:style>
-          <p:txBody>
-            <a:bodyPr rtlCol="0" anchor="ctr"/>
-            <a:lstStyle/>
-            <a:p>
-              <a:pPr algn="ctr"/>
-              <a:endParaRPr lang="en-US"/>
-            </a:p>
-          </p:txBody>
-        </p:sp>
-        <p:sp>
-          <p:nvSpPr>
-            <p:cNvPr id="63" name="Rectangle 66">
-              <a:extLst>
-                <a:ext uri="{FF2B5EF4-FFF2-40B4-BE49-F238E27FC236}">
-                  <a16:creationId xmlns:a16="http://schemas.microsoft.com/office/drawing/2014/main" id="{EB28FCD3-DB5F-432C-ADE8-B02B50F76974}"/>
-                </a:ext>
-                <a:ext uri="{C183D7F6-B498-43B3-948B-1728B52AA6E4}">
-                  <adec:decorative xmlns:adec="http://schemas.microsoft.com/office/drawing/2017/decorative" val="1"/>
-                </a:ext>
-              </a:extLst>
-            </p:cNvPr>
-            <p:cNvSpPr/>
-            <p:nvPr>
-              <p:extLst>
-                <p:ext uri="{386F3935-93C4-4BCD-93E2-E3B085C9AB24}">
-                  <p16:designElem xmlns:p16="http://schemas.microsoft.com/office/powerpoint/2015/main" val="1"/>
-                </p:ext>
-              </p:extLst>
-            </p:nvPr>
-          </p:nvSpPr>
-          <p:spPr>
-            <a:xfrm>
-              <a:off x="1438631" y="246888"/>
-              <a:ext cx="54368" cy="59227"/>
-            </a:xfrm>
-            <a:prstGeom prst="ellipse">
-              <a:avLst/>
-            </a:prstGeom>
-            <a:solidFill>
-              <a:schemeClr val="accent1"/>
-            </a:solidFill>
-            <a:ln>
-              <a:noFill/>
-            </a:ln>
-          </p:spPr>
-          <p:style>
-            <a:lnRef idx="2">
-              <a:schemeClr val="accent1">
-                <a:shade val="50000"/>
-              </a:schemeClr>
-            </a:lnRef>
-            <a:fillRef idx="1">
-              <a:schemeClr val="accent1"/>
-            </a:fillRef>
-            <a:effectRef idx="0">
-              <a:schemeClr val="accent1"/>
-            </a:effectRef>
-            <a:fontRef idx="minor">
-              <a:schemeClr val="lt1"/>
-            </a:fontRef>
-          </p:style>
-          <p:txBody>
-            <a:bodyPr rtlCol="0" anchor="ctr"/>
-            <a:lstStyle/>
-            <a:p>
-              <a:pPr algn="ctr"/>
-              <a:endParaRPr lang="en-US"/>
-            </a:p>
-          </p:txBody>
-        </p:sp>
-        <p:sp>
-          <p:nvSpPr>
-            <p:cNvPr id="64" name="Rectangle 64">
-              <a:extLst>
-                <a:ext uri="{FF2B5EF4-FFF2-40B4-BE49-F238E27FC236}">
-                  <a16:creationId xmlns:a16="http://schemas.microsoft.com/office/drawing/2014/main" id="{B2EEF141-4E28-43F3-923D-FA6BD694DD8E}"/>
-                </a:ext>
-                <a:ext uri="{C183D7F6-B498-43B3-948B-1728B52AA6E4}">
-                  <adec:decorative xmlns:adec="http://schemas.microsoft.com/office/drawing/2017/decorative" val="1"/>
-                </a:ext>
-              </a:extLst>
-            </p:cNvPr>
-            <p:cNvSpPr/>
-            <p:nvPr>
-              <p:extLst>
-                <p:ext uri="{386F3935-93C4-4BCD-93E2-E3B085C9AB24}">
-                  <p16:designElem xmlns:p16="http://schemas.microsoft.com/office/powerpoint/2015/main" val="1"/>
-                </p:ext>
-              </p:extLst>
-            </p:nvPr>
-          </p:nvSpPr>
-          <p:spPr>
-            <a:xfrm>
-              <a:off x="1313675" y="73152"/>
-              <a:ext cx="54368" cy="59227"/>
-            </a:xfrm>
-            <a:prstGeom prst="ellipse">
-              <a:avLst/>
-            </a:prstGeom>
-            <a:solidFill>
-              <a:schemeClr val="accent1"/>
-            </a:solidFill>
-            <a:ln>
-              <a:noFill/>
-            </a:ln>
-          </p:spPr>
-          <p:style>
-            <a:lnRef idx="2">
-              <a:schemeClr val="accent1">
-                <a:shade val="50000"/>
-              </a:schemeClr>
-            </a:lnRef>
-            <a:fillRef idx="1">
-              <a:schemeClr val="accent1"/>
-            </a:fillRef>
-            <a:effectRef idx="0">
-              <a:schemeClr val="accent1"/>
-            </a:effectRef>
-            <a:fontRef idx="minor">
-              <a:schemeClr val="lt1"/>
-            </a:fontRef>
-          </p:style>
-          <p:txBody>
-            <a:bodyPr rtlCol="0" anchor="ctr"/>
-            <a:lstStyle/>
-            <a:p>
-              <a:pPr algn="ctr"/>
-              <a:endParaRPr lang="en-US"/>
-            </a:p>
-          </p:txBody>
-        </p:sp>
-        <p:sp>
-          <p:nvSpPr>
-            <p:cNvPr id="65" name="Rectangle 66">
-              <a:extLst>
-                <a:ext uri="{FF2B5EF4-FFF2-40B4-BE49-F238E27FC236}">
-                  <a16:creationId xmlns:a16="http://schemas.microsoft.com/office/drawing/2014/main" id="{5E415DC7-3700-45EF-8F34-A8047189EF52}"/>
-                </a:ext>
-                <a:ext uri="{C183D7F6-B498-43B3-948B-1728B52AA6E4}">
-                  <adec:decorative xmlns:adec="http://schemas.microsoft.com/office/drawing/2017/decorative" val="1"/>
-                </a:ext>
-              </a:extLst>
-            </p:cNvPr>
-            <p:cNvSpPr/>
-            <p:nvPr>
-              <p:extLst>
-                <p:ext uri="{386F3935-93C4-4BCD-93E2-E3B085C9AB24}">
-                  <p16:designElem xmlns:p16="http://schemas.microsoft.com/office/powerpoint/2015/main" val="1"/>
-                </p:ext>
-              </p:extLst>
-            </p:nvPr>
-          </p:nvSpPr>
-          <p:spPr>
-            <a:xfrm>
-              <a:off x="1313675" y="246888"/>
-              <a:ext cx="54368" cy="59227"/>
-            </a:xfrm>
-            <a:prstGeom prst="ellipse">
-              <a:avLst/>
-            </a:prstGeom>
-            <a:solidFill>
-              <a:schemeClr val="accent1"/>
-            </a:solidFill>
-            <a:ln>
-              <a:noFill/>
-            </a:ln>
-          </p:spPr>
-          <p:style>
-            <a:lnRef idx="2">
-              <a:schemeClr val="accent1">
-                <a:shade val="50000"/>
-              </a:schemeClr>
-            </a:lnRef>
-            <a:fillRef idx="1">
-              <a:schemeClr val="accent1"/>
-            </a:fillRef>
-            <a:effectRef idx="0">
-              <a:schemeClr val="accent1"/>
-            </a:effectRef>
-            <a:fontRef idx="minor">
-              <a:schemeClr val="lt1"/>
-            </a:fontRef>
-          </p:style>
-          <p:txBody>
-            <a:bodyPr rtlCol="0" anchor="ctr"/>
-            <a:lstStyle/>
-            <a:p>
-              <a:pPr algn="ctr"/>
-              <a:endParaRPr lang="en-US"/>
-            </a:p>
-          </p:txBody>
-        </p:sp>
-        <p:sp>
-          <p:nvSpPr>
-            <p:cNvPr id="66" name="Rectangle 64">
-              <a:extLst>
-                <a:ext uri="{FF2B5EF4-FFF2-40B4-BE49-F238E27FC236}">
-                  <a16:creationId xmlns:a16="http://schemas.microsoft.com/office/drawing/2014/main" id="{8F0A28C5-9B2F-4EF2-9558-09CBB03A1E60}"/>
-                </a:ext>
-                <a:ext uri="{C183D7F6-B498-43B3-948B-1728B52AA6E4}">
-                  <adec:decorative xmlns:adec="http://schemas.microsoft.com/office/drawing/2017/decorative" val="1"/>
-                </a:ext>
-              </a:extLst>
-            </p:cNvPr>
-            <p:cNvSpPr/>
-            <p:nvPr>
-              <p:extLst>
-                <p:ext uri="{386F3935-93C4-4BCD-93E2-E3B085C9AB24}">
-                  <p16:designElem xmlns:p16="http://schemas.microsoft.com/office/powerpoint/2015/main" val="1"/>
-                </p:ext>
-              </p:extLst>
-            </p:nvPr>
-          </p:nvSpPr>
-          <p:spPr>
-            <a:xfrm>
-              <a:off x="1188720" y="73152"/>
-              <a:ext cx="54368" cy="59227"/>
-            </a:xfrm>
-            <a:prstGeom prst="ellipse">
-              <a:avLst/>
-            </a:prstGeom>
-            <a:solidFill>
-              <a:schemeClr val="accent1"/>
-            </a:solidFill>
-            <a:ln>
-              <a:noFill/>
-            </a:ln>
-          </p:spPr>
-          <p:style>
-            <a:lnRef idx="2">
-              <a:schemeClr val="accent1">
-                <a:shade val="50000"/>
-              </a:schemeClr>
-            </a:lnRef>
-            <a:fillRef idx="1">
-              <a:schemeClr val="accent1"/>
-            </a:fillRef>
-            <a:effectRef idx="0">
-              <a:schemeClr val="accent1"/>
-            </a:effectRef>
-            <a:fontRef idx="minor">
-              <a:schemeClr val="lt1"/>
-            </a:fontRef>
-          </p:style>
-          <p:txBody>
-            <a:bodyPr rtlCol="0" anchor="ctr"/>
-            <a:lstStyle/>
-            <a:p>
-              <a:pPr algn="ctr"/>
-              <a:endParaRPr lang="en-US"/>
-            </a:p>
-          </p:txBody>
-        </p:sp>
-        <p:sp>
-          <p:nvSpPr>
-            <p:cNvPr id="67" name="Rectangle 66">
-              <a:extLst>
-                <a:ext uri="{FF2B5EF4-FFF2-40B4-BE49-F238E27FC236}">
-                  <a16:creationId xmlns:a16="http://schemas.microsoft.com/office/drawing/2014/main" id="{F3FAC98F-C21B-498D-83B7-AEAF538EE874}"/>
-                </a:ext>
-                <a:ext uri="{C183D7F6-B498-43B3-948B-1728B52AA6E4}">
-                  <adec:decorative xmlns:adec="http://schemas.microsoft.com/office/drawing/2017/decorative" val="1"/>
-                </a:ext>
-              </a:extLst>
-            </p:cNvPr>
-            <p:cNvSpPr/>
-            <p:nvPr>
-              <p:extLst>
-                <p:ext uri="{386F3935-93C4-4BCD-93E2-E3B085C9AB24}">
-                  <p16:designElem xmlns:p16="http://schemas.microsoft.com/office/powerpoint/2015/main" val="1"/>
-                </p:ext>
-              </p:extLst>
-            </p:nvPr>
-          </p:nvSpPr>
-          <p:spPr>
-            <a:xfrm>
-              <a:off x="1188720" y="246888"/>
-              <a:ext cx="54368" cy="59227"/>
-            </a:xfrm>
-            <a:prstGeom prst="ellipse">
-              <a:avLst/>
-            </a:prstGeom>
-            <a:solidFill>
-              <a:schemeClr val="accent1"/>
-            </a:solidFill>
-            <a:ln>
-              <a:noFill/>
-            </a:ln>
-          </p:spPr>
-          <p:style>
-            <a:lnRef idx="2">
-              <a:schemeClr val="accent1">
-                <a:shade val="50000"/>
-              </a:schemeClr>
-            </a:lnRef>
-            <a:fillRef idx="1">
-              <a:schemeClr val="accent1"/>
-            </a:fillRef>
-            <a:effectRef idx="0">
-              <a:schemeClr val="accent1"/>
-            </a:effectRef>
-            <a:fontRef idx="minor">
-              <a:schemeClr val="lt1"/>
-            </a:fontRef>
-          </p:style>
-          <p:txBody>
-            <a:bodyPr rtlCol="0" anchor="ctr"/>
-            <a:lstStyle/>
-            <a:p>
-              <a:pPr algn="ctr"/>
-              <a:endParaRPr lang="en-US"/>
-            </a:p>
-          </p:txBody>
-        </p:sp>
-        <p:sp>
-          <p:nvSpPr>
-            <p:cNvPr id="68" name="Rectangle 64">
-              <a:extLst>
-                <a:ext uri="{FF2B5EF4-FFF2-40B4-BE49-F238E27FC236}">
-                  <a16:creationId xmlns:a16="http://schemas.microsoft.com/office/drawing/2014/main" id="{8FE7F89D-49B8-4BEF-A533-B95F09C72E18}"/>
-                </a:ext>
-                <a:ext uri="{C183D7F6-B498-43B3-948B-1728B52AA6E4}">
-                  <adec:decorative xmlns:adec="http://schemas.microsoft.com/office/drawing/2017/decorative" val="1"/>
-                </a:ext>
-              </a:extLst>
-            </p:cNvPr>
-            <p:cNvSpPr/>
-            <p:nvPr>
-              <p:extLst>
-                <p:ext uri="{386F3935-93C4-4BCD-93E2-E3B085C9AB24}">
-                  <p16:designElem xmlns:p16="http://schemas.microsoft.com/office/powerpoint/2015/main" val="1"/>
-                </p:ext>
-              </p:extLst>
-            </p:nvPr>
-          </p:nvSpPr>
-          <p:spPr>
-            <a:xfrm>
-              <a:off x="2313318" y="73152"/>
-              <a:ext cx="54368" cy="59227"/>
-            </a:xfrm>
-            <a:prstGeom prst="ellipse">
-              <a:avLst/>
-            </a:prstGeom>
-            <a:solidFill>
-              <a:schemeClr val="accent1"/>
-            </a:solidFill>
-            <a:ln>
-              <a:noFill/>
-            </a:ln>
-          </p:spPr>
-          <p:style>
-            <a:lnRef idx="2">
-              <a:schemeClr val="accent1">
-                <a:shade val="50000"/>
-              </a:schemeClr>
-            </a:lnRef>
-            <a:fillRef idx="1">
-              <a:schemeClr val="accent1"/>
-            </a:fillRef>
-            <a:effectRef idx="0">
-              <a:schemeClr val="accent1"/>
-            </a:effectRef>
-            <a:fontRef idx="minor">
-              <a:schemeClr val="lt1"/>
-            </a:fontRef>
-          </p:style>
-          <p:txBody>
-            <a:bodyPr rtlCol="0" anchor="ctr"/>
-            <a:lstStyle/>
-            <a:p>
-              <a:pPr algn="ctr"/>
-              <a:endParaRPr lang="en-US"/>
-            </a:p>
-          </p:txBody>
-        </p:sp>
-        <p:sp>
-          <p:nvSpPr>
-            <p:cNvPr id="69" name="Rectangle 66">
-              <a:extLst>
-                <a:ext uri="{FF2B5EF4-FFF2-40B4-BE49-F238E27FC236}">
-                  <a16:creationId xmlns:a16="http://schemas.microsoft.com/office/drawing/2014/main" id="{B95A4054-4049-43CC-989B-01F4D97723D1}"/>
-                </a:ext>
-                <a:ext uri="{C183D7F6-B498-43B3-948B-1728B52AA6E4}">
-                  <adec:decorative xmlns:adec="http://schemas.microsoft.com/office/drawing/2017/decorative" val="1"/>
-                </a:ext>
-              </a:extLst>
-            </p:cNvPr>
-            <p:cNvSpPr/>
-            <p:nvPr>
-              <p:extLst>
-                <p:ext uri="{386F3935-93C4-4BCD-93E2-E3B085C9AB24}">
-                  <p16:designElem xmlns:p16="http://schemas.microsoft.com/office/powerpoint/2015/main" val="1"/>
-                </p:ext>
-              </p:extLst>
-            </p:nvPr>
-          </p:nvSpPr>
-          <p:spPr>
-            <a:xfrm>
-              <a:off x="2313318" y="246888"/>
-              <a:ext cx="54368" cy="59227"/>
-            </a:xfrm>
-            <a:prstGeom prst="ellipse">
-              <a:avLst/>
-            </a:prstGeom>
-            <a:solidFill>
-              <a:schemeClr val="accent1"/>
-            </a:solidFill>
-            <a:ln>
-              <a:noFill/>
-            </a:ln>
-          </p:spPr>
-          <p:style>
-            <a:lnRef idx="2">
-              <a:schemeClr val="accent1">
-                <a:shade val="50000"/>
-              </a:schemeClr>
-            </a:lnRef>
-            <a:fillRef idx="1">
-              <a:schemeClr val="accent1"/>
-            </a:fillRef>
-            <a:effectRef idx="0">
-              <a:schemeClr val="accent1"/>
-            </a:effectRef>
-            <a:fontRef idx="minor">
-              <a:schemeClr val="lt1"/>
-            </a:fontRef>
-          </p:style>
-          <p:txBody>
-            <a:bodyPr rtlCol="0" anchor="ctr"/>
-            <a:lstStyle/>
-            <a:p>
-              <a:pPr algn="ctr"/>
-              <a:endParaRPr lang="en-US"/>
-            </a:p>
-          </p:txBody>
-        </p:sp>
-        <p:sp>
-          <p:nvSpPr>
-            <p:cNvPr id="70" name="Rectangle 64">
-              <a:extLst>
-                <a:ext uri="{FF2B5EF4-FFF2-40B4-BE49-F238E27FC236}">
-                  <a16:creationId xmlns:a16="http://schemas.microsoft.com/office/drawing/2014/main" id="{5E9EFD93-D66A-4FD3-9713-937F7AEE42AB}"/>
-                </a:ext>
-                <a:ext uri="{C183D7F6-B498-43B3-948B-1728B52AA6E4}">
-                  <adec:decorative xmlns:adec="http://schemas.microsoft.com/office/drawing/2017/decorative" val="1"/>
-                </a:ext>
-              </a:extLst>
-            </p:cNvPr>
-            <p:cNvSpPr/>
-            <p:nvPr>
-              <p:extLst>
-                <p:ext uri="{386F3935-93C4-4BCD-93E2-E3B085C9AB24}">
-                  <p16:designElem xmlns:p16="http://schemas.microsoft.com/office/powerpoint/2015/main" val="1"/>
-                </p:ext>
-              </p:extLst>
-            </p:nvPr>
-          </p:nvSpPr>
-          <p:spPr>
-            <a:xfrm>
-              <a:off x="2188363" y="73152"/>
-              <a:ext cx="54368" cy="59227"/>
-            </a:xfrm>
-            <a:prstGeom prst="ellipse">
-              <a:avLst/>
-            </a:prstGeom>
-            <a:solidFill>
-              <a:schemeClr val="accent1"/>
-            </a:solidFill>
-            <a:ln>
-              <a:noFill/>
-            </a:ln>
-          </p:spPr>
-          <p:style>
-            <a:lnRef idx="2">
-              <a:schemeClr val="accent1">
-                <a:shade val="50000"/>
-              </a:schemeClr>
-            </a:lnRef>
-            <a:fillRef idx="1">
-              <a:schemeClr val="accent1"/>
-            </a:fillRef>
-            <a:effectRef idx="0">
-              <a:schemeClr val="accent1"/>
-            </a:effectRef>
-            <a:fontRef idx="minor">
-              <a:schemeClr val="lt1"/>
-            </a:fontRef>
-          </p:style>
-          <p:txBody>
-            <a:bodyPr rtlCol="0" anchor="ctr"/>
-            <a:lstStyle/>
-            <a:p>
-              <a:pPr algn="ctr"/>
-              <a:endParaRPr lang="en-US"/>
-            </a:p>
-          </p:txBody>
-        </p:sp>
-        <p:sp>
-          <p:nvSpPr>
-            <p:cNvPr id="71" name="Rectangle 66">
-              <a:extLst>
-                <a:ext uri="{FF2B5EF4-FFF2-40B4-BE49-F238E27FC236}">
-                  <a16:creationId xmlns:a16="http://schemas.microsoft.com/office/drawing/2014/main" id="{8274E9C4-B6DD-4A1E-8509-269F17BEA178}"/>
-                </a:ext>
-                <a:ext uri="{C183D7F6-B498-43B3-948B-1728B52AA6E4}">
-                  <adec:decorative xmlns:adec="http://schemas.microsoft.com/office/drawing/2017/decorative" val="1"/>
-                </a:ext>
-              </a:extLst>
-            </p:cNvPr>
-            <p:cNvSpPr/>
-            <p:nvPr>
-              <p:extLst>
-                <p:ext uri="{386F3935-93C4-4BCD-93E2-E3B085C9AB24}">
-                  <p16:designElem xmlns:p16="http://schemas.microsoft.com/office/powerpoint/2015/main" val="1"/>
-                </p:ext>
-              </p:extLst>
-            </p:nvPr>
-          </p:nvSpPr>
-          <p:spPr>
-            <a:xfrm>
-              <a:off x="2188363" y="246888"/>
-              <a:ext cx="54368" cy="59227"/>
-            </a:xfrm>
-            <a:prstGeom prst="ellipse">
-              <a:avLst/>
-            </a:prstGeom>
-            <a:solidFill>
-              <a:schemeClr val="accent1"/>
-            </a:solidFill>
-            <a:ln>
-              <a:noFill/>
-            </a:ln>
-          </p:spPr>
-          <p:style>
-            <a:lnRef idx="2">
-              <a:schemeClr val="accent1">
-                <a:shade val="50000"/>
-              </a:schemeClr>
-            </a:lnRef>
-            <a:fillRef idx="1">
-              <a:schemeClr val="accent1"/>
-            </a:fillRef>
-            <a:effectRef idx="0">
-              <a:schemeClr val="accent1"/>
-            </a:effectRef>
-            <a:fontRef idx="minor">
-              <a:schemeClr val="lt1"/>
-            </a:fontRef>
-          </p:style>
-          <p:txBody>
-            <a:bodyPr rtlCol="0" anchor="ctr"/>
-            <a:lstStyle/>
-            <a:p>
-              <a:pPr algn="ctr"/>
-              <a:endParaRPr lang="en-US"/>
-            </a:p>
-          </p:txBody>
-        </p:sp>
-        <p:sp>
-          <p:nvSpPr>
-            <p:cNvPr id="72" name="Rectangle 64">
-              <a:extLst>
-                <a:ext uri="{FF2B5EF4-FFF2-40B4-BE49-F238E27FC236}">
-                  <a16:creationId xmlns:a16="http://schemas.microsoft.com/office/drawing/2014/main" id="{D6D9BBC0-9046-4433-85EA-BE768C8E69F1}"/>
-                </a:ext>
-                <a:ext uri="{C183D7F6-B498-43B3-948B-1728B52AA6E4}">
-                  <adec:decorative xmlns:adec="http://schemas.microsoft.com/office/drawing/2017/decorative" val="1"/>
-                </a:ext>
-              </a:extLst>
-            </p:cNvPr>
-            <p:cNvSpPr/>
-            <p:nvPr>
-              <p:extLst>
-                <p:ext uri="{386F3935-93C4-4BCD-93E2-E3B085C9AB24}">
-                  <p16:designElem xmlns:p16="http://schemas.microsoft.com/office/powerpoint/2015/main" val="1"/>
-                </p:ext>
-              </p:extLst>
-            </p:nvPr>
-          </p:nvSpPr>
-          <p:spPr>
-            <a:xfrm>
-              <a:off x="2063408" y="73152"/>
-              <a:ext cx="54368" cy="59227"/>
-            </a:xfrm>
-            <a:prstGeom prst="ellipse">
-              <a:avLst/>
-            </a:prstGeom>
-            <a:solidFill>
-              <a:schemeClr val="accent1"/>
-            </a:solidFill>
-            <a:ln>
-              <a:noFill/>
-            </a:ln>
-          </p:spPr>
-          <p:style>
-            <a:lnRef idx="2">
-              <a:schemeClr val="accent1">
-                <a:shade val="50000"/>
-              </a:schemeClr>
-            </a:lnRef>
-            <a:fillRef idx="1">
-              <a:schemeClr val="accent1"/>
-            </a:fillRef>
-            <a:effectRef idx="0">
-              <a:schemeClr val="accent1"/>
-            </a:effectRef>
-            <a:fontRef idx="minor">
-              <a:schemeClr val="lt1"/>
-            </a:fontRef>
-          </p:style>
-          <p:txBody>
-            <a:bodyPr rtlCol="0" anchor="ctr"/>
-            <a:lstStyle/>
-            <a:p>
-              <a:pPr algn="ctr"/>
-              <a:endParaRPr lang="en-US"/>
-            </a:p>
-          </p:txBody>
-        </p:sp>
-        <p:sp>
-          <p:nvSpPr>
-            <p:cNvPr id="73" name="Rectangle 66">
-              <a:extLst>
-                <a:ext uri="{FF2B5EF4-FFF2-40B4-BE49-F238E27FC236}">
-                  <a16:creationId xmlns:a16="http://schemas.microsoft.com/office/drawing/2014/main" id="{3EE2B895-7446-4B17-BB3C-EBCB0A1295E3}"/>
-                </a:ext>
-                <a:ext uri="{C183D7F6-B498-43B3-948B-1728B52AA6E4}">
-                  <adec:decorative xmlns:adec="http://schemas.microsoft.com/office/drawing/2017/decorative" val="1"/>
-                </a:ext>
-              </a:extLst>
-            </p:cNvPr>
-            <p:cNvSpPr/>
-            <p:nvPr>
-              <p:extLst>
-                <p:ext uri="{386F3935-93C4-4BCD-93E2-E3B085C9AB24}">
-                  <p16:designElem xmlns:p16="http://schemas.microsoft.com/office/powerpoint/2015/main" val="1"/>
-                </p:ext>
-              </p:extLst>
-            </p:nvPr>
-          </p:nvSpPr>
-          <p:spPr>
-            <a:xfrm>
-              <a:off x="2063408" y="246888"/>
-              <a:ext cx="54368" cy="59227"/>
-            </a:xfrm>
-            <a:prstGeom prst="ellipse">
-              <a:avLst/>
-            </a:prstGeom>
-            <a:solidFill>
-              <a:schemeClr val="accent1"/>
-            </a:solidFill>
-            <a:ln>
-              <a:noFill/>
-            </a:ln>
-          </p:spPr>
-          <p:style>
-            <a:lnRef idx="2">
-              <a:schemeClr val="accent1">
-                <a:shade val="50000"/>
-              </a:schemeClr>
-            </a:lnRef>
-            <a:fillRef idx="1">
-              <a:schemeClr val="accent1"/>
-            </a:fillRef>
-            <a:effectRef idx="0">
-              <a:schemeClr val="accent1"/>
-            </a:effectRef>
-            <a:fontRef idx="minor">
-              <a:schemeClr val="lt1"/>
-            </a:fontRef>
-          </p:style>
-          <p:txBody>
-            <a:bodyPr rtlCol="0" anchor="ctr"/>
-            <a:lstStyle/>
-            <a:p>
-              <a:pPr algn="ctr"/>
-              <a:endParaRPr lang="en-US"/>
-            </a:p>
-          </p:txBody>
-        </p:sp>
-        <p:sp>
-          <p:nvSpPr>
-            <p:cNvPr id="74" name="Rectangle 64">
-              <a:extLst>
-                <a:ext uri="{FF2B5EF4-FFF2-40B4-BE49-F238E27FC236}">
-                  <a16:creationId xmlns:a16="http://schemas.microsoft.com/office/drawing/2014/main" id="{96832364-A27D-4056-A837-2A830B85BCC3}"/>
-                </a:ext>
-                <a:ext uri="{C183D7F6-B498-43B3-948B-1728B52AA6E4}">
-                  <adec:decorative xmlns:adec="http://schemas.microsoft.com/office/drawing/2017/decorative" val="1"/>
-                </a:ext>
-              </a:extLst>
-            </p:cNvPr>
-            <p:cNvSpPr/>
-            <p:nvPr>
-              <p:extLst>
-                <p:ext uri="{386F3935-93C4-4BCD-93E2-E3B085C9AB24}">
-                  <p16:designElem xmlns:p16="http://schemas.microsoft.com/office/powerpoint/2015/main" val="1"/>
-                </p:ext>
-              </p:extLst>
-            </p:nvPr>
-          </p:nvSpPr>
-          <p:spPr>
-            <a:xfrm>
-              <a:off x="1938452" y="73152"/>
-              <a:ext cx="54368" cy="59227"/>
-            </a:xfrm>
-            <a:prstGeom prst="ellipse">
-              <a:avLst/>
-            </a:prstGeom>
-            <a:solidFill>
-              <a:schemeClr val="accent1"/>
-            </a:solidFill>
-            <a:ln>
-              <a:noFill/>
-            </a:ln>
-          </p:spPr>
-          <p:style>
-            <a:lnRef idx="2">
-              <a:schemeClr val="accent1">
-                <a:shade val="50000"/>
-              </a:schemeClr>
-            </a:lnRef>
-            <a:fillRef idx="1">
-              <a:schemeClr val="accent1"/>
-            </a:fillRef>
-            <a:effectRef idx="0">
-              <a:schemeClr val="accent1"/>
-            </a:effectRef>
-            <a:fontRef idx="minor">
-              <a:schemeClr val="lt1"/>
-            </a:fontRef>
-          </p:style>
-          <p:txBody>
-            <a:bodyPr rtlCol="0" anchor="ctr"/>
-            <a:lstStyle/>
-            <a:p>
-              <a:pPr algn="ctr"/>
-              <a:endParaRPr lang="en-US"/>
-            </a:p>
-          </p:txBody>
-        </p:sp>
-        <p:sp>
-          <p:nvSpPr>
-            <p:cNvPr id="75" name="Rectangle 66">
-              <a:extLst>
-                <a:ext uri="{FF2B5EF4-FFF2-40B4-BE49-F238E27FC236}">
-                  <a16:creationId xmlns:a16="http://schemas.microsoft.com/office/drawing/2014/main" id="{12C6A8FF-B718-4462-9766-52B110C884EC}"/>
-                </a:ext>
-                <a:ext uri="{C183D7F6-B498-43B3-948B-1728B52AA6E4}">
-                  <adec:decorative xmlns:adec="http://schemas.microsoft.com/office/drawing/2017/decorative" val="1"/>
-                </a:ext>
-              </a:extLst>
-            </p:cNvPr>
-            <p:cNvSpPr/>
-            <p:nvPr>
-              <p:extLst>
-                <p:ext uri="{386F3935-93C4-4BCD-93E2-E3B085C9AB24}">
-                  <p16:designElem xmlns:p16="http://schemas.microsoft.com/office/powerpoint/2015/main" val="1"/>
-                </p:ext>
-              </p:extLst>
-            </p:nvPr>
-          </p:nvSpPr>
-          <p:spPr>
-            <a:xfrm>
-              <a:off x="1938452" y="246888"/>
-              <a:ext cx="54368" cy="59227"/>
-            </a:xfrm>
-            <a:prstGeom prst="ellipse">
-              <a:avLst/>
-            </a:prstGeom>
-            <a:solidFill>
-              <a:schemeClr val="accent1"/>
-            </a:solidFill>
-            <a:ln>
-              <a:noFill/>
-            </a:ln>
-          </p:spPr>
-          <p:style>
-            <a:lnRef idx="2">
-              <a:schemeClr val="accent1">
-                <a:shade val="50000"/>
-              </a:schemeClr>
-            </a:lnRef>
-            <a:fillRef idx="1">
-              <a:schemeClr val="accent1"/>
-            </a:fillRef>
-            <a:effectRef idx="0">
-              <a:schemeClr val="accent1"/>
-            </a:effectRef>
-            <a:fontRef idx="minor">
-              <a:schemeClr val="lt1"/>
-            </a:fontRef>
-          </p:style>
-          <p:txBody>
-            <a:bodyPr rtlCol="0" anchor="ctr"/>
-            <a:lstStyle/>
-            <a:p>
-              <a:pPr algn="ctr"/>
-              <a:endParaRPr lang="en-US"/>
-            </a:p>
-          </p:txBody>
-        </p:sp>
-        <p:sp>
-          <p:nvSpPr>
-            <p:cNvPr id="76" name="Rectangle 64">
-              <a:extLst>
-                <a:ext uri="{FF2B5EF4-FFF2-40B4-BE49-F238E27FC236}">
-                  <a16:creationId xmlns:a16="http://schemas.microsoft.com/office/drawing/2014/main" id="{5AA93369-D473-4031-87F8-AC333CDF4478}"/>
-                </a:ext>
-                <a:ext uri="{C183D7F6-B498-43B3-948B-1728B52AA6E4}">
-                  <adec:decorative xmlns:adec="http://schemas.microsoft.com/office/drawing/2017/decorative" val="1"/>
-                </a:ext>
-              </a:extLst>
-            </p:cNvPr>
-            <p:cNvSpPr/>
-            <p:nvPr>
-              <p:extLst>
-                <p:ext uri="{386F3935-93C4-4BCD-93E2-E3B085C9AB24}">
-                  <p16:designElem xmlns:p16="http://schemas.microsoft.com/office/powerpoint/2015/main" val="1"/>
-                </p:ext>
-              </p:extLst>
-            </p:nvPr>
-          </p:nvSpPr>
-          <p:spPr>
-            <a:xfrm>
-              <a:off x="1813497" y="73152"/>
-              <a:ext cx="54368" cy="59227"/>
-            </a:xfrm>
-            <a:prstGeom prst="ellipse">
-              <a:avLst/>
-            </a:prstGeom>
-            <a:solidFill>
-              <a:schemeClr val="accent1"/>
-            </a:solidFill>
-            <a:ln>
-              <a:noFill/>
-            </a:ln>
-          </p:spPr>
-          <p:style>
-            <a:lnRef idx="2">
-              <a:schemeClr val="accent1">
-                <a:shade val="50000"/>
-              </a:schemeClr>
-            </a:lnRef>
-            <a:fillRef idx="1">
-              <a:schemeClr val="accent1"/>
-            </a:fillRef>
-            <a:effectRef idx="0">
-              <a:schemeClr val="accent1"/>
-            </a:effectRef>
-            <a:fontRef idx="minor">
-              <a:schemeClr val="lt1"/>
-            </a:fontRef>
-          </p:style>
-          <p:txBody>
-            <a:bodyPr rtlCol="0" anchor="ctr"/>
-            <a:lstStyle/>
-            <a:p>
-              <a:pPr algn="ctr"/>
-              <a:endParaRPr lang="en-US"/>
-            </a:p>
-          </p:txBody>
-        </p:sp>
-        <p:sp>
-          <p:nvSpPr>
-            <p:cNvPr id="77" name="Rectangle 66">
-              <a:extLst>
-                <a:ext uri="{FF2B5EF4-FFF2-40B4-BE49-F238E27FC236}">
-                  <a16:creationId xmlns:a16="http://schemas.microsoft.com/office/drawing/2014/main" id="{53053604-739D-43EE-9619-E4C4104A38FD}"/>
-                </a:ext>
-                <a:ext uri="{C183D7F6-B498-43B3-948B-1728B52AA6E4}">
-                  <adec:decorative xmlns:adec="http://schemas.microsoft.com/office/drawing/2017/decorative" val="1"/>
-                </a:ext>
-              </a:extLst>
-            </p:cNvPr>
-            <p:cNvSpPr/>
-            <p:nvPr>
-              <p:extLst>
-                <p:ext uri="{386F3935-93C4-4BCD-93E2-E3B085C9AB24}">
-                  <p16:designElem xmlns:p16="http://schemas.microsoft.com/office/powerpoint/2015/main" val="1"/>
-                </p:ext>
-              </p:extLst>
-            </p:nvPr>
-          </p:nvSpPr>
-          <p:spPr>
-            <a:xfrm>
-              <a:off x="1813497" y="246888"/>
-              <a:ext cx="54368" cy="59227"/>
-            </a:xfrm>
-            <a:prstGeom prst="ellipse">
-              <a:avLst/>
-            </a:prstGeom>
-            <a:solidFill>
-              <a:schemeClr val="accent1"/>
-            </a:solidFill>
-            <a:ln>
-              <a:noFill/>
-            </a:ln>
-          </p:spPr>
-          <p:style>
-            <a:lnRef idx="2">
-              <a:schemeClr val="accent1">
-                <a:shade val="50000"/>
-              </a:schemeClr>
-            </a:lnRef>
-            <a:fillRef idx="1">
-              <a:schemeClr val="accent1"/>
-            </a:fillRef>
-            <a:effectRef idx="0">
-              <a:schemeClr val="accent1"/>
-            </a:effectRef>
-            <a:fontRef idx="minor">
-              <a:schemeClr val="lt1"/>
-            </a:fontRef>
-          </p:style>
-          <p:txBody>
-            <a:bodyPr rtlCol="0" anchor="ctr"/>
-            <a:lstStyle/>
-            <a:p>
-              <a:pPr algn="ctr"/>
-              <a:endParaRPr lang="en-US"/>
-            </a:p>
-          </p:txBody>
-        </p:sp>
-      </p:grpSp>
-      <p:pic>
-        <p:nvPicPr>
-          <p:cNvPr id="6" name="Content Placeholder 5" descr="A person holding a cake&#10;&#10;Description automatically generated with low confidence">
-            <a:extLst>
-              <a:ext uri="{FF2B5EF4-FFF2-40B4-BE49-F238E27FC236}">
-                <a16:creationId xmlns:a16="http://schemas.microsoft.com/office/drawing/2014/main" id="{7EE612B4-BD18-0764-D5CC-9BCEF00967CF}"/>
-              </a:ext>
-            </a:extLst>
-          </p:cNvPr>
-          <p:cNvPicPr>
-            <a:picLocks noChangeAspect="1"/>
-          </p:cNvPicPr>
-          <p:nvPr/>
-        </p:nvPicPr>
-        <p:blipFill rotWithShape="1">
-          <a:blip r:embed="rId2">
-            <a:extLst>
-              <a:ext uri="{28A0092B-C50C-407E-A947-70E740481C1C}">
-                <a14:useLocalDpi xmlns:a14="http://schemas.microsoft.com/office/drawing/2010/main" val="0"/>
-              </a:ext>
-            </a:extLst>
-          </a:blip>
-          <a:srcRect r="-3" b="7356"/>
-          <a:stretch/>
-        </p:blipFill>
-        <p:spPr>
-          <a:xfrm>
-            <a:off x="6606643" y="10"/>
-            <a:ext cx="5585357" cy="3233973"/>
-          </a:xfrm>
-          <a:prstGeom prst="rect">
-            <a:avLst/>
-          </a:prstGeom>
-        </p:spPr>
-      </p:pic>
-      <p:sp>
-        <p:nvSpPr>
-          <p:cNvPr id="79" name="Rectangle 78">
-            <a:extLst>
-              <a:ext uri="{FF2B5EF4-FFF2-40B4-BE49-F238E27FC236}">
-                <a16:creationId xmlns:a16="http://schemas.microsoft.com/office/drawing/2014/main" id="{D6C80E47-971C-437F-B030-191115B01D68}"/>
-              </a:ext>
-              <a:ext uri="{C183D7F6-B498-43B3-948B-1728B52AA6E4}">
-                <adec:decorative xmlns:adec="http://schemas.microsoft.com/office/drawing/2017/decorative" val="1"/>
-              </a:ext>
-            </a:extLst>
-          </p:cNvPr>
-          <p:cNvSpPr>
-            <a:spLocks noGrp="1" noRot="1" noChangeAspect="1" noMove="1" noResize="1" noEditPoints="1" noAdjustHandles="1" noChangeArrowheads="1" noChangeShapeType="1" noTextEdit="1"/>
-          </p:cNvSpPr>
-          <p:nvPr>
-            <p:extLst>
-              <p:ext uri="{386F3935-93C4-4BCD-93E2-E3B085C9AB24}">
-                <p16:designElem xmlns:p16="http://schemas.microsoft.com/office/powerpoint/2015/main" val="1"/>
-              </p:ext>
-            </p:extLst>
-          </p:nvPr>
-        </p:nvSpPr>
-        <p:spPr>
-          <a:xfrm>
-            <a:off x="-1" y="3233982"/>
-            <a:ext cx="606972" cy="3624017"/>
-          </a:xfrm>
-          <a:prstGeom prst="rect">
-            <a:avLst/>
-          </a:prstGeom>
-          <a:solidFill>
-            <a:schemeClr val="accent1"/>
-          </a:solidFill>
-          <a:ln>
-            <a:noFill/>
-          </a:ln>
-        </p:spPr>
-        <p:style>
-          <a:lnRef idx="2">
-            <a:schemeClr val="accent1">
-              <a:shade val="50000"/>
-            </a:schemeClr>
-          </a:lnRef>
-          <a:fillRef idx="1">
-            <a:schemeClr val="accent1"/>
-          </a:fillRef>
-          <a:effectRef idx="0">
-            <a:schemeClr val="accent1"/>
-          </a:effectRef>
-          <a:fontRef idx="minor">
-            <a:schemeClr val="lt1"/>
-          </a:fontRef>
-        </p:style>
-        <p:txBody>
-          <a:bodyPr rtlCol="0" anchor="ctr"/>
-          <a:lstStyle/>
-          <a:p>
-            <a:pPr algn="ctr"/>
-            <a:endParaRPr lang="en-US"/>
-          </a:p>
-        </p:txBody>
-      </p:sp>
-      <p:sp>
-        <p:nvSpPr>
-          <p:cNvPr id="36" name="Content Placeholder 19">
-            <a:extLst>
-              <a:ext uri="{FF2B5EF4-FFF2-40B4-BE49-F238E27FC236}">
-                <a16:creationId xmlns:a16="http://schemas.microsoft.com/office/drawing/2014/main" id="{636AC43C-7650-890A-D05A-258C4E4CD1DD}"/>
-              </a:ext>
-            </a:extLst>
-          </p:cNvPr>
-          <p:cNvSpPr>
-            <a:spLocks noGrp="1"/>
-          </p:cNvSpPr>
-          <p:nvPr>
-            <p:ph sz="half" idx="1"/>
-          </p:nvPr>
-        </p:nvSpPr>
-        <p:spPr>
-          <a:xfrm>
-            <a:off x="1166649" y="3540334"/>
-            <a:ext cx="4929351" cy="3026004"/>
-          </a:xfrm>
-        </p:spPr>
-        <p:txBody>
-          <a:bodyPr vert="horz" lIns="91440" tIns="45720" rIns="91440" bIns="45720" rtlCol="0" anchor="ctr">
-            <a:normAutofit/>
-          </a:bodyPr>
-          <a:lstStyle/>
-          <a:p>
-            <a:r>
-              <a:rPr lang="en-US" sz="1800" dirty="0">
-                <a:effectLst/>
-                <a:latin typeface="Calibri" panose="020F0502020204030204" pitchFamily="34" charset="0"/>
-                <a:ea typeface="Calibri" panose="020F0502020204030204" pitchFamily="34" charset="0"/>
-                <a:cs typeface="Times New Roman" panose="02020603050405020304" pitchFamily="18" charset="0"/>
-              </a:rPr>
-              <a:t>Which are the main differences in their scholastic, familiar, psychological characteristic?</a:t>
-            </a:r>
-          </a:p>
-          <a:p>
-            <a:endParaRPr lang="en-US" sz="1800" dirty="0"/>
-          </a:p>
-        </p:txBody>
-      </p:sp>
-      <p:pic>
-        <p:nvPicPr>
-          <p:cNvPr id="21" name="Content Placeholder 20" descr="A group of people sitting at a table&#10;&#10;Description automatically generated with low confidence">
-            <a:extLst>
-              <a:ext uri="{FF2B5EF4-FFF2-40B4-BE49-F238E27FC236}">
-                <a16:creationId xmlns:a16="http://schemas.microsoft.com/office/drawing/2014/main" id="{737E3574-1C1E-BC2B-1F59-16A22A018F67}"/>
-              </a:ext>
-            </a:extLst>
-          </p:cNvPr>
-          <p:cNvPicPr>
-            <a:picLocks noGrp="1" noChangeAspect="1"/>
-          </p:cNvPicPr>
-          <p:nvPr>
-            <p:ph sz="half" idx="2"/>
-          </p:nvPr>
-        </p:nvPicPr>
-        <p:blipFill rotWithShape="1">
-          <a:blip r:embed="rId3">
-            <a:extLst>
-              <a:ext uri="{28A0092B-C50C-407E-A947-70E740481C1C}">
-                <a14:useLocalDpi xmlns:a14="http://schemas.microsoft.com/office/drawing/2010/main" val="0"/>
-              </a:ext>
-            </a:extLst>
-          </a:blip>
-          <a:srcRect r="13060"/>
-          <a:stretch/>
-        </p:blipFill>
-        <p:spPr>
-          <a:xfrm>
-            <a:off x="6606643" y="3244257"/>
-            <a:ext cx="5585357" cy="3613743"/>
-          </a:xfrm>
-          <a:prstGeom prst="rect">
-            <a:avLst/>
-          </a:prstGeom>
-        </p:spPr>
-      </p:pic>
-    </p:spTree>
-    <p:extLst>
-      <p:ext uri="{BB962C8B-B14F-4D97-AF65-F5344CB8AC3E}">
-        <p14:creationId xmlns:p14="http://schemas.microsoft.com/office/powerpoint/2010/main" val="2908651650"/>
-      </p:ext>
-    </p:extLst>
-  </p:cSld>
-  <p:clrMapOvr>
-    <a:masterClrMapping/>
-  </p:clrMapOvr>
-</p:sld>
-</file>
-
-<file path=ppt/slides/slide9.xml><?xml version="1.0" encoding="utf-8"?>
-<p:sld xmlns:a="http://schemas.openxmlformats.org/drawingml/2006/main" xmlns:r="http://schemas.openxmlformats.org/officeDocument/2006/relationships" xmlns:p="http://schemas.openxmlformats.org/presentationml/2006/main">
-  <p:cSld>
-    <p:bg>
-      <p:bgPr>
-        <a:solidFill>
-          <a:schemeClr val="bg1"/>
-        </a:solidFill>
-        <a:effectLst/>
-      </p:bgPr>
-    </p:bg>
-    <p:spTree>
-      <p:nvGrpSpPr>
-        <p:cNvPr id="1" name=""/>
-        <p:cNvGrpSpPr/>
-        <p:nvPr/>
-      </p:nvGrpSpPr>
-      <p:grpSpPr>
-        <a:xfrm>
-          <a:off x="0" y="0"/>
-          <a:ext cx="0" cy="0"/>
-          <a:chOff x="0" y="0"/>
-          <a:chExt cx="0" cy="0"/>
-        </a:xfrm>
-      </p:grpSpPr>
-      <p:sp useBgFill="1">
-        <p:nvSpPr>
-          <p:cNvPr id="42" name="Rectangle 41">
-            <a:extLst>
-              <a:ext uri="{FF2B5EF4-FFF2-40B4-BE49-F238E27FC236}">
-                <a16:creationId xmlns:a16="http://schemas.microsoft.com/office/drawing/2014/main" id="{04812C46-200A-4DEB-A05E-3ED6C68C2387}"/>
-              </a:ext>
-              <a:ext uri="{C183D7F6-B498-43B3-948B-1728B52AA6E4}">
-                <adec:decorative xmlns:adec="http://schemas.microsoft.com/office/drawing/2017/decorative" val="1"/>
-              </a:ext>
-            </a:extLst>
-          </p:cNvPr>
-          <p:cNvSpPr>
-            <a:spLocks noGrp="1" noRot="1" noChangeAspect="1" noMove="1" noResize="1" noEditPoints="1" noAdjustHandles="1" noChangeArrowheads="1" noChangeShapeType="1" noTextEdit="1"/>
-          </p:cNvSpPr>
-          <p:nvPr>
-            <p:extLst>
-              <p:ext uri="{386F3935-93C4-4BCD-93E2-E3B085C9AB24}">
-                <p16:designElem xmlns:p16="http://schemas.microsoft.com/office/powerpoint/2015/main" val="1"/>
-              </p:ext>
-            </p:extLst>
-          </p:nvPr>
-        </p:nvSpPr>
-        <p:spPr>
-          <a:xfrm>
-            <a:off x="-1" y="0"/>
-            <a:ext cx="12188952" cy="6858000"/>
-          </a:xfrm>
-          <a:prstGeom prst="rect">
-            <a:avLst/>
-          </a:prstGeom>
-          <a:ln>
-            <a:noFill/>
-          </a:ln>
-        </p:spPr>
-        <p:style>
-          <a:lnRef idx="2">
-            <a:schemeClr val="accent1">
-              <a:shade val="50000"/>
-            </a:schemeClr>
-          </a:lnRef>
-          <a:fillRef idx="1">
-            <a:schemeClr val="accent1"/>
-          </a:fillRef>
-          <a:effectRef idx="0">
-            <a:schemeClr val="accent1"/>
-          </a:effectRef>
-          <a:fontRef idx="minor">
-            <a:schemeClr val="lt1"/>
-          </a:fontRef>
-        </p:style>
-        <p:txBody>
-          <a:bodyPr rtlCol="0" anchor="ctr"/>
-          <a:lstStyle/>
-          <a:p>
-            <a:pPr algn="ctr"/>
-            <a:endParaRPr lang="en-US"/>
-          </a:p>
-        </p:txBody>
-      </p:sp>
-      <p:pic>
-        <p:nvPicPr>
-          <p:cNvPr id="6" name="Content Placeholder 5" descr="A group of people holding a flag&#10;&#10;Description automatically generated">
-            <a:extLst>
-              <a:ext uri="{FF2B5EF4-FFF2-40B4-BE49-F238E27FC236}">
-                <a16:creationId xmlns:a16="http://schemas.microsoft.com/office/drawing/2014/main" id="{4337183A-AEB8-B6DD-2CB1-9A2D811269F2}"/>
-              </a:ext>
-            </a:extLst>
-          </p:cNvPr>
-          <p:cNvPicPr>
-            <a:picLocks noGrp="1" noChangeAspect="1"/>
-          </p:cNvPicPr>
-          <p:nvPr>
-            <p:ph idx="1"/>
-          </p:nvPr>
-        </p:nvPicPr>
-        <p:blipFill rotWithShape="1">
-          <a:blip r:embed="rId2">
-            <a:extLst>
-              <a:ext uri="{28A0092B-C50C-407E-A947-70E740481C1C}">
-                <a14:useLocalDpi xmlns:a14="http://schemas.microsoft.com/office/drawing/2010/main" val="0"/>
-              </a:ext>
-            </a:extLst>
-          </a:blip>
-          <a:srcRect l="19278" r="1" b="1"/>
-          <a:stretch/>
-        </p:blipFill>
-        <p:spPr>
-          <a:xfrm>
-            <a:off x="1" y="10"/>
-            <a:ext cx="9669642" cy="6857990"/>
-          </a:xfrm>
-          <a:prstGeom prst="rect">
-            <a:avLst/>
-          </a:prstGeom>
-        </p:spPr>
-      </p:pic>
-      <p:sp>
-        <p:nvSpPr>
-          <p:cNvPr id="47" name="Rectangle 43">
-            <a:extLst>
-              <a:ext uri="{FF2B5EF4-FFF2-40B4-BE49-F238E27FC236}">
-                <a16:creationId xmlns:a16="http://schemas.microsoft.com/office/drawing/2014/main" id="{D1EA859B-E555-4109-94F3-6700E046E008}"/>
-              </a:ext>
-              <a:ext uri="{C183D7F6-B498-43B3-948B-1728B52AA6E4}">
-                <adec:decorative xmlns:adec="http://schemas.microsoft.com/office/drawing/2017/decorative" val="1"/>
-              </a:ext>
-            </a:extLst>
-          </p:cNvPr>
-          <p:cNvSpPr>
-            <a:spLocks noGrp="1" noRot="1" noChangeAspect="1" noMove="1" noResize="1" noEditPoints="1" noAdjustHandles="1" noChangeArrowheads="1" noChangeShapeType="1" noTextEdit="1"/>
-          </p:cNvSpPr>
-          <p:nvPr>
-            <p:extLst>
-              <p:ext uri="{386F3935-93C4-4BCD-93E2-E3B085C9AB24}">
-                <p16:designElem xmlns:p16="http://schemas.microsoft.com/office/powerpoint/2015/main" val="1"/>
-              </p:ext>
-            </p:extLst>
-          </p:nvPr>
-        </p:nvSpPr>
-        <p:spPr>
-          <a:xfrm flipH="1">
-            <a:off x="5125019" y="0"/>
-            <a:ext cx="7066978" cy="6858000"/>
-          </a:xfrm>
-          <a:prstGeom prst="rect">
-            <a:avLst/>
-          </a:prstGeom>
-          <a:gradFill>
-            <a:gsLst>
-              <a:gs pos="48000">
-                <a:schemeClr val="bg1"/>
-              </a:gs>
-              <a:gs pos="35000">
-                <a:schemeClr val="bg1">
-                  <a:alpha val="77000"/>
-                </a:schemeClr>
-              </a:gs>
-              <a:gs pos="19000">
-                <a:schemeClr val="bg1">
-                  <a:alpha val="38000"/>
-                </a:schemeClr>
-              </a:gs>
-              <a:gs pos="0">
-                <a:schemeClr val="bg1">
-                  <a:alpha val="0"/>
-                </a:schemeClr>
-              </a:gs>
-              <a:gs pos="100000">
-                <a:schemeClr val="bg1"/>
-              </a:gs>
-            </a:gsLst>
-            <a:lin ang="10800000" scaled="0"/>
-          </a:gradFill>
-          <a:ln>
-            <a:noFill/>
-          </a:ln>
-        </p:spPr>
-        <p:style>
-          <a:lnRef idx="2">
-            <a:schemeClr val="accent1">
-              <a:shade val="50000"/>
-            </a:schemeClr>
-          </a:lnRef>
-          <a:fillRef idx="1">
-            <a:schemeClr val="accent1"/>
-          </a:fillRef>
-          <a:effectRef idx="0">
-            <a:schemeClr val="accent1"/>
-          </a:effectRef>
-          <a:fontRef idx="minor">
-            <a:schemeClr val="lt1"/>
-          </a:fontRef>
-        </p:style>
-        <p:txBody>
-          <a:bodyPr rtlCol="0" anchor="ctr"/>
-          <a:lstStyle/>
-          <a:p>
-            <a:pPr algn="ctr"/>
-            <a:endParaRPr lang="en-US" dirty="0"/>
-          </a:p>
-        </p:txBody>
-      </p:sp>
-      <p:sp>
-        <p:nvSpPr>
-          <p:cNvPr id="2" name="Title 1">
-            <a:extLst>
-              <a:ext uri="{FF2B5EF4-FFF2-40B4-BE49-F238E27FC236}">
-                <a16:creationId xmlns:a16="http://schemas.microsoft.com/office/drawing/2014/main" id="{F041E233-4D73-73E8-A17A-1ACE54BF87EA}"/>
-              </a:ext>
-            </a:extLst>
-          </p:cNvPr>
-          <p:cNvSpPr>
-            <a:spLocks noGrp="1"/>
-          </p:cNvSpPr>
-          <p:nvPr>
-            <p:ph type="title"/>
-          </p:nvPr>
-        </p:nvSpPr>
-        <p:spPr>
-          <a:xfrm>
-            <a:off x="7531610" y="365125"/>
-            <a:ext cx="3822189" cy="1899912"/>
-          </a:xfrm>
-        </p:spPr>
-        <p:txBody>
-          <a:bodyPr vert="horz" lIns="91440" tIns="45720" rIns="91440" bIns="45720" rtlCol="0" anchor="ctr">
-            <a:normAutofit/>
-          </a:bodyPr>
-          <a:lstStyle/>
-          <a:p>
-            <a:r>
-              <a:rPr lang="en-US" sz="4000"/>
-              <a:t>Our results</a:t>
-            </a:r>
-            <a:endParaRPr lang="en-US" sz="4000" dirty="0"/>
-          </a:p>
-        </p:txBody>
-      </p:sp>
-      <p:sp>
-        <p:nvSpPr>
-          <p:cNvPr id="4" name="Text Placeholder 3">
-            <a:extLst>
-              <a:ext uri="{FF2B5EF4-FFF2-40B4-BE49-F238E27FC236}">
-                <a16:creationId xmlns:a16="http://schemas.microsoft.com/office/drawing/2014/main" id="{7F6EBDB3-D3B0-8BFE-E72B-9326EFA7AE97}"/>
-              </a:ext>
-            </a:extLst>
-          </p:cNvPr>
-          <p:cNvSpPr>
-            <a:spLocks noGrp="1"/>
-          </p:cNvSpPr>
-          <p:nvPr>
-            <p:ph type="body" sz="half" idx="2"/>
-          </p:nvPr>
-        </p:nvSpPr>
-        <p:spPr>
-          <a:xfrm>
-            <a:off x="7531610" y="2434201"/>
-            <a:ext cx="3822189" cy="3742762"/>
-          </a:xfrm>
-        </p:spPr>
-        <p:txBody>
-          <a:bodyPr vert="horz" lIns="91440" tIns="45720" rIns="91440" bIns="45720" rtlCol="0">
-            <a:normAutofit/>
-          </a:bodyPr>
-          <a:lstStyle/>
-          <a:p>
-            <a:r>
-              <a:rPr lang="en-US" sz="1700" b="0" i="0" u="none" strike="noStrike" baseline="0" dirty="0"/>
-              <a:t>We were able to find statistically significant differences among students, schools and countries. We proved that immigrant students often find themselves in a disadvantageous position and that their ability to score high grades is </a:t>
-            </a:r>
-            <a:r>
-              <a:rPr lang="en-US" sz="1700" dirty="0"/>
-              <a:t>influenced by their resources and social class of origin. </a:t>
-            </a:r>
-          </a:p>
-          <a:p>
-            <a:r>
-              <a:rPr lang="en-US" sz="1700" dirty="0"/>
-              <a:t>We managed to identify the critical characteristic that positively or negatively impacted the performance of students. Based on these findings we provided some possible improvements to be implemented by school or countries policies.</a:t>
-            </a:r>
-            <a:endParaRPr lang="en-US" sz="1700" b="0" i="0" u="none" strike="noStrike" baseline="0" dirty="0"/>
-          </a:p>
-          <a:p>
-            <a:pPr indent="-228600">
-              <a:buFont typeface="Arial" panose="020B0604020202020204" pitchFamily="34" charset="0"/>
-              <a:buChar char="•"/>
-            </a:pPr>
-            <a:endParaRPr lang="en-US" sz="1700" dirty="0"/>
-          </a:p>
-          <a:p>
-            <a:pPr indent="-228600">
-              <a:buFont typeface="Arial" panose="020B0604020202020204" pitchFamily="34" charset="0"/>
-              <a:buChar char="•"/>
-            </a:pPr>
-            <a:endParaRPr lang="en-US" sz="1700" b="0" i="0" u="none" strike="noStrike" baseline="0" dirty="0"/>
-          </a:p>
-        </p:txBody>
-      </p:sp>
-    </p:spTree>
-    <p:extLst>
-      <p:ext uri="{BB962C8B-B14F-4D97-AF65-F5344CB8AC3E}">
-        <p14:creationId xmlns:p14="http://schemas.microsoft.com/office/powerpoint/2010/main" val="4217012235"/>
       </p:ext>
     </p:extLst>
   </p:cSld>

</xml_diff>